<commit_message>
Final commit and it Has error in precision,recall,f1-score,average metric calculcation
</commit_message>
<xml_diff>
--- a/Presentation_DeepLearningProject.pptx
+++ b/Presentation_DeepLearningProject.pptx
@@ -164,7 +164,7 @@
           <p:cNvPr id="2" name="Title 1">
             <a:extLst>
               <a:ext uri="{FF2B5EF4-FFF2-40B4-BE49-F238E27FC236}">
-                <a16:creationId xmlns:a16="http://schemas.microsoft.com/office/drawing/2014/main" id="{D21058BF-C5E1-4B52-BD8A-FD1AD5779347}"/>
+                <a16:creationId xmlns:a16="http://schemas.microsoft.com/office/drawing/2014/main" xmlns="" id="{D21058BF-C5E1-4B52-BD8A-FD1AD5779347}"/>
               </a:ext>
             </a:extLst>
           </p:cNvPr>
@@ -202,7 +202,7 @@
           <p:cNvPr id="3" name="Subtitle 2">
             <a:extLst>
               <a:ext uri="{FF2B5EF4-FFF2-40B4-BE49-F238E27FC236}">
-                <a16:creationId xmlns:a16="http://schemas.microsoft.com/office/drawing/2014/main" id="{DFCD51F7-3CC3-4BB7-8291-B1789482E863}"/>
+                <a16:creationId xmlns:a16="http://schemas.microsoft.com/office/drawing/2014/main" xmlns="" id="{DFCD51F7-3CC3-4BB7-8291-B1789482E863}"/>
               </a:ext>
             </a:extLst>
           </p:cNvPr>
@@ -273,7 +273,7 @@
           <p:cNvPr id="4" name="Date Placeholder 3">
             <a:extLst>
               <a:ext uri="{FF2B5EF4-FFF2-40B4-BE49-F238E27FC236}">
-                <a16:creationId xmlns:a16="http://schemas.microsoft.com/office/drawing/2014/main" id="{FD320447-D6C7-43E1-AE88-1FB66CC9C55E}"/>
+                <a16:creationId xmlns:a16="http://schemas.microsoft.com/office/drawing/2014/main" xmlns="" id="{FD320447-D6C7-43E1-AE88-1FB66CC9C55E}"/>
               </a:ext>
             </a:extLst>
           </p:cNvPr>
@@ -291,7 +291,7 @@
           <a:p>
             <a:fld id="{C43A76A3-ADC8-4477-8FC1-B9DD55D84908}" type="datetime1">
               <a:rPr lang="en-US" smtClean="0"/>
-              <a:t>12/3/2023</a:t>
+              <a:t>12/7/2023</a:t>
             </a:fld>
             <a:endParaRPr lang="en-US" dirty="0"/>
           </a:p>
@@ -302,7 +302,7 @@
           <p:cNvPr id="5" name="Footer Placeholder 4">
             <a:extLst>
               <a:ext uri="{FF2B5EF4-FFF2-40B4-BE49-F238E27FC236}">
-                <a16:creationId xmlns:a16="http://schemas.microsoft.com/office/drawing/2014/main" id="{6F5E17B6-E7FC-473A-8D5F-0E6B838EA754}"/>
+                <a16:creationId xmlns:a16="http://schemas.microsoft.com/office/drawing/2014/main" xmlns="" id="{6F5E17B6-E7FC-473A-8D5F-0E6B838EA754}"/>
               </a:ext>
             </a:extLst>
           </p:cNvPr>
@@ -327,7 +327,7 @@
           <p:cNvPr id="6" name="Slide Number Placeholder 5">
             <a:extLst>
               <a:ext uri="{FF2B5EF4-FFF2-40B4-BE49-F238E27FC236}">
-                <a16:creationId xmlns:a16="http://schemas.microsoft.com/office/drawing/2014/main" id="{464AF4E0-FDDB-42B9-862C-7BBC501CDAC5}"/>
+                <a16:creationId xmlns:a16="http://schemas.microsoft.com/office/drawing/2014/main" xmlns="" id="{464AF4E0-FDDB-42B9-862C-7BBC501CDAC5}"/>
               </a:ext>
             </a:extLst>
           </p:cNvPr>
@@ -386,7 +386,7 @@
           <p:cNvPr id="2" name="Title 1">
             <a:extLst>
               <a:ext uri="{FF2B5EF4-FFF2-40B4-BE49-F238E27FC236}">
-                <a16:creationId xmlns:a16="http://schemas.microsoft.com/office/drawing/2014/main" id="{4D8E922F-6166-4009-A42D-027DC7180715}"/>
+                <a16:creationId xmlns:a16="http://schemas.microsoft.com/office/drawing/2014/main" xmlns="" id="{4D8E922F-6166-4009-A42D-027DC7180715}"/>
               </a:ext>
             </a:extLst>
           </p:cNvPr>
@@ -414,7 +414,7 @@
           <p:cNvPr id="3" name="Vertical Text Placeholder 2">
             <a:extLst>
               <a:ext uri="{FF2B5EF4-FFF2-40B4-BE49-F238E27FC236}">
-                <a16:creationId xmlns:a16="http://schemas.microsoft.com/office/drawing/2014/main" id="{FF7791CF-167D-446D-9F99-6976C986E2FB}"/>
+                <a16:creationId xmlns:a16="http://schemas.microsoft.com/office/drawing/2014/main" xmlns="" id="{FF7791CF-167D-446D-9F99-6976C986E2FB}"/>
               </a:ext>
             </a:extLst>
           </p:cNvPr>
@@ -471,7 +471,7 @@
           <p:cNvPr id="4" name="Date Placeholder 3">
             <a:extLst>
               <a:ext uri="{FF2B5EF4-FFF2-40B4-BE49-F238E27FC236}">
-                <a16:creationId xmlns:a16="http://schemas.microsoft.com/office/drawing/2014/main" id="{D83CA422-E040-4DE1-9DA5-C8D37C116A7B}"/>
+                <a16:creationId xmlns:a16="http://schemas.microsoft.com/office/drawing/2014/main" xmlns="" id="{D83CA422-E040-4DE1-9DA5-C8D37C116A7B}"/>
               </a:ext>
             </a:extLst>
           </p:cNvPr>
@@ -489,7 +489,7 @@
           <a:p>
             <a:fld id="{D6762538-DC4D-4667-96E5-B3278DDF8B12}" type="datetime1">
               <a:rPr lang="en-US" smtClean="0"/>
-              <a:t>12/3/2023</a:t>
+              <a:t>12/7/2023</a:t>
             </a:fld>
             <a:endParaRPr lang="en-US"/>
           </a:p>
@@ -500,7 +500,7 @@
           <p:cNvPr id="5" name="Footer Placeholder 4">
             <a:extLst>
               <a:ext uri="{FF2B5EF4-FFF2-40B4-BE49-F238E27FC236}">
-                <a16:creationId xmlns:a16="http://schemas.microsoft.com/office/drawing/2014/main" id="{6C813B0B-60E7-494E-91CB-055BC26906BC}"/>
+                <a16:creationId xmlns:a16="http://schemas.microsoft.com/office/drawing/2014/main" xmlns="" id="{6C813B0B-60E7-494E-91CB-055BC26906BC}"/>
               </a:ext>
             </a:extLst>
           </p:cNvPr>
@@ -525,7 +525,7 @@
           <p:cNvPr id="6" name="Slide Number Placeholder 5">
             <a:extLst>
               <a:ext uri="{FF2B5EF4-FFF2-40B4-BE49-F238E27FC236}">
-                <a16:creationId xmlns:a16="http://schemas.microsoft.com/office/drawing/2014/main" id="{7B48C554-7C1B-4D8F-9B6B-04492656904B}"/>
+                <a16:creationId xmlns:a16="http://schemas.microsoft.com/office/drawing/2014/main" xmlns="" id="{7B48C554-7C1B-4D8F-9B6B-04492656904B}"/>
               </a:ext>
             </a:extLst>
           </p:cNvPr>
@@ -584,7 +584,7 @@
           <p:cNvPr id="2" name="Vertical Title 1">
             <a:extLst>
               <a:ext uri="{FF2B5EF4-FFF2-40B4-BE49-F238E27FC236}">
-                <a16:creationId xmlns:a16="http://schemas.microsoft.com/office/drawing/2014/main" id="{EEC66EF0-6ED8-49A7-BDAD-E20A143FAEAC}"/>
+                <a16:creationId xmlns:a16="http://schemas.microsoft.com/office/drawing/2014/main" xmlns="" id="{EEC66EF0-6ED8-49A7-BDAD-E20A143FAEAC}"/>
               </a:ext>
             </a:extLst>
           </p:cNvPr>
@@ -617,7 +617,7 @@
           <p:cNvPr id="3" name="Vertical Text Placeholder 2">
             <a:extLst>
               <a:ext uri="{FF2B5EF4-FFF2-40B4-BE49-F238E27FC236}">
-                <a16:creationId xmlns:a16="http://schemas.microsoft.com/office/drawing/2014/main" id="{90FCE9CD-90A9-44BA-B293-0662E077DDE9}"/>
+                <a16:creationId xmlns:a16="http://schemas.microsoft.com/office/drawing/2014/main" xmlns="" id="{90FCE9CD-90A9-44BA-B293-0662E077DDE9}"/>
               </a:ext>
             </a:extLst>
           </p:cNvPr>
@@ -679,7 +679,7 @@
           <p:cNvPr id="4" name="Date Placeholder 3">
             <a:extLst>
               <a:ext uri="{FF2B5EF4-FFF2-40B4-BE49-F238E27FC236}">
-                <a16:creationId xmlns:a16="http://schemas.microsoft.com/office/drawing/2014/main" id="{0857DAE0-05C4-460B-B96D-BD183ED030C4}"/>
+                <a16:creationId xmlns:a16="http://schemas.microsoft.com/office/drawing/2014/main" xmlns="" id="{0857DAE0-05C4-460B-B96D-BD183ED030C4}"/>
               </a:ext>
             </a:extLst>
           </p:cNvPr>
@@ -697,7 +697,7 @@
           <a:p>
             <a:fld id="{05880548-5C08-4BE3-B63E-F2BB63B0B00C}" type="datetime1">
               <a:rPr lang="en-US" smtClean="0"/>
-              <a:t>12/3/2023</a:t>
+              <a:t>12/7/2023</a:t>
             </a:fld>
             <a:endParaRPr lang="en-US"/>
           </a:p>
@@ -708,7 +708,7 @@
           <p:cNvPr id="5" name="Footer Placeholder 4">
             <a:extLst>
               <a:ext uri="{FF2B5EF4-FFF2-40B4-BE49-F238E27FC236}">
-                <a16:creationId xmlns:a16="http://schemas.microsoft.com/office/drawing/2014/main" id="{33B3CA93-55C9-4AA3-89A0-55490F745B11}"/>
+                <a16:creationId xmlns:a16="http://schemas.microsoft.com/office/drawing/2014/main" xmlns="" id="{33B3CA93-55C9-4AA3-89A0-55490F745B11}"/>
               </a:ext>
             </a:extLst>
           </p:cNvPr>
@@ -733,7 +733,7 @@
           <p:cNvPr id="6" name="Slide Number Placeholder 5">
             <a:extLst>
               <a:ext uri="{FF2B5EF4-FFF2-40B4-BE49-F238E27FC236}">
-                <a16:creationId xmlns:a16="http://schemas.microsoft.com/office/drawing/2014/main" id="{46BFD820-FF26-4325-816F-310C30F80ACC}"/>
+                <a16:creationId xmlns:a16="http://schemas.microsoft.com/office/drawing/2014/main" xmlns="" id="{46BFD820-FF26-4325-816F-310C30F80ACC}"/>
               </a:ext>
             </a:extLst>
           </p:cNvPr>
@@ -792,7 +792,7 @@
           <p:cNvPr id="7" name="Graphic 1" descr="Tag=AccentColor&#10;Flavor=Light&#10;Target=Fill">
             <a:extLst>
               <a:ext uri="{FF2B5EF4-FFF2-40B4-BE49-F238E27FC236}">
-                <a16:creationId xmlns:a16="http://schemas.microsoft.com/office/drawing/2014/main" id="{0D57E7FA-E8FC-45AC-868F-CDC8144939D6}"/>
+                <a16:creationId xmlns:a16="http://schemas.microsoft.com/office/drawing/2014/main" xmlns="" id="{0D57E7FA-E8FC-45AC-868F-CDC8144939D6}"/>
               </a:ext>
             </a:extLst>
           </p:cNvPr>
@@ -2988,7 +2988,7 @@
           <p:cNvPr id="2" name="Title 1">
             <a:extLst>
               <a:ext uri="{FF2B5EF4-FFF2-40B4-BE49-F238E27FC236}">
-                <a16:creationId xmlns:a16="http://schemas.microsoft.com/office/drawing/2014/main" id="{807094A5-EB6F-441D-88F8-CD7A30C84707}"/>
+                <a16:creationId xmlns:a16="http://schemas.microsoft.com/office/drawing/2014/main" xmlns="" id="{807094A5-EB6F-441D-88F8-CD7A30C84707}"/>
               </a:ext>
             </a:extLst>
           </p:cNvPr>
@@ -3028,7 +3028,7 @@
           <p:cNvPr id="3" name="Subtitle 2">
             <a:extLst>
               <a:ext uri="{FF2B5EF4-FFF2-40B4-BE49-F238E27FC236}">
-                <a16:creationId xmlns:a16="http://schemas.microsoft.com/office/drawing/2014/main" id="{1C7CE1E3-3929-42A6-81B7-056BD88EF353}"/>
+                <a16:creationId xmlns:a16="http://schemas.microsoft.com/office/drawing/2014/main" xmlns="" id="{1C7CE1E3-3929-42A6-81B7-056BD88EF353}"/>
               </a:ext>
             </a:extLst>
           </p:cNvPr>
@@ -3099,7 +3099,7 @@
           <p:cNvPr id="4" name="Date Placeholder 3">
             <a:extLst>
               <a:ext uri="{FF2B5EF4-FFF2-40B4-BE49-F238E27FC236}">
-                <a16:creationId xmlns:a16="http://schemas.microsoft.com/office/drawing/2014/main" id="{5CE951E3-0794-422C-AF76-0AD4A7FB19EB}"/>
+                <a16:creationId xmlns:a16="http://schemas.microsoft.com/office/drawing/2014/main" xmlns="" id="{5CE951E3-0794-422C-AF76-0AD4A7FB19EB}"/>
               </a:ext>
             </a:extLst>
           </p:cNvPr>
@@ -3117,7 +3117,7 @@
           <a:p>
             <a:fld id="{3C04E684-10F4-4CC3-A0B9-F03AA7BE37CF}" type="datetimeFigureOut">
               <a:rPr lang="en-US" smtClean="0"/>
-              <a:t>12/3/2023</a:t>
+              <a:t>12/7/2023</a:t>
             </a:fld>
             <a:endParaRPr lang="en-US"/>
           </a:p>
@@ -3128,7 +3128,7 @@
           <p:cNvPr id="5" name="Footer Placeholder 4">
             <a:extLst>
               <a:ext uri="{FF2B5EF4-FFF2-40B4-BE49-F238E27FC236}">
-                <a16:creationId xmlns:a16="http://schemas.microsoft.com/office/drawing/2014/main" id="{114EBFA8-0291-4D77-A9D9-B17FC2382A80}"/>
+                <a16:creationId xmlns:a16="http://schemas.microsoft.com/office/drawing/2014/main" xmlns="" id="{114EBFA8-0291-4D77-A9D9-B17FC2382A80}"/>
               </a:ext>
             </a:extLst>
           </p:cNvPr>
@@ -3153,7 +3153,7 @@
           <p:cNvPr id="6" name="Slide Number Placeholder 5">
             <a:extLst>
               <a:ext uri="{FF2B5EF4-FFF2-40B4-BE49-F238E27FC236}">
-                <a16:creationId xmlns:a16="http://schemas.microsoft.com/office/drawing/2014/main" id="{357AC4D4-C4EE-4624-A329-C608A1D5AFE1}"/>
+                <a16:creationId xmlns:a16="http://schemas.microsoft.com/office/drawing/2014/main" xmlns="" id="{357AC4D4-C4EE-4624-A329-C608A1D5AFE1}"/>
               </a:ext>
             </a:extLst>
           </p:cNvPr>
@@ -3212,7 +3212,7 @@
           <p:cNvPr id="7" name="Freeform: Shape 6" descr="Tag=AccentColor&#10;Flavor=Light&#10;Target=Fill">
             <a:extLst>
               <a:ext uri="{FF2B5EF4-FFF2-40B4-BE49-F238E27FC236}">
-                <a16:creationId xmlns:a16="http://schemas.microsoft.com/office/drawing/2014/main" id="{13B7BB51-92B8-4089-8DAB-1202A4D1C6A3}"/>
+                <a16:creationId xmlns:a16="http://schemas.microsoft.com/office/drawing/2014/main" xmlns="" id="{13B7BB51-92B8-4089-8DAB-1202A4D1C6A3}"/>
               </a:ext>
             </a:extLst>
           </p:cNvPr>
@@ -3738,7 +3738,7 @@
           <p:cNvPr id="2" name="Title 1">
             <a:extLst>
               <a:ext uri="{FF2B5EF4-FFF2-40B4-BE49-F238E27FC236}">
-                <a16:creationId xmlns:a16="http://schemas.microsoft.com/office/drawing/2014/main" id="{26030E26-A86A-417A-AA64-699AA8DD3DA5}"/>
+                <a16:creationId xmlns:a16="http://schemas.microsoft.com/office/drawing/2014/main" xmlns="" id="{26030E26-A86A-417A-AA64-699AA8DD3DA5}"/>
               </a:ext>
             </a:extLst>
           </p:cNvPr>
@@ -3773,7 +3773,7 @@
           <p:cNvPr id="3" name="Content Placeholder 2">
             <a:extLst>
               <a:ext uri="{FF2B5EF4-FFF2-40B4-BE49-F238E27FC236}">
-                <a16:creationId xmlns:a16="http://schemas.microsoft.com/office/drawing/2014/main" id="{D19CF97E-0E6E-41E9-B75B-0371E744D1E8}"/>
+                <a16:creationId xmlns:a16="http://schemas.microsoft.com/office/drawing/2014/main" xmlns="" id="{D19CF97E-0E6E-41E9-B75B-0371E744D1E8}"/>
               </a:ext>
             </a:extLst>
           </p:cNvPr>
@@ -3836,7 +3836,7 @@
           <p:cNvPr id="4" name="Date Placeholder 3">
             <a:extLst>
               <a:ext uri="{FF2B5EF4-FFF2-40B4-BE49-F238E27FC236}">
-                <a16:creationId xmlns:a16="http://schemas.microsoft.com/office/drawing/2014/main" id="{70BAE770-8363-44CD-8A22-AB26C5C5361B}"/>
+                <a16:creationId xmlns:a16="http://schemas.microsoft.com/office/drawing/2014/main" xmlns="" id="{70BAE770-8363-44CD-8A22-AB26C5C5361B}"/>
               </a:ext>
             </a:extLst>
           </p:cNvPr>
@@ -3854,7 +3854,7 @@
           <a:p>
             <a:fld id="{3C04E684-10F4-4CC3-A0B9-F03AA7BE37CF}" type="datetimeFigureOut">
               <a:rPr lang="en-US" smtClean="0"/>
-              <a:t>12/3/2023</a:t>
+              <a:t>12/7/2023</a:t>
             </a:fld>
             <a:endParaRPr lang="en-US"/>
           </a:p>
@@ -3865,7 +3865,7 @@
           <p:cNvPr id="5" name="Footer Placeholder 4">
             <a:extLst>
               <a:ext uri="{FF2B5EF4-FFF2-40B4-BE49-F238E27FC236}">
-                <a16:creationId xmlns:a16="http://schemas.microsoft.com/office/drawing/2014/main" id="{36E618F2-3B8E-4449-91E7-F8AA4960938F}"/>
+                <a16:creationId xmlns:a16="http://schemas.microsoft.com/office/drawing/2014/main" xmlns="" id="{36E618F2-3B8E-4449-91E7-F8AA4960938F}"/>
               </a:ext>
             </a:extLst>
           </p:cNvPr>
@@ -3890,7 +3890,7 @@
           <p:cNvPr id="6" name="Slide Number Placeholder 5">
             <a:extLst>
               <a:ext uri="{FF2B5EF4-FFF2-40B4-BE49-F238E27FC236}">
-                <a16:creationId xmlns:a16="http://schemas.microsoft.com/office/drawing/2014/main" id="{063428F0-E5C2-42A1-AB2F-1A19FFAD19CF}"/>
+                <a16:creationId xmlns:a16="http://schemas.microsoft.com/office/drawing/2014/main" xmlns="" id="{063428F0-E5C2-42A1-AB2F-1A19FFAD19CF}"/>
               </a:ext>
             </a:extLst>
           </p:cNvPr>
@@ -3949,7 +3949,7 @@
           <p:cNvPr id="7" name="Graphic 9" descr="Tag=AccentColor&#10;Flavor=Light&#10;Target=Fill">
             <a:extLst>
               <a:ext uri="{FF2B5EF4-FFF2-40B4-BE49-F238E27FC236}">
-                <a16:creationId xmlns:a16="http://schemas.microsoft.com/office/drawing/2014/main" id="{DB2CE8D6-5B4E-4EBE-9ED5-A1DA7E2A5CDA}"/>
+                <a16:creationId xmlns:a16="http://schemas.microsoft.com/office/drawing/2014/main" xmlns="" id="{DB2CE8D6-5B4E-4EBE-9ED5-A1DA7E2A5CDA}"/>
               </a:ext>
             </a:extLst>
           </p:cNvPr>
@@ -4315,7 +4315,7 @@
           <p:cNvPr id="2" name="Title 1">
             <a:extLst>
               <a:ext uri="{FF2B5EF4-FFF2-40B4-BE49-F238E27FC236}">
-                <a16:creationId xmlns:a16="http://schemas.microsoft.com/office/drawing/2014/main" id="{64AD5705-B027-4C44-B38A-60296E29EB12}"/>
+                <a16:creationId xmlns:a16="http://schemas.microsoft.com/office/drawing/2014/main" xmlns="" id="{64AD5705-B027-4C44-B38A-60296E29EB12}"/>
               </a:ext>
             </a:extLst>
           </p:cNvPr>
@@ -4355,7 +4355,7 @@
           <p:cNvPr id="3" name="Text Placeholder 2">
             <a:extLst>
               <a:ext uri="{FF2B5EF4-FFF2-40B4-BE49-F238E27FC236}">
-                <a16:creationId xmlns:a16="http://schemas.microsoft.com/office/drawing/2014/main" id="{BE8BBAC4-9088-44CF-BA2D-B8DD24FB5274}"/>
+                <a16:creationId xmlns:a16="http://schemas.microsoft.com/office/drawing/2014/main" xmlns="" id="{BE8BBAC4-9088-44CF-BA2D-B8DD24FB5274}"/>
               </a:ext>
             </a:extLst>
           </p:cNvPr>
@@ -4478,7 +4478,7 @@
           <p:cNvPr id="4" name="Date Placeholder 3">
             <a:extLst>
               <a:ext uri="{FF2B5EF4-FFF2-40B4-BE49-F238E27FC236}">
-                <a16:creationId xmlns:a16="http://schemas.microsoft.com/office/drawing/2014/main" id="{3793FB3F-D2A6-4919-B57B-C08861D46303}"/>
+                <a16:creationId xmlns:a16="http://schemas.microsoft.com/office/drawing/2014/main" xmlns="" id="{3793FB3F-D2A6-4919-B57B-C08861D46303}"/>
               </a:ext>
             </a:extLst>
           </p:cNvPr>
@@ -4496,7 +4496,7 @@
           <a:p>
             <a:fld id="{3C04E684-10F4-4CC3-A0B9-F03AA7BE37CF}" type="datetimeFigureOut">
               <a:rPr lang="en-US" smtClean="0"/>
-              <a:t>12/3/2023</a:t>
+              <a:t>12/7/2023</a:t>
             </a:fld>
             <a:endParaRPr lang="en-US"/>
           </a:p>
@@ -4507,7 +4507,7 @@
           <p:cNvPr id="5" name="Footer Placeholder 4">
             <a:extLst>
               <a:ext uri="{FF2B5EF4-FFF2-40B4-BE49-F238E27FC236}">
-                <a16:creationId xmlns:a16="http://schemas.microsoft.com/office/drawing/2014/main" id="{989049E0-6BE5-43FA-A4D4-ACAFC871A79F}"/>
+                <a16:creationId xmlns:a16="http://schemas.microsoft.com/office/drawing/2014/main" xmlns="" id="{989049E0-6BE5-43FA-A4D4-ACAFC871A79F}"/>
               </a:ext>
             </a:extLst>
           </p:cNvPr>
@@ -4532,7 +4532,7 @@
           <p:cNvPr id="6" name="Slide Number Placeholder 5">
             <a:extLst>
               <a:ext uri="{FF2B5EF4-FFF2-40B4-BE49-F238E27FC236}">
-                <a16:creationId xmlns:a16="http://schemas.microsoft.com/office/drawing/2014/main" id="{ADF8C28D-1479-4F15-B906-0AEBBCCA8CFA}"/>
+                <a16:creationId xmlns:a16="http://schemas.microsoft.com/office/drawing/2014/main" xmlns="" id="{ADF8C28D-1479-4F15-B906-0AEBBCCA8CFA}"/>
               </a:ext>
             </a:extLst>
           </p:cNvPr>
@@ -4591,7 +4591,7 @@
           <p:cNvPr id="8" name="Freeform: Shape 7" descr="Tag=AccentColor&#10;Flavor=Light&#10;Target=Fill">
             <a:extLst>
               <a:ext uri="{FF2B5EF4-FFF2-40B4-BE49-F238E27FC236}">
-                <a16:creationId xmlns:a16="http://schemas.microsoft.com/office/drawing/2014/main" id="{FD51F360-8860-4FB5-A0A5-773473DD8B39}"/>
+                <a16:creationId xmlns:a16="http://schemas.microsoft.com/office/drawing/2014/main" xmlns="" id="{FD51F360-8860-4FB5-A0A5-773473DD8B39}"/>
               </a:ext>
             </a:extLst>
           </p:cNvPr>
@@ -5117,7 +5117,7 @@
           <p:cNvPr id="2" name="Title 1">
             <a:extLst>
               <a:ext uri="{FF2B5EF4-FFF2-40B4-BE49-F238E27FC236}">
-                <a16:creationId xmlns:a16="http://schemas.microsoft.com/office/drawing/2014/main" id="{D2A77EC9-372A-4ECA-9088-780532AF057F}"/>
+                <a16:creationId xmlns:a16="http://schemas.microsoft.com/office/drawing/2014/main" xmlns="" id="{D2A77EC9-372A-4ECA-9088-780532AF057F}"/>
               </a:ext>
             </a:extLst>
           </p:cNvPr>
@@ -5152,7 +5152,7 @@
           <p:cNvPr id="3" name="Content Placeholder 2">
             <a:extLst>
               <a:ext uri="{FF2B5EF4-FFF2-40B4-BE49-F238E27FC236}">
-                <a16:creationId xmlns:a16="http://schemas.microsoft.com/office/drawing/2014/main" id="{57C882CE-1B27-414A-9B06-AA5D2DB683BA}"/>
+                <a16:creationId xmlns:a16="http://schemas.microsoft.com/office/drawing/2014/main" xmlns="" id="{57C882CE-1B27-414A-9B06-AA5D2DB683BA}"/>
               </a:ext>
             </a:extLst>
           </p:cNvPr>
@@ -5215,7 +5215,7 @@
           <p:cNvPr id="4" name="Content Placeholder 3">
             <a:extLst>
               <a:ext uri="{FF2B5EF4-FFF2-40B4-BE49-F238E27FC236}">
-                <a16:creationId xmlns:a16="http://schemas.microsoft.com/office/drawing/2014/main" id="{A0397E60-5D92-4530-96D1-FC09AF3C2742}"/>
+                <a16:creationId xmlns:a16="http://schemas.microsoft.com/office/drawing/2014/main" xmlns="" id="{A0397E60-5D92-4530-96D1-FC09AF3C2742}"/>
               </a:ext>
             </a:extLst>
           </p:cNvPr>
@@ -5278,7 +5278,7 @@
           <p:cNvPr id="5" name="Date Placeholder 4">
             <a:extLst>
               <a:ext uri="{FF2B5EF4-FFF2-40B4-BE49-F238E27FC236}">
-                <a16:creationId xmlns:a16="http://schemas.microsoft.com/office/drawing/2014/main" id="{034240FE-0C6A-47E9-9B0A-7B3C60877372}"/>
+                <a16:creationId xmlns:a16="http://schemas.microsoft.com/office/drawing/2014/main" xmlns="" id="{034240FE-0C6A-47E9-9B0A-7B3C60877372}"/>
               </a:ext>
             </a:extLst>
           </p:cNvPr>
@@ -5296,7 +5296,7 @@
           <a:p>
             <a:fld id="{3C04E684-10F4-4CC3-A0B9-F03AA7BE37CF}" type="datetimeFigureOut">
               <a:rPr lang="en-US" smtClean="0"/>
-              <a:t>12/3/2023</a:t>
+              <a:t>12/7/2023</a:t>
             </a:fld>
             <a:endParaRPr lang="en-US"/>
           </a:p>
@@ -5307,7 +5307,7 @@
           <p:cNvPr id="6" name="Footer Placeholder 5">
             <a:extLst>
               <a:ext uri="{FF2B5EF4-FFF2-40B4-BE49-F238E27FC236}">
-                <a16:creationId xmlns:a16="http://schemas.microsoft.com/office/drawing/2014/main" id="{8671AE1B-BB18-4C7E-AA77-3A4D401A5F35}"/>
+                <a16:creationId xmlns:a16="http://schemas.microsoft.com/office/drawing/2014/main" xmlns="" id="{8671AE1B-BB18-4C7E-AA77-3A4D401A5F35}"/>
               </a:ext>
             </a:extLst>
           </p:cNvPr>
@@ -5332,7 +5332,7 @@
           <p:cNvPr id="7" name="Slide Number Placeholder 6">
             <a:extLst>
               <a:ext uri="{FF2B5EF4-FFF2-40B4-BE49-F238E27FC236}">
-                <a16:creationId xmlns:a16="http://schemas.microsoft.com/office/drawing/2014/main" id="{76FA7B1D-FEDD-4E29-A352-29E5F498B323}"/>
+                <a16:creationId xmlns:a16="http://schemas.microsoft.com/office/drawing/2014/main" xmlns="" id="{76FA7B1D-FEDD-4E29-A352-29E5F498B323}"/>
               </a:ext>
             </a:extLst>
           </p:cNvPr>
@@ -5391,7 +5391,7 @@
           <p:cNvPr id="10" name="Freeform: Shape 9" descr="Tag=AccentColor&#10;Flavor=Light&#10;Target=Fill">
             <a:extLst>
               <a:ext uri="{FF2B5EF4-FFF2-40B4-BE49-F238E27FC236}">
-                <a16:creationId xmlns:a16="http://schemas.microsoft.com/office/drawing/2014/main" id="{527D753D-3426-457C-9082-B92894509EC0}"/>
+                <a16:creationId xmlns:a16="http://schemas.microsoft.com/office/drawing/2014/main" xmlns="" id="{527D753D-3426-457C-9082-B92894509EC0}"/>
               </a:ext>
             </a:extLst>
           </p:cNvPr>
@@ -5917,7 +5917,7 @@
           <p:cNvPr id="2" name="Title 1">
             <a:extLst>
               <a:ext uri="{FF2B5EF4-FFF2-40B4-BE49-F238E27FC236}">
-                <a16:creationId xmlns:a16="http://schemas.microsoft.com/office/drawing/2014/main" id="{164D2B94-0682-4185-BCE3-89AF214A4FA8}"/>
+                <a16:creationId xmlns:a16="http://schemas.microsoft.com/office/drawing/2014/main" xmlns="" id="{164D2B94-0682-4185-BCE3-89AF214A4FA8}"/>
               </a:ext>
             </a:extLst>
           </p:cNvPr>
@@ -5957,7 +5957,7 @@
           <p:cNvPr id="3" name="Text Placeholder 2">
             <a:extLst>
               <a:ext uri="{FF2B5EF4-FFF2-40B4-BE49-F238E27FC236}">
-                <a16:creationId xmlns:a16="http://schemas.microsoft.com/office/drawing/2014/main" id="{8D65C47E-B85E-4B3E-A669-DEEC7F5DF2FB}"/>
+                <a16:creationId xmlns:a16="http://schemas.microsoft.com/office/drawing/2014/main" xmlns="" id="{8D65C47E-B85E-4B3E-A669-DEEC7F5DF2FB}"/>
               </a:ext>
             </a:extLst>
           </p:cNvPr>
@@ -6030,7 +6030,7 @@
           <p:cNvPr id="4" name="Content Placeholder 3">
             <a:extLst>
               <a:ext uri="{FF2B5EF4-FFF2-40B4-BE49-F238E27FC236}">
-                <a16:creationId xmlns:a16="http://schemas.microsoft.com/office/drawing/2014/main" id="{E324517F-FE8C-49AD-9A52-0F4301052699}"/>
+                <a16:creationId xmlns:a16="http://schemas.microsoft.com/office/drawing/2014/main" xmlns="" id="{E324517F-FE8C-49AD-9A52-0F4301052699}"/>
               </a:ext>
             </a:extLst>
           </p:cNvPr>
@@ -6093,7 +6093,7 @@
           <p:cNvPr id="5" name="Text Placeholder 4">
             <a:extLst>
               <a:ext uri="{FF2B5EF4-FFF2-40B4-BE49-F238E27FC236}">
-                <a16:creationId xmlns:a16="http://schemas.microsoft.com/office/drawing/2014/main" id="{C80C73EC-7117-4DC2-9075-14102F2E282B}"/>
+                <a16:creationId xmlns:a16="http://schemas.microsoft.com/office/drawing/2014/main" xmlns="" id="{C80C73EC-7117-4DC2-9075-14102F2E282B}"/>
               </a:ext>
             </a:extLst>
           </p:cNvPr>
@@ -6166,7 +6166,7 @@
           <p:cNvPr id="6" name="Content Placeholder 5">
             <a:extLst>
               <a:ext uri="{FF2B5EF4-FFF2-40B4-BE49-F238E27FC236}">
-                <a16:creationId xmlns:a16="http://schemas.microsoft.com/office/drawing/2014/main" id="{7DD9A323-865B-4177-8F98-9BA304E022E0}"/>
+                <a16:creationId xmlns:a16="http://schemas.microsoft.com/office/drawing/2014/main" xmlns="" id="{7DD9A323-865B-4177-8F98-9BA304E022E0}"/>
               </a:ext>
             </a:extLst>
           </p:cNvPr>
@@ -6229,7 +6229,7 @@
           <p:cNvPr id="7" name="Date Placeholder 6">
             <a:extLst>
               <a:ext uri="{FF2B5EF4-FFF2-40B4-BE49-F238E27FC236}">
-                <a16:creationId xmlns:a16="http://schemas.microsoft.com/office/drawing/2014/main" id="{2AA4E5D6-7075-4584-BD43-D966F0B58E6D}"/>
+                <a16:creationId xmlns:a16="http://schemas.microsoft.com/office/drawing/2014/main" xmlns="" id="{2AA4E5D6-7075-4584-BD43-D966F0B58E6D}"/>
               </a:ext>
             </a:extLst>
           </p:cNvPr>
@@ -6247,7 +6247,7 @@
           <a:p>
             <a:fld id="{3C04E684-10F4-4CC3-A0B9-F03AA7BE37CF}" type="datetimeFigureOut">
               <a:rPr lang="en-US" smtClean="0"/>
-              <a:t>12/3/2023</a:t>
+              <a:t>12/7/2023</a:t>
             </a:fld>
             <a:endParaRPr lang="en-US"/>
           </a:p>
@@ -6258,7 +6258,7 @@
           <p:cNvPr id="8" name="Footer Placeholder 7">
             <a:extLst>
               <a:ext uri="{FF2B5EF4-FFF2-40B4-BE49-F238E27FC236}">
-                <a16:creationId xmlns:a16="http://schemas.microsoft.com/office/drawing/2014/main" id="{8C38B83D-8A05-4F3C-A409-1602C9630750}"/>
+                <a16:creationId xmlns:a16="http://schemas.microsoft.com/office/drawing/2014/main" xmlns="" id="{8C38B83D-8A05-4F3C-A409-1602C9630750}"/>
               </a:ext>
             </a:extLst>
           </p:cNvPr>
@@ -6283,7 +6283,7 @@
           <p:cNvPr id="9" name="Slide Number Placeholder 8">
             <a:extLst>
               <a:ext uri="{FF2B5EF4-FFF2-40B4-BE49-F238E27FC236}">
-                <a16:creationId xmlns:a16="http://schemas.microsoft.com/office/drawing/2014/main" id="{BAD250E7-8A73-449C-A140-A2A2582D7F33}"/>
+                <a16:creationId xmlns:a16="http://schemas.microsoft.com/office/drawing/2014/main" xmlns="" id="{BAD250E7-8A73-449C-A140-A2A2582D7F33}"/>
               </a:ext>
             </a:extLst>
           </p:cNvPr>
@@ -6342,7 +6342,7 @@
           <p:cNvPr id="6" name="Graphic 1" descr="Tag=AccentColor&#10;Flavor=Light&#10;Target=Fill">
             <a:extLst>
               <a:ext uri="{FF2B5EF4-FFF2-40B4-BE49-F238E27FC236}">
-                <a16:creationId xmlns:a16="http://schemas.microsoft.com/office/drawing/2014/main" id="{AAFBE1F6-FC6D-4C3D-9AC3-97028E6F18C7}"/>
+                <a16:creationId xmlns:a16="http://schemas.microsoft.com/office/drawing/2014/main" xmlns="" id="{AAFBE1F6-FC6D-4C3D-9AC3-97028E6F18C7}"/>
               </a:ext>
             </a:extLst>
           </p:cNvPr>
@@ -8538,7 +8538,7 @@
           <p:cNvPr id="2" name="Title 1">
             <a:extLst>
               <a:ext uri="{FF2B5EF4-FFF2-40B4-BE49-F238E27FC236}">
-                <a16:creationId xmlns:a16="http://schemas.microsoft.com/office/drawing/2014/main" id="{192825A4-268B-4301-8432-F9E9B2661AEC}"/>
+                <a16:creationId xmlns:a16="http://schemas.microsoft.com/office/drawing/2014/main" xmlns="" id="{192825A4-268B-4301-8432-F9E9B2661AEC}"/>
               </a:ext>
             </a:extLst>
           </p:cNvPr>
@@ -8578,7 +8578,7 @@
           <p:cNvPr id="3" name="Date Placeholder 2">
             <a:extLst>
               <a:ext uri="{FF2B5EF4-FFF2-40B4-BE49-F238E27FC236}">
-                <a16:creationId xmlns:a16="http://schemas.microsoft.com/office/drawing/2014/main" id="{DA33410F-8A90-47F6-BD39-4AC0E4358351}"/>
+                <a16:creationId xmlns:a16="http://schemas.microsoft.com/office/drawing/2014/main" xmlns="" id="{DA33410F-8A90-47F6-BD39-4AC0E4358351}"/>
               </a:ext>
             </a:extLst>
           </p:cNvPr>
@@ -8596,7 +8596,7 @@
           <a:p>
             <a:fld id="{3C04E684-10F4-4CC3-A0B9-F03AA7BE37CF}" type="datetimeFigureOut">
               <a:rPr lang="en-US" smtClean="0"/>
-              <a:t>12/3/2023</a:t>
+              <a:t>12/7/2023</a:t>
             </a:fld>
             <a:endParaRPr lang="en-US"/>
           </a:p>
@@ -8607,7 +8607,7 @@
           <p:cNvPr id="4" name="Footer Placeholder 3">
             <a:extLst>
               <a:ext uri="{FF2B5EF4-FFF2-40B4-BE49-F238E27FC236}">
-                <a16:creationId xmlns:a16="http://schemas.microsoft.com/office/drawing/2014/main" id="{D1D819A9-F8DE-4E5C-AFC3-E0105ACD8295}"/>
+                <a16:creationId xmlns:a16="http://schemas.microsoft.com/office/drawing/2014/main" xmlns="" id="{D1D819A9-F8DE-4E5C-AFC3-E0105ACD8295}"/>
               </a:ext>
             </a:extLst>
           </p:cNvPr>
@@ -8632,7 +8632,7 @@
           <p:cNvPr id="5" name="Slide Number Placeholder 4">
             <a:extLst>
               <a:ext uri="{FF2B5EF4-FFF2-40B4-BE49-F238E27FC236}">
-                <a16:creationId xmlns:a16="http://schemas.microsoft.com/office/drawing/2014/main" id="{A4E25320-A12F-4F3E-8EC9-11292FF36BEA}"/>
+                <a16:creationId xmlns:a16="http://schemas.microsoft.com/office/drawing/2014/main" xmlns="" id="{A4E25320-A12F-4F3E-8EC9-11292FF36BEA}"/>
               </a:ext>
             </a:extLst>
           </p:cNvPr>
@@ -8691,7 +8691,7 @@
           <p:cNvPr id="2" name="Date Placeholder 1">
             <a:extLst>
               <a:ext uri="{FF2B5EF4-FFF2-40B4-BE49-F238E27FC236}">
-                <a16:creationId xmlns:a16="http://schemas.microsoft.com/office/drawing/2014/main" id="{71C9756B-145D-4BA8-AA43-904C1E7CB86D}"/>
+                <a16:creationId xmlns:a16="http://schemas.microsoft.com/office/drawing/2014/main" xmlns="" id="{71C9756B-145D-4BA8-AA43-904C1E7CB86D}"/>
               </a:ext>
             </a:extLst>
           </p:cNvPr>
@@ -8709,7 +8709,7 @@
           <a:p>
             <a:fld id="{3C04E684-10F4-4CC3-A0B9-F03AA7BE37CF}" type="datetimeFigureOut">
               <a:rPr lang="en-US" smtClean="0"/>
-              <a:t>12/3/2023</a:t>
+              <a:t>12/7/2023</a:t>
             </a:fld>
             <a:endParaRPr lang="en-US"/>
           </a:p>
@@ -8720,7 +8720,7 @@
           <p:cNvPr id="3" name="Footer Placeholder 2">
             <a:extLst>
               <a:ext uri="{FF2B5EF4-FFF2-40B4-BE49-F238E27FC236}">
-                <a16:creationId xmlns:a16="http://schemas.microsoft.com/office/drawing/2014/main" id="{B21DB60F-139E-4C44-89AF-3F8F5EC241FB}"/>
+                <a16:creationId xmlns:a16="http://schemas.microsoft.com/office/drawing/2014/main" xmlns="" id="{B21DB60F-139E-4C44-89AF-3F8F5EC241FB}"/>
               </a:ext>
             </a:extLst>
           </p:cNvPr>
@@ -8745,7 +8745,7 @@
           <p:cNvPr id="4" name="Slide Number Placeholder 3">
             <a:extLst>
               <a:ext uri="{FF2B5EF4-FFF2-40B4-BE49-F238E27FC236}">
-                <a16:creationId xmlns:a16="http://schemas.microsoft.com/office/drawing/2014/main" id="{388226C9-C193-4B47-9717-4BC86C9092C7}"/>
+                <a16:creationId xmlns:a16="http://schemas.microsoft.com/office/drawing/2014/main" xmlns="" id="{388226C9-C193-4B47-9717-4BC86C9092C7}"/>
               </a:ext>
             </a:extLst>
           </p:cNvPr>
@@ -8804,7 +8804,7 @@
           <p:cNvPr id="6" name="Freeform: Shape 5" descr="Mask ID=&#10;Mask position=bottom, center&#10;Mask family= brushstroke, landscape, wide">
             <a:extLst>
               <a:ext uri="{FF2B5EF4-FFF2-40B4-BE49-F238E27FC236}">
-                <a16:creationId xmlns:a16="http://schemas.microsoft.com/office/drawing/2014/main" id="{736BF44D-E8DD-45FA-931D-CBCC67D57944}"/>
+                <a16:creationId xmlns:a16="http://schemas.microsoft.com/office/drawing/2014/main" xmlns="" id="{736BF44D-E8DD-45FA-931D-CBCC67D57944}"/>
               </a:ext>
             </a:extLst>
           </p:cNvPr>
@@ -9198,7 +9198,7 @@
           <p:cNvPr id="2" name="Date Placeholder 1">
             <a:extLst>
               <a:ext uri="{FF2B5EF4-FFF2-40B4-BE49-F238E27FC236}">
-                <a16:creationId xmlns:a16="http://schemas.microsoft.com/office/drawing/2014/main" id="{71C9756B-145D-4BA8-AA43-904C1E7CB86D}"/>
+                <a16:creationId xmlns:a16="http://schemas.microsoft.com/office/drawing/2014/main" xmlns="" id="{71C9756B-145D-4BA8-AA43-904C1E7CB86D}"/>
               </a:ext>
             </a:extLst>
           </p:cNvPr>
@@ -9216,7 +9216,7 @@
           <a:p>
             <a:fld id="{3C04E684-10F4-4CC3-A0B9-F03AA7BE37CF}" type="datetimeFigureOut">
               <a:rPr lang="en-US" smtClean="0"/>
-              <a:t>12/3/2023</a:t>
+              <a:t>12/7/2023</a:t>
             </a:fld>
             <a:endParaRPr lang="en-US"/>
           </a:p>
@@ -9227,7 +9227,7 @@
           <p:cNvPr id="3" name="Footer Placeholder 2">
             <a:extLst>
               <a:ext uri="{FF2B5EF4-FFF2-40B4-BE49-F238E27FC236}">
-                <a16:creationId xmlns:a16="http://schemas.microsoft.com/office/drawing/2014/main" id="{B21DB60F-139E-4C44-89AF-3F8F5EC241FB}"/>
+                <a16:creationId xmlns:a16="http://schemas.microsoft.com/office/drawing/2014/main" xmlns="" id="{B21DB60F-139E-4C44-89AF-3F8F5EC241FB}"/>
               </a:ext>
             </a:extLst>
           </p:cNvPr>
@@ -9252,7 +9252,7 @@
           <p:cNvPr id="4" name="Slide Number Placeholder 3">
             <a:extLst>
               <a:ext uri="{FF2B5EF4-FFF2-40B4-BE49-F238E27FC236}">
-                <a16:creationId xmlns:a16="http://schemas.microsoft.com/office/drawing/2014/main" id="{388226C9-C193-4B47-9717-4BC86C9092C7}"/>
+                <a16:creationId xmlns:a16="http://schemas.microsoft.com/office/drawing/2014/main" xmlns="" id="{388226C9-C193-4B47-9717-4BC86C9092C7}"/>
               </a:ext>
             </a:extLst>
           </p:cNvPr>
@@ -9311,7 +9311,7 @@
           <p:cNvPr id="2" name="Title 1">
             <a:extLst>
               <a:ext uri="{FF2B5EF4-FFF2-40B4-BE49-F238E27FC236}">
-                <a16:creationId xmlns:a16="http://schemas.microsoft.com/office/drawing/2014/main" id="{3B1736C8-0B4F-4655-A630-0B1D2540B7DD}"/>
+                <a16:creationId xmlns:a16="http://schemas.microsoft.com/office/drawing/2014/main" xmlns="" id="{3B1736C8-0B4F-4655-A630-0B1D2540B7DD}"/>
               </a:ext>
             </a:extLst>
           </p:cNvPr>
@@ -9339,7 +9339,7 @@
           <p:cNvPr id="3" name="Content Placeholder 2">
             <a:extLst>
               <a:ext uri="{FF2B5EF4-FFF2-40B4-BE49-F238E27FC236}">
-                <a16:creationId xmlns:a16="http://schemas.microsoft.com/office/drawing/2014/main" id="{5378B888-85E0-4D92-903E-C3FE7E870DE7}"/>
+                <a16:creationId xmlns:a16="http://schemas.microsoft.com/office/drawing/2014/main" xmlns="" id="{5378B888-85E0-4D92-903E-C3FE7E870DE7}"/>
               </a:ext>
             </a:extLst>
           </p:cNvPr>
@@ -9396,7 +9396,7 @@
           <p:cNvPr id="4" name="Date Placeholder 3">
             <a:extLst>
               <a:ext uri="{FF2B5EF4-FFF2-40B4-BE49-F238E27FC236}">
-                <a16:creationId xmlns:a16="http://schemas.microsoft.com/office/drawing/2014/main" id="{FC648916-250B-4232-BD7D-571FDE79F5E7}"/>
+                <a16:creationId xmlns:a16="http://schemas.microsoft.com/office/drawing/2014/main" xmlns="" id="{FC648916-250B-4232-BD7D-571FDE79F5E7}"/>
               </a:ext>
             </a:extLst>
           </p:cNvPr>
@@ -9414,7 +9414,7 @@
           <a:p>
             <a:fld id="{DE7F49BE-398D-479A-8A7E-5DDBCA61EDCB}" type="datetime1">
               <a:rPr lang="en-US" smtClean="0"/>
-              <a:t>12/3/2023</a:t>
+              <a:t>12/7/2023</a:t>
             </a:fld>
             <a:endParaRPr lang="en-US"/>
           </a:p>
@@ -9425,7 +9425,7 @@
           <p:cNvPr id="5" name="Footer Placeholder 4">
             <a:extLst>
               <a:ext uri="{FF2B5EF4-FFF2-40B4-BE49-F238E27FC236}">
-                <a16:creationId xmlns:a16="http://schemas.microsoft.com/office/drawing/2014/main" id="{B6A8BFB4-647C-4104-B6D4-3346051C36D4}"/>
+                <a16:creationId xmlns:a16="http://schemas.microsoft.com/office/drawing/2014/main" xmlns="" id="{B6A8BFB4-647C-4104-B6D4-3346051C36D4}"/>
               </a:ext>
             </a:extLst>
           </p:cNvPr>
@@ -9450,7 +9450,7 @@
           <p:cNvPr id="6" name="Slide Number Placeholder 5">
             <a:extLst>
               <a:ext uri="{FF2B5EF4-FFF2-40B4-BE49-F238E27FC236}">
-                <a16:creationId xmlns:a16="http://schemas.microsoft.com/office/drawing/2014/main" id="{2E0FA73F-2BE8-4370-AE90-58F4CE51FC51}"/>
+                <a16:creationId xmlns:a16="http://schemas.microsoft.com/office/drawing/2014/main" xmlns="" id="{2E0FA73F-2BE8-4370-AE90-58F4CE51FC51}"/>
               </a:ext>
             </a:extLst>
           </p:cNvPr>
@@ -9509,7 +9509,7 @@
           <p:cNvPr id="8" name="Freeform: Shape 7" descr="Tag=AccentColor&#10;Flavor=Light&#10;Target=Fill">
             <a:extLst>
               <a:ext uri="{FF2B5EF4-FFF2-40B4-BE49-F238E27FC236}">
-                <a16:creationId xmlns:a16="http://schemas.microsoft.com/office/drawing/2014/main" id="{76C5A8FA-6B61-4934-AF55-C595090CA5DC}"/>
+                <a16:creationId xmlns:a16="http://schemas.microsoft.com/office/drawing/2014/main" xmlns="" id="{76C5A8FA-6B61-4934-AF55-C595090CA5DC}"/>
               </a:ext>
             </a:extLst>
           </p:cNvPr>
@@ -10499,7 +10499,7 @@
           <p:cNvPr id="2" name="Title 1">
             <a:extLst>
               <a:ext uri="{FF2B5EF4-FFF2-40B4-BE49-F238E27FC236}">
-                <a16:creationId xmlns:a16="http://schemas.microsoft.com/office/drawing/2014/main" id="{146AD042-DE90-4088-8A07-B9A64C2CE03E}"/>
+                <a16:creationId xmlns:a16="http://schemas.microsoft.com/office/drawing/2014/main" xmlns="" id="{146AD042-DE90-4088-8A07-B9A64C2CE03E}"/>
               </a:ext>
             </a:extLst>
           </p:cNvPr>
@@ -10537,7 +10537,7 @@
           <p:cNvPr id="3" name="Content Placeholder 2">
             <a:extLst>
               <a:ext uri="{FF2B5EF4-FFF2-40B4-BE49-F238E27FC236}">
-                <a16:creationId xmlns:a16="http://schemas.microsoft.com/office/drawing/2014/main" id="{BF2FFC98-62A0-445A-BEDA-785BE925A1D8}"/>
+                <a16:creationId xmlns:a16="http://schemas.microsoft.com/office/drawing/2014/main" xmlns="" id="{BF2FFC98-62A0-445A-BEDA-785BE925A1D8}"/>
               </a:ext>
             </a:extLst>
           </p:cNvPr>
@@ -10628,7 +10628,7 @@
           <p:cNvPr id="4" name="Text Placeholder 3">
             <a:extLst>
               <a:ext uri="{FF2B5EF4-FFF2-40B4-BE49-F238E27FC236}">
-                <a16:creationId xmlns:a16="http://schemas.microsoft.com/office/drawing/2014/main" id="{DB4D7827-8489-4EE4-88EE-16685FE6DE8A}"/>
+                <a16:creationId xmlns:a16="http://schemas.microsoft.com/office/drawing/2014/main" xmlns="" id="{DB4D7827-8489-4EE4-88EE-16685FE6DE8A}"/>
               </a:ext>
             </a:extLst>
           </p:cNvPr>
@@ -10699,7 +10699,7 @@
           <p:cNvPr id="5" name="Date Placeholder 4">
             <a:extLst>
               <a:ext uri="{FF2B5EF4-FFF2-40B4-BE49-F238E27FC236}">
-                <a16:creationId xmlns:a16="http://schemas.microsoft.com/office/drawing/2014/main" id="{8C33534F-EA91-4A50-B0F6-10D689E458EF}"/>
+                <a16:creationId xmlns:a16="http://schemas.microsoft.com/office/drawing/2014/main" xmlns="" id="{8C33534F-EA91-4A50-B0F6-10D689E458EF}"/>
               </a:ext>
             </a:extLst>
           </p:cNvPr>
@@ -10717,7 +10717,7 @@
           <a:p>
             <a:fld id="{3C04E684-10F4-4CC3-A0B9-F03AA7BE37CF}" type="datetimeFigureOut">
               <a:rPr lang="en-US" smtClean="0"/>
-              <a:t>12/3/2023</a:t>
+              <a:t>12/7/2023</a:t>
             </a:fld>
             <a:endParaRPr lang="en-US"/>
           </a:p>
@@ -10728,7 +10728,7 @@
           <p:cNvPr id="6" name="Footer Placeholder 5">
             <a:extLst>
               <a:ext uri="{FF2B5EF4-FFF2-40B4-BE49-F238E27FC236}">
-                <a16:creationId xmlns:a16="http://schemas.microsoft.com/office/drawing/2014/main" id="{6C20F3F7-8B4B-4015-AA9C-109D05B2F146}"/>
+                <a16:creationId xmlns:a16="http://schemas.microsoft.com/office/drawing/2014/main" xmlns="" id="{6C20F3F7-8B4B-4015-AA9C-109D05B2F146}"/>
               </a:ext>
             </a:extLst>
           </p:cNvPr>
@@ -10757,7 +10757,7 @@
           <p:cNvPr id="7" name="Slide Number Placeholder 6">
             <a:extLst>
               <a:ext uri="{FF2B5EF4-FFF2-40B4-BE49-F238E27FC236}">
-                <a16:creationId xmlns:a16="http://schemas.microsoft.com/office/drawing/2014/main" id="{910B6EE2-78A1-4D01-87BE-A1487FBD271F}"/>
+                <a16:creationId xmlns:a16="http://schemas.microsoft.com/office/drawing/2014/main" xmlns="" id="{910B6EE2-78A1-4D01-87BE-A1487FBD271F}"/>
               </a:ext>
             </a:extLst>
           </p:cNvPr>
@@ -10816,7 +10816,7 @@
           <p:cNvPr id="8" name="Graphic 1" descr="Tag=AccentColor&#10;Flavor=Light&#10;Target=Fill">
             <a:extLst>
               <a:ext uri="{FF2B5EF4-FFF2-40B4-BE49-F238E27FC236}">
-                <a16:creationId xmlns:a16="http://schemas.microsoft.com/office/drawing/2014/main" id="{0EE21C0F-70D8-4F3C-9392-07559C90EE6E}"/>
+                <a16:creationId xmlns:a16="http://schemas.microsoft.com/office/drawing/2014/main" xmlns="" id="{0EE21C0F-70D8-4F3C-9392-07559C90EE6E}"/>
               </a:ext>
             </a:extLst>
           </p:cNvPr>
@@ -13012,7 +13012,7 @@
           <p:cNvPr id="2" name="Title 1">
             <a:extLst>
               <a:ext uri="{FF2B5EF4-FFF2-40B4-BE49-F238E27FC236}">
-                <a16:creationId xmlns:a16="http://schemas.microsoft.com/office/drawing/2014/main" id="{48DB1DFE-8154-440D-93CF-FEF7860E897F}"/>
+                <a16:creationId xmlns:a16="http://schemas.microsoft.com/office/drawing/2014/main" xmlns="" id="{48DB1DFE-8154-440D-93CF-FEF7860E897F}"/>
               </a:ext>
             </a:extLst>
           </p:cNvPr>
@@ -13050,7 +13050,7 @@
           <p:cNvPr id="3" name="Picture Placeholder 2">
             <a:extLst>
               <a:ext uri="{FF2B5EF4-FFF2-40B4-BE49-F238E27FC236}">
-                <a16:creationId xmlns:a16="http://schemas.microsoft.com/office/drawing/2014/main" id="{9CD9D1F5-05CC-48F3-A314-315EF1703043}"/>
+                <a16:creationId xmlns:a16="http://schemas.microsoft.com/office/drawing/2014/main" xmlns="" id="{9CD9D1F5-05CC-48F3-A314-315EF1703043}"/>
               </a:ext>
             </a:extLst>
           </p:cNvPr>
@@ -13120,7 +13120,7 @@
           <p:cNvPr id="4" name="Text Placeholder 3">
             <a:extLst>
               <a:ext uri="{FF2B5EF4-FFF2-40B4-BE49-F238E27FC236}">
-                <a16:creationId xmlns:a16="http://schemas.microsoft.com/office/drawing/2014/main" id="{211807DE-1178-4BBB-89D8-9046239C2DE9}"/>
+                <a16:creationId xmlns:a16="http://schemas.microsoft.com/office/drawing/2014/main" xmlns="" id="{211807DE-1178-4BBB-89D8-9046239C2DE9}"/>
               </a:ext>
             </a:extLst>
           </p:cNvPr>
@@ -13193,7 +13193,7 @@
           <p:cNvPr id="5" name="Date Placeholder 4">
             <a:extLst>
               <a:ext uri="{FF2B5EF4-FFF2-40B4-BE49-F238E27FC236}">
-                <a16:creationId xmlns:a16="http://schemas.microsoft.com/office/drawing/2014/main" id="{3D48EA59-A1BC-48B7-9495-6D5C6035B14B}"/>
+                <a16:creationId xmlns:a16="http://schemas.microsoft.com/office/drawing/2014/main" xmlns="" id="{3D48EA59-A1BC-48B7-9495-6D5C6035B14B}"/>
               </a:ext>
             </a:extLst>
           </p:cNvPr>
@@ -13211,7 +13211,7 @@
           <a:p>
             <a:fld id="{3C04E684-10F4-4CC3-A0B9-F03AA7BE37CF}" type="datetimeFigureOut">
               <a:rPr lang="en-US" smtClean="0"/>
-              <a:t>12/3/2023</a:t>
+              <a:t>12/7/2023</a:t>
             </a:fld>
             <a:endParaRPr lang="en-US"/>
           </a:p>
@@ -13222,7 +13222,7 @@
           <p:cNvPr id="6" name="Footer Placeholder 5">
             <a:extLst>
               <a:ext uri="{FF2B5EF4-FFF2-40B4-BE49-F238E27FC236}">
-                <a16:creationId xmlns:a16="http://schemas.microsoft.com/office/drawing/2014/main" id="{49F85A72-B50F-440E-AAD3-53C099F6D9B6}"/>
+                <a16:creationId xmlns:a16="http://schemas.microsoft.com/office/drawing/2014/main" xmlns="" id="{49F85A72-B50F-440E-AAD3-53C099F6D9B6}"/>
               </a:ext>
             </a:extLst>
           </p:cNvPr>
@@ -13247,7 +13247,7 @@
           <p:cNvPr id="7" name="Slide Number Placeholder 6">
             <a:extLst>
               <a:ext uri="{FF2B5EF4-FFF2-40B4-BE49-F238E27FC236}">
-                <a16:creationId xmlns:a16="http://schemas.microsoft.com/office/drawing/2014/main" id="{72C2D00B-4207-4720-8C68-605CAFDD5CA2}"/>
+                <a16:creationId xmlns:a16="http://schemas.microsoft.com/office/drawing/2014/main" xmlns="" id="{72C2D00B-4207-4720-8C68-605CAFDD5CA2}"/>
               </a:ext>
             </a:extLst>
           </p:cNvPr>
@@ -13306,7 +13306,7 @@
           <p:cNvPr id="2" name="Title 1">
             <a:extLst>
               <a:ext uri="{FF2B5EF4-FFF2-40B4-BE49-F238E27FC236}">
-                <a16:creationId xmlns:a16="http://schemas.microsoft.com/office/drawing/2014/main" id="{101C888B-58B8-4428-8B1D-4E26FC5DD592}"/>
+                <a16:creationId xmlns:a16="http://schemas.microsoft.com/office/drawing/2014/main" xmlns="" id="{101C888B-58B8-4428-8B1D-4E26FC5DD592}"/>
               </a:ext>
             </a:extLst>
           </p:cNvPr>
@@ -13334,7 +13334,7 @@
           <p:cNvPr id="3" name="Vertical Text Placeholder 2">
             <a:extLst>
               <a:ext uri="{FF2B5EF4-FFF2-40B4-BE49-F238E27FC236}">
-                <a16:creationId xmlns:a16="http://schemas.microsoft.com/office/drawing/2014/main" id="{3314F67B-D516-42FA-A2CA-2DCD37CFE8D7}"/>
+                <a16:creationId xmlns:a16="http://schemas.microsoft.com/office/drawing/2014/main" xmlns="" id="{3314F67B-D516-42FA-A2CA-2DCD37CFE8D7}"/>
               </a:ext>
             </a:extLst>
           </p:cNvPr>
@@ -13391,7 +13391,7 @@
           <p:cNvPr id="4" name="Date Placeholder 3">
             <a:extLst>
               <a:ext uri="{FF2B5EF4-FFF2-40B4-BE49-F238E27FC236}">
-                <a16:creationId xmlns:a16="http://schemas.microsoft.com/office/drawing/2014/main" id="{F82BA5FF-4919-4FF8-9C04-06CE156B762F}"/>
+                <a16:creationId xmlns:a16="http://schemas.microsoft.com/office/drawing/2014/main" xmlns="" id="{F82BA5FF-4919-4FF8-9C04-06CE156B762F}"/>
               </a:ext>
             </a:extLst>
           </p:cNvPr>
@@ -13409,7 +13409,7 @@
           <a:p>
             <a:fld id="{3C04E684-10F4-4CC3-A0B9-F03AA7BE37CF}" type="datetimeFigureOut">
               <a:rPr lang="en-US" smtClean="0"/>
-              <a:t>12/3/2023</a:t>
+              <a:t>12/7/2023</a:t>
             </a:fld>
             <a:endParaRPr lang="en-US"/>
           </a:p>
@@ -13420,7 +13420,7 @@
           <p:cNvPr id="5" name="Footer Placeholder 4">
             <a:extLst>
               <a:ext uri="{FF2B5EF4-FFF2-40B4-BE49-F238E27FC236}">
-                <a16:creationId xmlns:a16="http://schemas.microsoft.com/office/drawing/2014/main" id="{CBEDA970-128E-4150-8E5A-A1B056E83502}"/>
+                <a16:creationId xmlns:a16="http://schemas.microsoft.com/office/drawing/2014/main" xmlns="" id="{CBEDA970-128E-4150-8E5A-A1B056E83502}"/>
               </a:ext>
             </a:extLst>
           </p:cNvPr>
@@ -13445,7 +13445,7 @@
           <p:cNvPr id="6" name="Slide Number Placeholder 5">
             <a:extLst>
               <a:ext uri="{FF2B5EF4-FFF2-40B4-BE49-F238E27FC236}">
-                <a16:creationId xmlns:a16="http://schemas.microsoft.com/office/drawing/2014/main" id="{EAEC6CD1-EE5E-42EF-B76D-BB803BA6AB5E}"/>
+                <a16:creationId xmlns:a16="http://schemas.microsoft.com/office/drawing/2014/main" xmlns="" id="{EAEC6CD1-EE5E-42EF-B76D-BB803BA6AB5E}"/>
               </a:ext>
             </a:extLst>
           </p:cNvPr>
@@ -13504,7 +13504,7 @@
           <p:cNvPr id="2" name="Vertical Title 1">
             <a:extLst>
               <a:ext uri="{FF2B5EF4-FFF2-40B4-BE49-F238E27FC236}">
-                <a16:creationId xmlns:a16="http://schemas.microsoft.com/office/drawing/2014/main" id="{550C2A1B-34CA-4877-9435-D77DF325757F}"/>
+                <a16:creationId xmlns:a16="http://schemas.microsoft.com/office/drawing/2014/main" xmlns="" id="{550C2A1B-34CA-4877-9435-D77DF325757F}"/>
               </a:ext>
             </a:extLst>
           </p:cNvPr>
@@ -13537,7 +13537,7 @@
           <p:cNvPr id="3" name="Vertical Text Placeholder 2">
             <a:extLst>
               <a:ext uri="{FF2B5EF4-FFF2-40B4-BE49-F238E27FC236}">
-                <a16:creationId xmlns:a16="http://schemas.microsoft.com/office/drawing/2014/main" id="{4F255E5E-4A81-44CC-8D99-F56E625D4632}"/>
+                <a16:creationId xmlns:a16="http://schemas.microsoft.com/office/drawing/2014/main" xmlns="" id="{4F255E5E-4A81-44CC-8D99-F56E625D4632}"/>
               </a:ext>
             </a:extLst>
           </p:cNvPr>
@@ -13599,7 +13599,7 @@
           <p:cNvPr id="4" name="Date Placeholder 3">
             <a:extLst>
               <a:ext uri="{FF2B5EF4-FFF2-40B4-BE49-F238E27FC236}">
-                <a16:creationId xmlns:a16="http://schemas.microsoft.com/office/drawing/2014/main" id="{819CEECF-A221-4ECC-AD9C-E197D516D24C}"/>
+                <a16:creationId xmlns:a16="http://schemas.microsoft.com/office/drawing/2014/main" xmlns="" id="{819CEECF-A221-4ECC-AD9C-E197D516D24C}"/>
               </a:ext>
             </a:extLst>
           </p:cNvPr>
@@ -13617,7 +13617,7 @@
           <a:p>
             <a:fld id="{3C04E684-10F4-4CC3-A0B9-F03AA7BE37CF}" type="datetimeFigureOut">
               <a:rPr lang="en-US" smtClean="0"/>
-              <a:t>12/3/2023</a:t>
+              <a:t>12/7/2023</a:t>
             </a:fld>
             <a:endParaRPr lang="en-US"/>
           </a:p>
@@ -13628,7 +13628,7 @@
           <p:cNvPr id="5" name="Footer Placeholder 4">
             <a:extLst>
               <a:ext uri="{FF2B5EF4-FFF2-40B4-BE49-F238E27FC236}">
-                <a16:creationId xmlns:a16="http://schemas.microsoft.com/office/drawing/2014/main" id="{018F41AE-0DDE-49ED-9F0C-E0E16F599A0E}"/>
+                <a16:creationId xmlns:a16="http://schemas.microsoft.com/office/drawing/2014/main" xmlns="" id="{018F41AE-0DDE-49ED-9F0C-E0E16F599A0E}"/>
               </a:ext>
             </a:extLst>
           </p:cNvPr>
@@ -13653,7 +13653,7 @@
           <p:cNvPr id="6" name="Slide Number Placeholder 5">
             <a:extLst>
               <a:ext uri="{FF2B5EF4-FFF2-40B4-BE49-F238E27FC236}">
-                <a16:creationId xmlns:a16="http://schemas.microsoft.com/office/drawing/2014/main" id="{B7B47FB7-77F0-4C43-B81E-D04B31C953DA}"/>
+                <a16:creationId xmlns:a16="http://schemas.microsoft.com/office/drawing/2014/main" xmlns="" id="{B7B47FB7-77F0-4C43-B81E-D04B31C953DA}"/>
               </a:ext>
             </a:extLst>
           </p:cNvPr>
@@ -13712,7 +13712,7 @@
           <p:cNvPr id="2" name="Title 1">
             <a:extLst>
               <a:ext uri="{FF2B5EF4-FFF2-40B4-BE49-F238E27FC236}">
-                <a16:creationId xmlns:a16="http://schemas.microsoft.com/office/drawing/2014/main" id="{A9B1446D-9FAC-4157-A41A-51675C8BE929}"/>
+                <a16:creationId xmlns:a16="http://schemas.microsoft.com/office/drawing/2014/main" xmlns="" id="{A9B1446D-9FAC-4157-A41A-51675C8BE929}"/>
               </a:ext>
             </a:extLst>
           </p:cNvPr>
@@ -13752,7 +13752,7 @@
           <p:cNvPr id="3" name="Text Placeholder 2">
             <a:extLst>
               <a:ext uri="{FF2B5EF4-FFF2-40B4-BE49-F238E27FC236}">
-                <a16:creationId xmlns:a16="http://schemas.microsoft.com/office/drawing/2014/main" id="{92AF8D4A-8F93-4399-9546-64F286400D24}"/>
+                <a16:creationId xmlns:a16="http://schemas.microsoft.com/office/drawing/2014/main" xmlns="" id="{92AF8D4A-8F93-4399-9546-64F286400D24}"/>
               </a:ext>
             </a:extLst>
           </p:cNvPr>
@@ -13875,7 +13875,7 @@
           <p:cNvPr id="4" name="Date Placeholder 3">
             <a:extLst>
               <a:ext uri="{FF2B5EF4-FFF2-40B4-BE49-F238E27FC236}">
-                <a16:creationId xmlns:a16="http://schemas.microsoft.com/office/drawing/2014/main" id="{819C2FD4-BF96-470C-8247-20DFAE1CF870}"/>
+                <a16:creationId xmlns:a16="http://schemas.microsoft.com/office/drawing/2014/main" xmlns="" id="{819C2FD4-BF96-470C-8247-20DFAE1CF870}"/>
               </a:ext>
             </a:extLst>
           </p:cNvPr>
@@ -13893,7 +13893,7 @@
           <a:p>
             <a:fld id="{CCD0C193-4974-4A1F-9C63-07D595E30D66}" type="datetime1">
               <a:rPr lang="en-US" smtClean="0"/>
-              <a:t>12/3/2023</a:t>
+              <a:t>12/7/2023</a:t>
             </a:fld>
             <a:endParaRPr lang="en-US"/>
           </a:p>
@@ -13904,7 +13904,7 @@
           <p:cNvPr id="5" name="Footer Placeholder 4">
             <a:extLst>
               <a:ext uri="{FF2B5EF4-FFF2-40B4-BE49-F238E27FC236}">
-                <a16:creationId xmlns:a16="http://schemas.microsoft.com/office/drawing/2014/main" id="{27175A2D-86C4-4467-BAB8-E9ED004D2C8B}"/>
+                <a16:creationId xmlns:a16="http://schemas.microsoft.com/office/drawing/2014/main" xmlns="" id="{27175A2D-86C4-4467-BAB8-E9ED004D2C8B}"/>
               </a:ext>
             </a:extLst>
           </p:cNvPr>
@@ -13929,7 +13929,7 @@
           <p:cNvPr id="6" name="Slide Number Placeholder 5">
             <a:extLst>
               <a:ext uri="{FF2B5EF4-FFF2-40B4-BE49-F238E27FC236}">
-                <a16:creationId xmlns:a16="http://schemas.microsoft.com/office/drawing/2014/main" id="{DE442A4D-D9B2-4C82-95E4-B86F9F5F3802}"/>
+                <a16:creationId xmlns:a16="http://schemas.microsoft.com/office/drawing/2014/main" xmlns="" id="{DE442A4D-D9B2-4C82-95E4-B86F9F5F3802}"/>
               </a:ext>
             </a:extLst>
           </p:cNvPr>
@@ -13988,7 +13988,7 @@
           <p:cNvPr id="2" name="Title 1">
             <a:extLst>
               <a:ext uri="{FF2B5EF4-FFF2-40B4-BE49-F238E27FC236}">
-                <a16:creationId xmlns:a16="http://schemas.microsoft.com/office/drawing/2014/main" id="{B0E6B3AA-8C30-429E-B934-AF12204387B9}"/>
+                <a16:creationId xmlns:a16="http://schemas.microsoft.com/office/drawing/2014/main" xmlns="" id="{B0E6B3AA-8C30-429E-B934-AF12204387B9}"/>
               </a:ext>
             </a:extLst>
           </p:cNvPr>
@@ -14017,7 +14017,7 @@
           <p:cNvPr id="3" name="Content Placeholder 2">
             <a:extLst>
               <a:ext uri="{FF2B5EF4-FFF2-40B4-BE49-F238E27FC236}">
-                <a16:creationId xmlns:a16="http://schemas.microsoft.com/office/drawing/2014/main" id="{E915834E-691F-4728-88F5-A0C4696695EB}"/>
+                <a16:creationId xmlns:a16="http://schemas.microsoft.com/office/drawing/2014/main" xmlns="" id="{E915834E-691F-4728-88F5-A0C4696695EB}"/>
               </a:ext>
             </a:extLst>
           </p:cNvPr>
@@ -14080,7 +14080,7 @@
           <p:cNvPr id="4" name="Content Placeholder 3">
             <a:extLst>
               <a:ext uri="{FF2B5EF4-FFF2-40B4-BE49-F238E27FC236}">
-                <a16:creationId xmlns:a16="http://schemas.microsoft.com/office/drawing/2014/main" id="{13876374-880F-4E25-9F88-79E3C1AB1F9D}"/>
+                <a16:creationId xmlns:a16="http://schemas.microsoft.com/office/drawing/2014/main" xmlns="" id="{13876374-880F-4E25-9F88-79E3C1AB1F9D}"/>
               </a:ext>
             </a:extLst>
           </p:cNvPr>
@@ -14142,7 +14142,7 @@
           <p:cNvPr id="5" name="Date Placeholder 4">
             <a:extLst>
               <a:ext uri="{FF2B5EF4-FFF2-40B4-BE49-F238E27FC236}">
-                <a16:creationId xmlns:a16="http://schemas.microsoft.com/office/drawing/2014/main" id="{6119BD69-B509-4FCE-95A8-ED03FFC8CC3C}"/>
+                <a16:creationId xmlns:a16="http://schemas.microsoft.com/office/drawing/2014/main" xmlns="" id="{6119BD69-B509-4FCE-95A8-ED03FFC8CC3C}"/>
               </a:ext>
             </a:extLst>
           </p:cNvPr>
@@ -14160,7 +14160,7 @@
           <a:p>
             <a:fld id="{701AA87F-28D4-4BF0-B81F-877A89DFD5AC}" type="datetime1">
               <a:rPr lang="en-US" smtClean="0"/>
-              <a:t>12/3/2023</a:t>
+              <a:t>12/7/2023</a:t>
             </a:fld>
             <a:endParaRPr lang="en-US"/>
           </a:p>
@@ -14171,7 +14171,7 @@
           <p:cNvPr id="6" name="Footer Placeholder 5">
             <a:extLst>
               <a:ext uri="{FF2B5EF4-FFF2-40B4-BE49-F238E27FC236}">
-                <a16:creationId xmlns:a16="http://schemas.microsoft.com/office/drawing/2014/main" id="{DB7C287B-AE5B-490B-BF81-A50D7A2E872A}"/>
+                <a16:creationId xmlns:a16="http://schemas.microsoft.com/office/drawing/2014/main" xmlns="" id="{DB7C287B-AE5B-490B-BF81-A50D7A2E872A}"/>
               </a:ext>
             </a:extLst>
           </p:cNvPr>
@@ -14196,7 +14196,7 @@
           <p:cNvPr id="7" name="Slide Number Placeholder 6">
             <a:extLst>
               <a:ext uri="{FF2B5EF4-FFF2-40B4-BE49-F238E27FC236}">
-                <a16:creationId xmlns:a16="http://schemas.microsoft.com/office/drawing/2014/main" id="{B43C2246-303C-4A29-B6EA-E62CEDE6C2A1}"/>
+                <a16:creationId xmlns:a16="http://schemas.microsoft.com/office/drawing/2014/main" xmlns="" id="{B43C2246-303C-4A29-B6EA-E62CEDE6C2A1}"/>
               </a:ext>
             </a:extLst>
           </p:cNvPr>
@@ -14255,7 +14255,7 @@
           <p:cNvPr id="2" name="Title 1">
             <a:extLst>
               <a:ext uri="{FF2B5EF4-FFF2-40B4-BE49-F238E27FC236}">
-                <a16:creationId xmlns:a16="http://schemas.microsoft.com/office/drawing/2014/main" id="{2E42FE79-D5BE-43E8-B6C5-2675B7F4D818}"/>
+                <a16:creationId xmlns:a16="http://schemas.microsoft.com/office/drawing/2014/main" xmlns="" id="{2E42FE79-D5BE-43E8-B6C5-2675B7F4D818}"/>
               </a:ext>
             </a:extLst>
           </p:cNvPr>
@@ -14289,7 +14289,7 @@
           <p:cNvPr id="3" name="Text Placeholder 2">
             <a:extLst>
               <a:ext uri="{FF2B5EF4-FFF2-40B4-BE49-F238E27FC236}">
-                <a16:creationId xmlns:a16="http://schemas.microsoft.com/office/drawing/2014/main" id="{F69D3A07-BA51-4113-902E-830A887D2394}"/>
+                <a16:creationId xmlns:a16="http://schemas.microsoft.com/office/drawing/2014/main" xmlns="" id="{F69D3A07-BA51-4113-902E-830A887D2394}"/>
               </a:ext>
             </a:extLst>
           </p:cNvPr>
@@ -14360,7 +14360,7 @@
           <p:cNvPr id="4" name="Content Placeholder 3">
             <a:extLst>
               <a:ext uri="{FF2B5EF4-FFF2-40B4-BE49-F238E27FC236}">
-                <a16:creationId xmlns:a16="http://schemas.microsoft.com/office/drawing/2014/main" id="{28E320A9-E274-4E1B-B02D-9A3F510A1F22}"/>
+                <a16:creationId xmlns:a16="http://schemas.microsoft.com/office/drawing/2014/main" xmlns="" id="{28E320A9-E274-4E1B-B02D-9A3F510A1F22}"/>
               </a:ext>
             </a:extLst>
           </p:cNvPr>
@@ -14423,7 +14423,7 @@
           <p:cNvPr id="5" name="Text Placeholder 4">
             <a:extLst>
               <a:ext uri="{FF2B5EF4-FFF2-40B4-BE49-F238E27FC236}">
-                <a16:creationId xmlns:a16="http://schemas.microsoft.com/office/drawing/2014/main" id="{DBE80D3A-C2A8-4B78-B7E2-4908C74B1C43}"/>
+                <a16:creationId xmlns:a16="http://schemas.microsoft.com/office/drawing/2014/main" xmlns="" id="{DBE80D3A-C2A8-4B78-B7E2-4908C74B1C43}"/>
               </a:ext>
             </a:extLst>
           </p:cNvPr>
@@ -14494,7 +14494,7 @@
           <p:cNvPr id="6" name="Content Placeholder 5">
             <a:extLst>
               <a:ext uri="{FF2B5EF4-FFF2-40B4-BE49-F238E27FC236}">
-                <a16:creationId xmlns:a16="http://schemas.microsoft.com/office/drawing/2014/main" id="{FC5D84DD-9460-4B08-86AD-27486A940047}"/>
+                <a16:creationId xmlns:a16="http://schemas.microsoft.com/office/drawing/2014/main" xmlns="" id="{FC5D84DD-9460-4B08-86AD-27486A940047}"/>
               </a:ext>
             </a:extLst>
           </p:cNvPr>
@@ -14556,7 +14556,7 @@
           <p:cNvPr id="7" name="Date Placeholder 6">
             <a:extLst>
               <a:ext uri="{FF2B5EF4-FFF2-40B4-BE49-F238E27FC236}">
-                <a16:creationId xmlns:a16="http://schemas.microsoft.com/office/drawing/2014/main" id="{E4B0B7F8-282C-4210-AE7D-F35228BAC803}"/>
+                <a16:creationId xmlns:a16="http://schemas.microsoft.com/office/drawing/2014/main" xmlns="" id="{E4B0B7F8-282C-4210-AE7D-F35228BAC803}"/>
               </a:ext>
             </a:extLst>
           </p:cNvPr>
@@ -14574,7 +14574,7 @@
           <a:p>
             <a:fld id="{A8A9F1F3-208B-49A3-B337-9C8ACEB3E0E1}" type="datetime1">
               <a:rPr lang="en-US" smtClean="0"/>
-              <a:t>12/3/2023</a:t>
+              <a:t>12/7/2023</a:t>
             </a:fld>
             <a:endParaRPr lang="en-US"/>
           </a:p>
@@ -14585,7 +14585,7 @@
           <p:cNvPr id="8" name="Footer Placeholder 7">
             <a:extLst>
               <a:ext uri="{FF2B5EF4-FFF2-40B4-BE49-F238E27FC236}">
-                <a16:creationId xmlns:a16="http://schemas.microsoft.com/office/drawing/2014/main" id="{FAE343A9-1067-4DCF-BACC-1F7F38050226}"/>
+                <a16:creationId xmlns:a16="http://schemas.microsoft.com/office/drawing/2014/main" xmlns="" id="{FAE343A9-1067-4DCF-BACC-1F7F38050226}"/>
               </a:ext>
             </a:extLst>
           </p:cNvPr>
@@ -14610,7 +14610,7 @@
           <p:cNvPr id="9" name="Slide Number Placeholder 8">
             <a:extLst>
               <a:ext uri="{FF2B5EF4-FFF2-40B4-BE49-F238E27FC236}">
-                <a16:creationId xmlns:a16="http://schemas.microsoft.com/office/drawing/2014/main" id="{0F84E471-04DB-4DB5-8CC5-16B3FC88509D}"/>
+                <a16:creationId xmlns:a16="http://schemas.microsoft.com/office/drawing/2014/main" xmlns="" id="{0F84E471-04DB-4DB5-8CC5-16B3FC88509D}"/>
               </a:ext>
             </a:extLst>
           </p:cNvPr>
@@ -14669,7 +14669,7 @@
           <p:cNvPr id="2" name="Title 1">
             <a:extLst>
               <a:ext uri="{FF2B5EF4-FFF2-40B4-BE49-F238E27FC236}">
-                <a16:creationId xmlns:a16="http://schemas.microsoft.com/office/drawing/2014/main" id="{766D87C0-272E-4E50-A316-78079B2B923E}"/>
+                <a16:creationId xmlns:a16="http://schemas.microsoft.com/office/drawing/2014/main" xmlns="" id="{766D87C0-272E-4E50-A316-78079B2B923E}"/>
               </a:ext>
             </a:extLst>
           </p:cNvPr>
@@ -14703,7 +14703,7 @@
           <p:cNvPr id="3" name="Date Placeholder 2">
             <a:extLst>
               <a:ext uri="{FF2B5EF4-FFF2-40B4-BE49-F238E27FC236}">
-                <a16:creationId xmlns:a16="http://schemas.microsoft.com/office/drawing/2014/main" id="{F906C1C9-1F69-432A-858C-D828B56E1659}"/>
+                <a16:creationId xmlns:a16="http://schemas.microsoft.com/office/drawing/2014/main" xmlns="" id="{F906C1C9-1F69-432A-858C-D828B56E1659}"/>
               </a:ext>
             </a:extLst>
           </p:cNvPr>
@@ -14721,7 +14721,7 @@
           <a:p>
             <a:fld id="{27AF6CA6-7293-4AA2-A0E0-A3BF4416E786}" type="datetime1">
               <a:rPr lang="en-US" smtClean="0"/>
-              <a:t>12/3/2023</a:t>
+              <a:t>12/7/2023</a:t>
             </a:fld>
             <a:endParaRPr lang="en-US"/>
           </a:p>
@@ -14732,7 +14732,7 @@
           <p:cNvPr id="4" name="Footer Placeholder 3">
             <a:extLst>
               <a:ext uri="{FF2B5EF4-FFF2-40B4-BE49-F238E27FC236}">
-                <a16:creationId xmlns:a16="http://schemas.microsoft.com/office/drawing/2014/main" id="{BD6D9A1B-D149-4B97-B161-3D7C9ADBCF78}"/>
+                <a16:creationId xmlns:a16="http://schemas.microsoft.com/office/drawing/2014/main" xmlns="" id="{BD6D9A1B-D149-4B97-B161-3D7C9ADBCF78}"/>
               </a:ext>
             </a:extLst>
           </p:cNvPr>
@@ -14757,7 +14757,7 @@
           <p:cNvPr id="5" name="Slide Number Placeholder 4">
             <a:extLst>
               <a:ext uri="{FF2B5EF4-FFF2-40B4-BE49-F238E27FC236}">
-                <a16:creationId xmlns:a16="http://schemas.microsoft.com/office/drawing/2014/main" id="{7AB3722F-8C88-4E54-8CD6-12D31A05F813}"/>
+                <a16:creationId xmlns:a16="http://schemas.microsoft.com/office/drawing/2014/main" xmlns="" id="{7AB3722F-8C88-4E54-8CD6-12D31A05F813}"/>
               </a:ext>
             </a:extLst>
           </p:cNvPr>
@@ -14816,7 +14816,7 @@
           <p:cNvPr id="2" name="Date Placeholder 1">
             <a:extLst>
               <a:ext uri="{FF2B5EF4-FFF2-40B4-BE49-F238E27FC236}">
-                <a16:creationId xmlns:a16="http://schemas.microsoft.com/office/drawing/2014/main" id="{C0E1B4EE-6DFC-45F3-9174-D913EB57CB9D}"/>
+                <a16:creationId xmlns:a16="http://schemas.microsoft.com/office/drawing/2014/main" xmlns="" id="{C0E1B4EE-6DFC-45F3-9174-D913EB57CB9D}"/>
               </a:ext>
             </a:extLst>
           </p:cNvPr>
@@ -14834,7 +14834,7 @@
           <a:p>
             <a:fld id="{98D87016-7BCD-46FB-8EE3-AB6C369108B4}" type="datetime1">
               <a:rPr lang="en-US" smtClean="0"/>
-              <a:t>12/3/2023</a:t>
+              <a:t>12/7/2023</a:t>
             </a:fld>
             <a:endParaRPr lang="en-US"/>
           </a:p>
@@ -14845,7 +14845,7 @@
           <p:cNvPr id="3" name="Footer Placeholder 2">
             <a:extLst>
               <a:ext uri="{FF2B5EF4-FFF2-40B4-BE49-F238E27FC236}">
-                <a16:creationId xmlns:a16="http://schemas.microsoft.com/office/drawing/2014/main" id="{0BF7F7DC-6DDE-4337-AD27-BBE7D5422483}"/>
+                <a16:creationId xmlns:a16="http://schemas.microsoft.com/office/drawing/2014/main" xmlns="" id="{0BF7F7DC-6DDE-4337-AD27-BBE7D5422483}"/>
               </a:ext>
             </a:extLst>
           </p:cNvPr>
@@ -14870,7 +14870,7 @@
           <p:cNvPr id="4" name="Slide Number Placeholder 3">
             <a:extLst>
               <a:ext uri="{FF2B5EF4-FFF2-40B4-BE49-F238E27FC236}">
-                <a16:creationId xmlns:a16="http://schemas.microsoft.com/office/drawing/2014/main" id="{CCC58EA9-3AC4-421E-B133-1FA7757DF8BA}"/>
+                <a16:creationId xmlns:a16="http://schemas.microsoft.com/office/drawing/2014/main" xmlns="" id="{CCC58EA9-3AC4-421E-B133-1FA7757DF8BA}"/>
               </a:ext>
             </a:extLst>
           </p:cNvPr>
@@ -14929,7 +14929,7 @@
           <p:cNvPr id="2" name="Title 1">
             <a:extLst>
               <a:ext uri="{FF2B5EF4-FFF2-40B4-BE49-F238E27FC236}">
-                <a16:creationId xmlns:a16="http://schemas.microsoft.com/office/drawing/2014/main" id="{B9E035BB-74CC-43E9-B71F-A5C05D17EB78}"/>
+                <a16:creationId xmlns:a16="http://schemas.microsoft.com/office/drawing/2014/main" xmlns="" id="{B9E035BB-74CC-43E9-B71F-A5C05D17EB78}"/>
               </a:ext>
             </a:extLst>
           </p:cNvPr>
@@ -14969,7 +14969,7 @@
           <p:cNvPr id="3" name="Content Placeholder 2">
             <a:extLst>
               <a:ext uri="{FF2B5EF4-FFF2-40B4-BE49-F238E27FC236}">
-                <a16:creationId xmlns:a16="http://schemas.microsoft.com/office/drawing/2014/main" id="{DCAADC9E-7845-4DB1-87E3-6FBFB2B03B8A}"/>
+                <a16:creationId xmlns:a16="http://schemas.microsoft.com/office/drawing/2014/main" xmlns="" id="{DCAADC9E-7845-4DB1-87E3-6FBFB2B03B8A}"/>
               </a:ext>
             </a:extLst>
           </p:cNvPr>
@@ -15062,7 +15062,7 @@
           <p:cNvPr id="4" name="Text Placeholder 3">
             <a:extLst>
               <a:ext uri="{FF2B5EF4-FFF2-40B4-BE49-F238E27FC236}">
-                <a16:creationId xmlns:a16="http://schemas.microsoft.com/office/drawing/2014/main" id="{75C925A8-2A07-43B9-B549-061F3684986B}"/>
+                <a16:creationId xmlns:a16="http://schemas.microsoft.com/office/drawing/2014/main" xmlns="" id="{75C925A8-2A07-43B9-B549-061F3684986B}"/>
               </a:ext>
             </a:extLst>
           </p:cNvPr>
@@ -15135,7 +15135,7 @@
           <p:cNvPr id="5" name="Date Placeholder 4">
             <a:extLst>
               <a:ext uri="{FF2B5EF4-FFF2-40B4-BE49-F238E27FC236}">
-                <a16:creationId xmlns:a16="http://schemas.microsoft.com/office/drawing/2014/main" id="{F31A9037-0564-43A1-8156-1D9932E1F85F}"/>
+                <a16:creationId xmlns:a16="http://schemas.microsoft.com/office/drawing/2014/main" xmlns="" id="{F31A9037-0564-43A1-8156-1D9932E1F85F}"/>
               </a:ext>
             </a:extLst>
           </p:cNvPr>
@@ -15153,7 +15153,7 @@
           <a:p>
             <a:fld id="{A1547011-1FFC-4EF8-9A2E-53B4AD2ADBD4}" type="datetime1">
               <a:rPr lang="en-US" smtClean="0"/>
-              <a:t>12/3/2023</a:t>
+              <a:t>12/7/2023</a:t>
             </a:fld>
             <a:endParaRPr lang="en-US"/>
           </a:p>
@@ -15164,7 +15164,7 @@
           <p:cNvPr id="6" name="Footer Placeholder 5">
             <a:extLst>
               <a:ext uri="{FF2B5EF4-FFF2-40B4-BE49-F238E27FC236}">
-                <a16:creationId xmlns:a16="http://schemas.microsoft.com/office/drawing/2014/main" id="{CBFF0D40-D0E1-49C9-BE47-91BBC50AB2BE}"/>
+                <a16:creationId xmlns:a16="http://schemas.microsoft.com/office/drawing/2014/main" xmlns="" id="{CBFF0D40-D0E1-49C9-BE47-91BBC50AB2BE}"/>
               </a:ext>
             </a:extLst>
           </p:cNvPr>
@@ -15189,7 +15189,7 @@
           <p:cNvPr id="7" name="Slide Number Placeholder 6">
             <a:extLst>
               <a:ext uri="{FF2B5EF4-FFF2-40B4-BE49-F238E27FC236}">
-                <a16:creationId xmlns:a16="http://schemas.microsoft.com/office/drawing/2014/main" id="{C4D129BD-890D-412E-9805-D29F4A0D3622}"/>
+                <a16:creationId xmlns:a16="http://schemas.microsoft.com/office/drawing/2014/main" xmlns="" id="{C4D129BD-890D-412E-9805-D29F4A0D3622}"/>
               </a:ext>
             </a:extLst>
           </p:cNvPr>
@@ -15248,7 +15248,7 @@
           <p:cNvPr id="2" name="Title 1">
             <a:extLst>
               <a:ext uri="{FF2B5EF4-FFF2-40B4-BE49-F238E27FC236}">
-                <a16:creationId xmlns:a16="http://schemas.microsoft.com/office/drawing/2014/main" id="{1D78ADB4-BA7B-42C2-9C6C-58B2763F8617}"/>
+                <a16:creationId xmlns:a16="http://schemas.microsoft.com/office/drawing/2014/main" xmlns="" id="{1D78ADB4-BA7B-42C2-9C6C-58B2763F8617}"/>
               </a:ext>
             </a:extLst>
           </p:cNvPr>
@@ -15286,7 +15286,7 @@
           <p:cNvPr id="3" name="Picture Placeholder 2">
             <a:extLst>
               <a:ext uri="{FF2B5EF4-FFF2-40B4-BE49-F238E27FC236}">
-                <a16:creationId xmlns:a16="http://schemas.microsoft.com/office/drawing/2014/main" id="{E9519B58-B546-4E6B-BE00-3D1D64DA8699}"/>
+                <a16:creationId xmlns:a16="http://schemas.microsoft.com/office/drawing/2014/main" xmlns="" id="{E9519B58-B546-4E6B-BE00-3D1D64DA8699}"/>
               </a:ext>
             </a:extLst>
           </p:cNvPr>
@@ -15357,7 +15357,7 @@
           <p:cNvPr id="4" name="Text Placeholder 3">
             <a:extLst>
               <a:ext uri="{FF2B5EF4-FFF2-40B4-BE49-F238E27FC236}">
-                <a16:creationId xmlns:a16="http://schemas.microsoft.com/office/drawing/2014/main" id="{3FAA0AB8-41A9-4548-9B83-3EFF79A00793}"/>
+                <a16:creationId xmlns:a16="http://schemas.microsoft.com/office/drawing/2014/main" xmlns="" id="{3FAA0AB8-41A9-4548-9B83-3EFF79A00793}"/>
               </a:ext>
             </a:extLst>
           </p:cNvPr>
@@ -15430,7 +15430,7 @@
           <p:cNvPr id="5" name="Date Placeholder 4">
             <a:extLst>
               <a:ext uri="{FF2B5EF4-FFF2-40B4-BE49-F238E27FC236}">
-                <a16:creationId xmlns:a16="http://schemas.microsoft.com/office/drawing/2014/main" id="{63BB33ED-A015-4992-A004-33D41CFFADA1}"/>
+                <a16:creationId xmlns:a16="http://schemas.microsoft.com/office/drawing/2014/main" xmlns="" id="{63BB33ED-A015-4992-A004-33D41CFFADA1}"/>
               </a:ext>
             </a:extLst>
           </p:cNvPr>
@@ -15448,7 +15448,7 @@
           <a:p>
             <a:fld id="{9562EB47-45B4-4EF5-A743-B4885DD2F060}" type="datetime1">
               <a:rPr lang="en-US" smtClean="0"/>
-              <a:t>12/3/2023</a:t>
+              <a:t>12/7/2023</a:t>
             </a:fld>
             <a:endParaRPr lang="en-US"/>
           </a:p>
@@ -15459,7 +15459,7 @@
           <p:cNvPr id="6" name="Footer Placeholder 5">
             <a:extLst>
               <a:ext uri="{FF2B5EF4-FFF2-40B4-BE49-F238E27FC236}">
-                <a16:creationId xmlns:a16="http://schemas.microsoft.com/office/drawing/2014/main" id="{D3C29CDA-E85F-47D1-83B7-02A50DEBFD3F}"/>
+                <a16:creationId xmlns:a16="http://schemas.microsoft.com/office/drawing/2014/main" xmlns="" id="{D3C29CDA-E85F-47D1-83B7-02A50DEBFD3F}"/>
               </a:ext>
             </a:extLst>
           </p:cNvPr>
@@ -15484,7 +15484,7 @@
           <p:cNvPr id="7" name="Slide Number Placeholder 6">
             <a:extLst>
               <a:ext uri="{FF2B5EF4-FFF2-40B4-BE49-F238E27FC236}">
-                <a16:creationId xmlns:a16="http://schemas.microsoft.com/office/drawing/2014/main" id="{1749625F-5352-4136-8AC4-F8899D00A1A9}"/>
+                <a16:creationId xmlns:a16="http://schemas.microsoft.com/office/drawing/2014/main" xmlns="" id="{1749625F-5352-4136-8AC4-F8899D00A1A9}"/>
               </a:ext>
             </a:extLst>
           </p:cNvPr>
@@ -15548,7 +15548,7 @@
           <p:cNvPr id="39" name="Rectangle 38">
             <a:extLst>
               <a:ext uri="{FF2B5EF4-FFF2-40B4-BE49-F238E27FC236}">
-                <a16:creationId xmlns:a16="http://schemas.microsoft.com/office/drawing/2014/main" id="{99B5B3C5-A599-465B-B2B9-866E8B2087CE}"/>
+                <a16:creationId xmlns:a16="http://schemas.microsoft.com/office/drawing/2014/main" xmlns="" id="{99B5B3C5-A599-465B-B2B9-866E8B2087CE}"/>
               </a:ext>
             </a:extLst>
           </p:cNvPr>
@@ -15597,7 +15597,7 @@
           <p:cNvPr id="41" name="Rectangle 40">
             <a:extLst>
               <a:ext uri="{FF2B5EF4-FFF2-40B4-BE49-F238E27FC236}">
-                <a16:creationId xmlns:a16="http://schemas.microsoft.com/office/drawing/2014/main" id="{25C84982-7DD0-43B1-8A2D-BFA4DF1B4E60}"/>
+                <a16:creationId xmlns:a16="http://schemas.microsoft.com/office/drawing/2014/main" xmlns="" id="{25C84982-7DD0-43B1-8A2D-BFA4DF1B4E60}"/>
               </a:ext>
             </a:extLst>
           </p:cNvPr>
@@ -15654,7 +15654,7 @@
           <p:cNvPr id="8" name="Decorative Circles">
             <a:extLst>
               <a:ext uri="{FF2B5EF4-FFF2-40B4-BE49-F238E27FC236}">
-                <a16:creationId xmlns:a16="http://schemas.microsoft.com/office/drawing/2014/main" id="{1D912E1C-3BBA-42F0-A3EE-FEC382E7230A}"/>
+                <a16:creationId xmlns:a16="http://schemas.microsoft.com/office/drawing/2014/main" xmlns="" id="{1D912E1C-3BBA-42F0-A3EE-FEC382E7230A}"/>
               </a:ext>
             </a:extLst>
           </p:cNvPr>
@@ -15674,7 +15674,7 @@
             <p:cNvPr id="21" name="Oval 20">
               <a:extLst>
                 <a:ext uri="{FF2B5EF4-FFF2-40B4-BE49-F238E27FC236}">
-                  <a16:creationId xmlns:a16="http://schemas.microsoft.com/office/drawing/2014/main" id="{2FEEAC76-E273-46A8-8F8E-CE59860FE70D}"/>
+                  <a16:creationId xmlns:a16="http://schemas.microsoft.com/office/drawing/2014/main" xmlns="" id="{2FEEAC76-E273-46A8-8F8E-CE59860FE70D}"/>
                 </a:ext>
               </a:extLst>
             </p:cNvPr>
@@ -15730,7 +15730,7 @@
             <p:cNvPr id="25" name="Oval 24">
               <a:extLst>
                 <a:ext uri="{FF2B5EF4-FFF2-40B4-BE49-F238E27FC236}">
-                  <a16:creationId xmlns:a16="http://schemas.microsoft.com/office/drawing/2014/main" id="{76594A0E-9400-45AD-A431-1DA1C0B28966}"/>
+                  <a16:creationId xmlns:a16="http://schemas.microsoft.com/office/drawing/2014/main" xmlns="" id="{76594A0E-9400-45AD-A431-1DA1C0B28966}"/>
                 </a:ext>
               </a:extLst>
             </p:cNvPr>
@@ -15784,7 +15784,7 @@
             <p:cNvPr id="31" name="Oval 30">
               <a:extLst>
                 <a:ext uri="{FF2B5EF4-FFF2-40B4-BE49-F238E27FC236}">
-                  <a16:creationId xmlns:a16="http://schemas.microsoft.com/office/drawing/2014/main" id="{20916D6C-D32F-42B6-8512-CD5EDB8F2B9B}"/>
+                  <a16:creationId xmlns:a16="http://schemas.microsoft.com/office/drawing/2014/main" xmlns="" id="{20916D6C-D32F-42B6-8512-CD5EDB8F2B9B}"/>
                 </a:ext>
               </a:extLst>
             </p:cNvPr>
@@ -15840,7 +15840,7 @@
             <p:cNvPr id="7" name="Oval 6">
               <a:extLst>
                 <a:ext uri="{FF2B5EF4-FFF2-40B4-BE49-F238E27FC236}">
-                  <a16:creationId xmlns:a16="http://schemas.microsoft.com/office/drawing/2014/main" id="{3834846D-59C6-40F4-907C-F1A4689B58F1}"/>
+                  <a16:creationId xmlns:a16="http://schemas.microsoft.com/office/drawing/2014/main" xmlns="" id="{3834846D-59C6-40F4-907C-F1A4689B58F1}"/>
                 </a:ext>
               </a:extLst>
             </p:cNvPr>
@@ -15894,7 +15894,7 @@
             <p:cNvPr id="47" name="Oval 46">
               <a:extLst>
                 <a:ext uri="{FF2B5EF4-FFF2-40B4-BE49-F238E27FC236}">
-                  <a16:creationId xmlns:a16="http://schemas.microsoft.com/office/drawing/2014/main" id="{5A257CDF-2E36-4DC7-8EE4-5CD8F8ECAC87}"/>
+                  <a16:creationId xmlns:a16="http://schemas.microsoft.com/office/drawing/2014/main" xmlns="" id="{5A257CDF-2E36-4DC7-8EE4-5CD8F8ECAC87}"/>
                 </a:ext>
               </a:extLst>
             </p:cNvPr>
@@ -15950,7 +15950,7 @@
             <p:cNvPr id="48" name="Oval 47">
               <a:extLst>
                 <a:ext uri="{FF2B5EF4-FFF2-40B4-BE49-F238E27FC236}">
-                  <a16:creationId xmlns:a16="http://schemas.microsoft.com/office/drawing/2014/main" id="{D5B26E0E-A115-4AE2-82D8-76BB93CC494F}"/>
+                  <a16:creationId xmlns:a16="http://schemas.microsoft.com/office/drawing/2014/main" xmlns="" id="{D5B26E0E-A115-4AE2-82D8-76BB93CC494F}"/>
                 </a:ext>
               </a:extLst>
             </p:cNvPr>
@@ -16002,7 +16002,7 @@
             <p:cNvPr id="49" name="Oval 48">
               <a:extLst>
                 <a:ext uri="{FF2B5EF4-FFF2-40B4-BE49-F238E27FC236}">
-                  <a16:creationId xmlns:a16="http://schemas.microsoft.com/office/drawing/2014/main" id="{755058DB-7E01-4E95-BF59-983AA1BBB38E}"/>
+                  <a16:creationId xmlns:a16="http://schemas.microsoft.com/office/drawing/2014/main" xmlns="" id="{755058DB-7E01-4E95-BF59-983AA1BBB38E}"/>
                 </a:ext>
               </a:extLst>
             </p:cNvPr>
@@ -16056,7 +16056,7 @@
             <p:cNvPr id="51" name="Oval 50">
               <a:extLst>
                 <a:ext uri="{FF2B5EF4-FFF2-40B4-BE49-F238E27FC236}">
-                  <a16:creationId xmlns:a16="http://schemas.microsoft.com/office/drawing/2014/main" id="{A810F7E2-23F3-44D6-B09E-71E556536052}"/>
+                  <a16:creationId xmlns:a16="http://schemas.microsoft.com/office/drawing/2014/main" xmlns="" id="{A810F7E2-23F3-44D6-B09E-71E556536052}"/>
                 </a:ext>
               </a:extLst>
             </p:cNvPr>
@@ -16108,7 +16108,7 @@
             <p:cNvPr id="52" name="Oval 51">
               <a:extLst>
                 <a:ext uri="{FF2B5EF4-FFF2-40B4-BE49-F238E27FC236}">
-                  <a16:creationId xmlns:a16="http://schemas.microsoft.com/office/drawing/2014/main" id="{59D5C391-E1DB-410A-A78C-ED3BBDFF0758}"/>
+                  <a16:creationId xmlns:a16="http://schemas.microsoft.com/office/drawing/2014/main" xmlns="" id="{59D5C391-E1DB-410A-A78C-ED3BBDFF0758}"/>
                 </a:ext>
               </a:extLst>
             </p:cNvPr>
@@ -16163,7 +16163,7 @@
             <p:cNvPr id="53" name="Oval 52">
               <a:extLst>
                 <a:ext uri="{FF2B5EF4-FFF2-40B4-BE49-F238E27FC236}">
-                  <a16:creationId xmlns:a16="http://schemas.microsoft.com/office/drawing/2014/main" id="{77C4944D-9373-4283-BCAA-927A0316659E}"/>
+                  <a16:creationId xmlns:a16="http://schemas.microsoft.com/office/drawing/2014/main" xmlns="" id="{77C4944D-9373-4283-BCAA-927A0316659E}"/>
                 </a:ext>
               </a:extLst>
             </p:cNvPr>
@@ -16218,7 +16218,7 @@
             <p:cNvPr id="54" name="Freeform: Shape 53">
               <a:extLst>
                 <a:ext uri="{FF2B5EF4-FFF2-40B4-BE49-F238E27FC236}">
-                  <a16:creationId xmlns:a16="http://schemas.microsoft.com/office/drawing/2014/main" id="{6804C521-2D9F-4CE4-AFD3-D4F1551FEC6A}"/>
+                  <a16:creationId xmlns:a16="http://schemas.microsoft.com/office/drawing/2014/main" xmlns="" id="{6804C521-2D9F-4CE4-AFD3-D4F1551FEC6A}"/>
                 </a:ext>
               </a:extLst>
             </p:cNvPr>
@@ -16369,7 +16369,7 @@
             <p:cNvPr id="56" name="Freeform: Shape 55">
               <a:extLst>
                 <a:ext uri="{FF2B5EF4-FFF2-40B4-BE49-F238E27FC236}">
-                  <a16:creationId xmlns:a16="http://schemas.microsoft.com/office/drawing/2014/main" id="{755AC65C-13EF-4182-AA3C-62BE165CC033}"/>
+                  <a16:creationId xmlns:a16="http://schemas.microsoft.com/office/drawing/2014/main" xmlns="" id="{755AC65C-13EF-4182-AA3C-62BE165CC033}"/>
                 </a:ext>
               </a:extLst>
             </p:cNvPr>
@@ -16504,7 +16504,7 @@
             <p:cNvPr id="58" name="Freeform: Shape 57">
               <a:extLst>
                 <a:ext uri="{FF2B5EF4-FFF2-40B4-BE49-F238E27FC236}">
-                  <a16:creationId xmlns:a16="http://schemas.microsoft.com/office/drawing/2014/main" id="{E40DA8D2-FA4B-4282-9D44-48C27B63A153}"/>
+                  <a16:creationId xmlns:a16="http://schemas.microsoft.com/office/drawing/2014/main" xmlns="" id="{E40DA8D2-FA4B-4282-9D44-48C27B63A153}"/>
                 </a:ext>
               </a:extLst>
             </p:cNvPr>
@@ -16621,7 +16621,7 @@
             <p:cNvPr id="10" name="Oval 9">
               <a:extLst>
                 <a:ext uri="{FF2B5EF4-FFF2-40B4-BE49-F238E27FC236}">
-                  <a16:creationId xmlns:a16="http://schemas.microsoft.com/office/drawing/2014/main" id="{99065014-CB18-414D-A527-31ECC45700AB}"/>
+                  <a16:creationId xmlns:a16="http://schemas.microsoft.com/office/drawing/2014/main" xmlns="" id="{99065014-CB18-414D-A527-31ECC45700AB}"/>
                 </a:ext>
               </a:extLst>
             </p:cNvPr>
@@ -16671,7 +16671,7 @@
             <p:cNvPr id="61" name="Freeform: Shape 60">
               <a:extLst>
                 <a:ext uri="{FF2B5EF4-FFF2-40B4-BE49-F238E27FC236}">
-                  <a16:creationId xmlns:a16="http://schemas.microsoft.com/office/drawing/2014/main" id="{8F39E27A-56C1-4328-8DF1-2DA147C78483}"/>
+                  <a16:creationId xmlns:a16="http://schemas.microsoft.com/office/drawing/2014/main" xmlns="" id="{8F39E27A-56C1-4328-8DF1-2DA147C78483}"/>
                 </a:ext>
               </a:extLst>
             </p:cNvPr>
@@ -16797,7 +16797,7 @@
           <p:cNvPr id="4" name="Date Placeholder 3">
             <a:extLst>
               <a:ext uri="{FF2B5EF4-FFF2-40B4-BE49-F238E27FC236}">
-                <a16:creationId xmlns:a16="http://schemas.microsoft.com/office/drawing/2014/main" id="{442C5EC6-E331-4312-AC12-56D55F7D2B15}"/>
+                <a16:creationId xmlns:a16="http://schemas.microsoft.com/office/drawing/2014/main" xmlns="" id="{442C5EC6-E331-4312-AC12-56D55F7D2B15}"/>
               </a:ext>
             </a:extLst>
           </p:cNvPr>
@@ -16833,7 +16833,7 @@
           <a:p>
             <a:fld id="{4A8D24A4-5FEC-4062-8995-EB21925B3B40}" type="datetime1">
               <a:rPr lang="en-US" smtClean="0"/>
-              <a:t>12/3/2023</a:t>
+              <a:t>12/7/2023</a:t>
             </a:fld>
             <a:endParaRPr lang="en-US" sz="1000" dirty="0"/>
           </a:p>
@@ -16844,7 +16844,7 @@
           <p:cNvPr id="5" name="Footer Placeholder 4">
             <a:extLst>
               <a:ext uri="{FF2B5EF4-FFF2-40B4-BE49-F238E27FC236}">
-                <a16:creationId xmlns:a16="http://schemas.microsoft.com/office/drawing/2014/main" id="{3337FC5D-92B2-4B4D-8111-6EDEF280692A}"/>
+                <a16:creationId xmlns:a16="http://schemas.microsoft.com/office/drawing/2014/main" xmlns="" id="{3337FC5D-92B2-4B4D-8111-6EDEF280692A}"/>
               </a:ext>
             </a:extLst>
           </p:cNvPr>
@@ -16887,7 +16887,7 @@
           <p:cNvPr id="6" name="Slide Number Placeholder 5">
             <a:extLst>
               <a:ext uri="{FF2B5EF4-FFF2-40B4-BE49-F238E27FC236}">
-                <a16:creationId xmlns:a16="http://schemas.microsoft.com/office/drawing/2014/main" id="{723A104D-C777-4A6E-8A43-F94028E5E311}"/>
+                <a16:creationId xmlns:a16="http://schemas.microsoft.com/office/drawing/2014/main" xmlns="" id="{723A104D-C777-4A6E-8A43-F94028E5E311}"/>
               </a:ext>
             </a:extLst>
           </p:cNvPr>
@@ -16935,7 +16935,7 @@
           <p:cNvPr id="2" name="Title Placeholder 1">
             <a:extLst>
               <a:ext uri="{FF2B5EF4-FFF2-40B4-BE49-F238E27FC236}">
-                <a16:creationId xmlns:a16="http://schemas.microsoft.com/office/drawing/2014/main" id="{12D3A74F-6169-4D30-A245-B46D738BEA81}"/>
+                <a16:creationId xmlns:a16="http://schemas.microsoft.com/office/drawing/2014/main" xmlns="" id="{12D3A74F-6169-4D30-A245-B46D738BEA81}"/>
               </a:ext>
             </a:extLst>
           </p:cNvPr>
@@ -16974,7 +16974,7 @@
           <p:cNvPr id="3" name="Text Placeholder 2">
             <a:extLst>
               <a:ext uri="{FF2B5EF4-FFF2-40B4-BE49-F238E27FC236}">
-                <a16:creationId xmlns:a16="http://schemas.microsoft.com/office/drawing/2014/main" id="{A3877E64-7A05-44DA-81FA-6EF4806BBF0E}"/>
+                <a16:creationId xmlns:a16="http://schemas.microsoft.com/office/drawing/2014/main" xmlns="" id="{A3877E64-7A05-44DA-81FA-6EF4806BBF0E}"/>
               </a:ext>
             </a:extLst>
           </p:cNvPr>
@@ -17398,7 +17398,7 @@
           <p:cNvPr id="2" name="Title Placeholder 1">
             <a:extLst>
               <a:ext uri="{FF2B5EF4-FFF2-40B4-BE49-F238E27FC236}">
-                <a16:creationId xmlns:a16="http://schemas.microsoft.com/office/drawing/2014/main" id="{08615C6B-1C98-4B1C-AB4B-1E1898E593BE}"/>
+                <a16:creationId xmlns:a16="http://schemas.microsoft.com/office/drawing/2014/main" xmlns="" id="{08615C6B-1C98-4B1C-AB4B-1E1898E593BE}"/>
               </a:ext>
             </a:extLst>
           </p:cNvPr>
@@ -17437,7 +17437,7 @@
           <p:cNvPr id="3" name="Text Placeholder 2">
             <a:extLst>
               <a:ext uri="{FF2B5EF4-FFF2-40B4-BE49-F238E27FC236}">
-                <a16:creationId xmlns:a16="http://schemas.microsoft.com/office/drawing/2014/main" id="{2E8DFF97-B7FD-47F9-BC7F-DD4B4C5EA2F6}"/>
+                <a16:creationId xmlns:a16="http://schemas.microsoft.com/office/drawing/2014/main" xmlns="" id="{2E8DFF97-B7FD-47F9-BC7F-DD4B4C5EA2F6}"/>
               </a:ext>
             </a:extLst>
           </p:cNvPr>
@@ -17505,7 +17505,7 @@
           <p:cNvPr id="4" name="Date Placeholder 3">
             <a:extLst>
               <a:ext uri="{FF2B5EF4-FFF2-40B4-BE49-F238E27FC236}">
-                <a16:creationId xmlns:a16="http://schemas.microsoft.com/office/drawing/2014/main" id="{A1831D22-079E-43E3-86A4-BA12DB888C79}"/>
+                <a16:creationId xmlns:a16="http://schemas.microsoft.com/office/drawing/2014/main" xmlns="" id="{A1831D22-079E-43E3-86A4-BA12DB888C79}"/>
               </a:ext>
             </a:extLst>
           </p:cNvPr>
@@ -17541,7 +17541,7 @@
           <a:p>
             <a:fld id="{3C04E684-10F4-4CC3-A0B9-F03AA7BE37CF}" type="datetimeFigureOut">
               <a:rPr lang="en-US" smtClean="0"/>
-              <a:t>12/3/2023</a:t>
+              <a:t>12/7/2023</a:t>
             </a:fld>
             <a:endParaRPr lang="en-US"/>
           </a:p>
@@ -17552,7 +17552,7 @@
           <p:cNvPr id="5" name="Footer Placeholder 4">
             <a:extLst>
               <a:ext uri="{FF2B5EF4-FFF2-40B4-BE49-F238E27FC236}">
-                <a16:creationId xmlns:a16="http://schemas.microsoft.com/office/drawing/2014/main" id="{A14C30A2-140B-4A5D-BEEC-C1314AF1F3F6}"/>
+                <a16:creationId xmlns:a16="http://schemas.microsoft.com/office/drawing/2014/main" xmlns="" id="{A14C30A2-140B-4A5D-BEEC-C1314AF1F3F6}"/>
               </a:ext>
             </a:extLst>
           </p:cNvPr>
@@ -17595,7 +17595,7 @@
           <p:cNvPr id="6" name="Slide Number Placeholder 5">
             <a:extLst>
               <a:ext uri="{FF2B5EF4-FFF2-40B4-BE49-F238E27FC236}">
-                <a16:creationId xmlns:a16="http://schemas.microsoft.com/office/drawing/2014/main" id="{1B71BA8F-7826-496D-91F8-B3ECDF34DA73}"/>
+                <a16:creationId xmlns:a16="http://schemas.microsoft.com/office/drawing/2014/main" xmlns="" id="{1B71BA8F-7826-496D-91F8-B3ECDF34DA73}"/>
               </a:ext>
             </a:extLst>
           </p:cNvPr>
@@ -17972,10 +17972,10 @@
           <p:cNvPr id="53" name="Rectangle 52">
             <a:extLst>
               <a:ext uri="{FF2B5EF4-FFF2-40B4-BE49-F238E27FC236}">
-                <a16:creationId xmlns:a16="http://schemas.microsoft.com/office/drawing/2014/main" id="{1D7050A3-B1DE-4865-BAE7-B35015408F00}"/>
+                <a16:creationId xmlns:a16="http://schemas.microsoft.com/office/drawing/2014/main" xmlns="" id="{1D7050A3-B1DE-4865-BAE7-B35015408F00}"/>
               </a:ext>
               <a:ext uri="{C183D7F6-B498-43B3-948B-1728B52AA6E4}">
-                <adec:decorative xmlns:adec="http://schemas.microsoft.com/office/drawing/2017/decorative" val="1"/>
+                <adec:decorative xmlns:adec="http://schemas.microsoft.com/office/drawing/2017/decorative" xmlns="" val="1"/>
               </a:ext>
             </a:extLst>
           </p:cNvPr>
@@ -17985,7 +17985,7 @@
           <p:nvPr>
             <p:extLst>
               <p:ext uri="{386F3935-93C4-4BCD-93E2-E3B085C9AB24}">
-                <p16:designElem xmlns:p16="http://schemas.microsoft.com/office/powerpoint/2015/main" val="1"/>
+                <p16:designElem xmlns:p16="http://schemas.microsoft.com/office/powerpoint/2015/main" xmlns="" val="1"/>
               </p:ext>
             </p:extLst>
           </p:nvPr>
@@ -18032,10 +18032,10 @@
           <p:cNvPr id="54" name="Rectangle 53">
             <a:extLst>
               <a:ext uri="{FF2B5EF4-FFF2-40B4-BE49-F238E27FC236}">
-                <a16:creationId xmlns:a16="http://schemas.microsoft.com/office/drawing/2014/main" id="{50401EF1-C054-4118-87E7-1621168ADBF1}"/>
+                <a16:creationId xmlns:a16="http://schemas.microsoft.com/office/drawing/2014/main" xmlns="" id="{50401EF1-C054-4118-87E7-1621168ADBF1}"/>
               </a:ext>
               <a:ext uri="{C183D7F6-B498-43B3-948B-1728B52AA6E4}">
-                <adec:decorative xmlns:adec="http://schemas.microsoft.com/office/drawing/2017/decorative" val="1"/>
+                <adec:decorative xmlns:adec="http://schemas.microsoft.com/office/drawing/2017/decorative" xmlns="" val="1"/>
               </a:ext>
             </a:extLst>
           </p:cNvPr>
@@ -18045,7 +18045,7 @@
           <p:nvPr>
             <p:extLst>
               <p:ext uri="{386F3935-93C4-4BCD-93E2-E3B085C9AB24}">
-                <p16:designElem xmlns:p16="http://schemas.microsoft.com/office/powerpoint/2015/main" val="1"/>
+                <p16:designElem xmlns:p16="http://schemas.microsoft.com/office/powerpoint/2015/main" xmlns="" val="1"/>
               </p:ext>
             </p:extLst>
           </p:nvPr>
@@ -18163,10 +18163,10 @@
           <p:cNvPr id="55" name="decorative circles">
             <a:extLst>
               <a:ext uri="{FF2B5EF4-FFF2-40B4-BE49-F238E27FC236}">
-                <a16:creationId xmlns:a16="http://schemas.microsoft.com/office/drawing/2014/main" id="{499E7689-E646-4066-9AD0-62F46B462A37}"/>
+                <a16:creationId xmlns:a16="http://schemas.microsoft.com/office/drawing/2014/main" xmlns="" id="{499E7689-E646-4066-9AD0-62F46B462A37}"/>
               </a:ext>
               <a:ext uri="{C183D7F6-B498-43B3-948B-1728B52AA6E4}">
-                <adec:decorative xmlns:adec="http://schemas.microsoft.com/office/drawing/2017/decorative" val="1"/>
+                <adec:decorative xmlns:adec="http://schemas.microsoft.com/office/drawing/2017/decorative" xmlns="" val="1"/>
               </a:ext>
             </a:extLst>
           </p:cNvPr>
@@ -18176,7 +18176,7 @@
           <p:nvPr>
             <p:extLst>
               <p:ext uri="{386F3935-93C4-4BCD-93E2-E3B085C9AB24}">
-                <p16:designElem xmlns:p16="http://schemas.microsoft.com/office/powerpoint/2015/main" val="1"/>
+                <p16:designElem xmlns:p16="http://schemas.microsoft.com/office/powerpoint/2015/main" xmlns="" val="1"/>
               </p:ext>
             </p:extLst>
           </p:nvPr>
@@ -18194,10 +18194,10 @@
             <p:cNvPr id="48" name="Oval 47">
               <a:extLst>
                 <a:ext uri="{FF2B5EF4-FFF2-40B4-BE49-F238E27FC236}">
-                  <a16:creationId xmlns:a16="http://schemas.microsoft.com/office/drawing/2014/main" id="{8AFEBC98-1CAB-474C-8458-BEB70D8FBE19}"/>
+                  <a16:creationId xmlns:a16="http://schemas.microsoft.com/office/drawing/2014/main" xmlns="" id="{8AFEBC98-1CAB-474C-8458-BEB70D8FBE19}"/>
                 </a:ext>
                 <a:ext uri="{C183D7F6-B498-43B3-948B-1728B52AA6E4}">
-                  <adec:decorative xmlns:adec="http://schemas.microsoft.com/office/drawing/2017/decorative" val="1"/>
+                  <adec:decorative xmlns:adec="http://schemas.microsoft.com/office/drawing/2017/decorative" xmlns="" val="1"/>
                 </a:ext>
               </a:extLst>
             </p:cNvPr>
@@ -18205,7 +18205,7 @@
             <p:nvPr>
               <p:extLst>
                 <p:ext uri="{386F3935-93C4-4BCD-93E2-E3B085C9AB24}">
-                  <p16:designElem xmlns:p16="http://schemas.microsoft.com/office/powerpoint/2015/main" val="1"/>
+                  <p16:designElem xmlns:p16="http://schemas.microsoft.com/office/powerpoint/2015/main" xmlns="" val="1"/>
                 </p:ext>
               </p:extLst>
             </p:nvPr>
@@ -18255,10 +18255,10 @@
             <p:cNvPr id="49" name="Oval 48">
               <a:extLst>
                 <a:ext uri="{FF2B5EF4-FFF2-40B4-BE49-F238E27FC236}">
-                  <a16:creationId xmlns:a16="http://schemas.microsoft.com/office/drawing/2014/main" id="{3C1741FF-E9EA-44E7-90AD-0009B23D9A83}"/>
+                  <a16:creationId xmlns:a16="http://schemas.microsoft.com/office/drawing/2014/main" xmlns="" id="{3C1741FF-E9EA-44E7-90AD-0009B23D9A83}"/>
                 </a:ext>
                 <a:ext uri="{C183D7F6-B498-43B3-948B-1728B52AA6E4}">
-                  <adec:decorative xmlns:adec="http://schemas.microsoft.com/office/drawing/2017/decorative" val="1"/>
+                  <adec:decorative xmlns:adec="http://schemas.microsoft.com/office/drawing/2017/decorative" xmlns="" val="1"/>
                 </a:ext>
               </a:extLst>
             </p:cNvPr>
@@ -18266,7 +18266,7 @@
             <p:nvPr>
               <p:extLst>
                 <p:ext uri="{386F3935-93C4-4BCD-93E2-E3B085C9AB24}">
-                  <p16:designElem xmlns:p16="http://schemas.microsoft.com/office/powerpoint/2015/main" val="1"/>
+                  <p16:designElem xmlns:p16="http://schemas.microsoft.com/office/powerpoint/2015/main" xmlns="" val="1"/>
                 </p:ext>
               </p:extLst>
             </p:nvPr>
@@ -18316,10 +18316,10 @@
             <p:cNvPr id="50" name="Oval 49">
               <a:extLst>
                 <a:ext uri="{FF2B5EF4-FFF2-40B4-BE49-F238E27FC236}">
-                  <a16:creationId xmlns:a16="http://schemas.microsoft.com/office/drawing/2014/main" id="{441A188E-5A43-4269-BD7A-89A6C8F39122}"/>
+                  <a16:creationId xmlns:a16="http://schemas.microsoft.com/office/drawing/2014/main" xmlns="" id="{441A188E-5A43-4269-BD7A-89A6C8F39122}"/>
                 </a:ext>
                 <a:ext uri="{C183D7F6-B498-43B3-948B-1728B52AA6E4}">
-                  <adec:decorative xmlns:adec="http://schemas.microsoft.com/office/drawing/2017/decorative" val="1"/>
+                  <adec:decorative xmlns:adec="http://schemas.microsoft.com/office/drawing/2017/decorative" xmlns="" val="1"/>
                 </a:ext>
               </a:extLst>
             </p:cNvPr>
@@ -18327,7 +18327,7 @@
             <p:nvPr>
               <p:extLst>
                 <p:ext uri="{386F3935-93C4-4BCD-93E2-E3B085C9AB24}">
-                  <p16:designElem xmlns:p16="http://schemas.microsoft.com/office/powerpoint/2015/main" val="1"/>
+                  <p16:designElem xmlns:p16="http://schemas.microsoft.com/office/powerpoint/2015/main" xmlns="" val="1"/>
                 </p:ext>
               </p:extLst>
             </p:nvPr>
@@ -18381,10 +18381,10 @@
             <p:cNvPr id="51" name="Oval 50">
               <a:extLst>
                 <a:ext uri="{FF2B5EF4-FFF2-40B4-BE49-F238E27FC236}">
-                  <a16:creationId xmlns:a16="http://schemas.microsoft.com/office/drawing/2014/main" id="{1D6BB9FB-66A8-4DC7-BE6D-04F08DFF13DC}"/>
+                  <a16:creationId xmlns:a16="http://schemas.microsoft.com/office/drawing/2014/main" xmlns="" id="{1D6BB9FB-66A8-4DC7-BE6D-04F08DFF13DC}"/>
                 </a:ext>
                 <a:ext uri="{C183D7F6-B498-43B3-948B-1728B52AA6E4}">
-                  <adec:decorative xmlns:adec="http://schemas.microsoft.com/office/drawing/2017/decorative" val="1"/>
+                  <adec:decorative xmlns:adec="http://schemas.microsoft.com/office/drawing/2017/decorative" xmlns="" val="1"/>
                 </a:ext>
               </a:extLst>
             </p:cNvPr>
@@ -18392,7 +18392,7 @@
             <p:nvPr>
               <p:extLst>
                 <p:ext uri="{386F3935-93C4-4BCD-93E2-E3B085C9AB24}">
-                  <p16:designElem xmlns:p16="http://schemas.microsoft.com/office/powerpoint/2015/main" val="1"/>
+                  <p16:designElem xmlns:p16="http://schemas.microsoft.com/office/powerpoint/2015/main" xmlns="" val="1"/>
                 </p:ext>
               </p:extLst>
             </p:nvPr>
@@ -18445,10 +18445,10 @@
             <p:cNvPr id="52" name="Oval 51">
               <a:extLst>
                 <a:ext uri="{FF2B5EF4-FFF2-40B4-BE49-F238E27FC236}">
-                  <a16:creationId xmlns:a16="http://schemas.microsoft.com/office/drawing/2014/main" id="{09D76882-E899-4E4C-8818-FDEA473A7A4D}"/>
+                  <a16:creationId xmlns:a16="http://schemas.microsoft.com/office/drawing/2014/main" xmlns="" id="{09D76882-E899-4E4C-8818-FDEA473A7A4D}"/>
                 </a:ext>
                 <a:ext uri="{C183D7F6-B498-43B3-948B-1728B52AA6E4}">
-                  <adec:decorative xmlns:adec="http://schemas.microsoft.com/office/drawing/2017/decorative" val="1"/>
+                  <adec:decorative xmlns:adec="http://schemas.microsoft.com/office/drawing/2017/decorative" xmlns="" val="1"/>
                 </a:ext>
               </a:extLst>
             </p:cNvPr>
@@ -18456,7 +18456,7 @@
             <p:nvPr>
               <p:extLst>
                 <p:ext uri="{386F3935-93C4-4BCD-93E2-E3B085C9AB24}">
-                  <p16:designElem xmlns:p16="http://schemas.microsoft.com/office/powerpoint/2015/main" val="1"/>
+                  <p16:designElem xmlns:p16="http://schemas.microsoft.com/office/powerpoint/2015/main" xmlns="" val="1"/>
                 </p:ext>
               </p:extLst>
             </p:nvPr>
@@ -18507,7 +18507,7 @@
           <p:cNvPr id="5" name="Picture 4" descr="A blue background with dots and lines&#10;&#10;Description automatically generated">
             <a:extLst>
               <a:ext uri="{FF2B5EF4-FFF2-40B4-BE49-F238E27FC236}">
-                <a16:creationId xmlns:a16="http://schemas.microsoft.com/office/drawing/2014/main" id="{A6154B7C-A6F8-5C12-48B9-208396124262}"/>
+                <a16:creationId xmlns:a16="http://schemas.microsoft.com/office/drawing/2014/main" xmlns="" id="{A6154B7C-A6F8-5C12-48B9-208396124262}"/>
               </a:ext>
             </a:extLst>
           </p:cNvPr>
@@ -18520,7 +18520,7 @@
           <a:blip r:embed="rId2">
             <a:extLst>
               <a:ext uri="{837473B0-CC2E-450A-ABE3-18F120FF3D39}">
-                <a1611:picAttrSrcUrl xmlns:a1611="http://schemas.microsoft.com/office/drawing/2016/11/main" r:id="rId3"/>
+                <a1611:picAttrSrcUrl xmlns:a1611="http://schemas.microsoft.com/office/drawing/2016/11/main" xmlns="" r:id="rId3"/>
               </a:ext>
             </a:extLst>
           </a:blip>
@@ -18581,7 +18581,7 @@
           <p:cNvPr id="6" name="TextBox 5">
             <a:extLst>
               <a:ext uri="{FF2B5EF4-FFF2-40B4-BE49-F238E27FC236}">
-                <a16:creationId xmlns:a16="http://schemas.microsoft.com/office/drawing/2014/main" id="{0A6F4930-A3AB-A9E3-15AC-FBEB250B99C3}"/>
+                <a16:creationId xmlns:a16="http://schemas.microsoft.com/office/drawing/2014/main" xmlns="" id="{0A6F4930-A3AB-A9E3-15AC-FBEB250B99C3}"/>
               </a:ext>
             </a:extLst>
           </p:cNvPr>
@@ -18619,7 +18619,7 @@
                 <a:hlinkClick r:id="rId3">
                   <a:extLst>
                     <a:ext uri="{A12FA001-AC4F-418D-AE19-62706E023703}">
-                      <ahyp:hlinkClr xmlns:ahyp="http://schemas.microsoft.com/office/drawing/2018/hyperlinkcolor" val="tx"/>
+                      <ahyp:hlinkClr xmlns:ahyp="http://schemas.microsoft.com/office/drawing/2018/hyperlinkcolor" xmlns="" val="tx"/>
                     </a:ext>
                   </a:extLst>
                 </a:hlinkClick>
@@ -18642,7 +18642,7 @@
                 <a:hlinkClick r:id="rId4">
                   <a:extLst>
                     <a:ext uri="{A12FA001-AC4F-418D-AE19-62706E023703}">
-                      <ahyp:hlinkClr xmlns:ahyp="http://schemas.microsoft.com/office/drawing/2018/hyperlinkcolor" val="tx"/>
+                      <ahyp:hlinkClr xmlns:ahyp="http://schemas.microsoft.com/office/drawing/2018/hyperlinkcolor" xmlns="" val="tx"/>
                     </a:ext>
                   </a:extLst>
                 </a:hlinkClick>
@@ -18834,7 +18834,7 @@
           <p:cNvPr id="2" name="Title 1">
             <a:extLst>
               <a:ext uri="{FF2B5EF4-FFF2-40B4-BE49-F238E27FC236}">
-                <a16:creationId xmlns:a16="http://schemas.microsoft.com/office/drawing/2014/main" id="{07405421-3570-149D-BAF4-52253B810A16}"/>
+                <a16:creationId xmlns:a16="http://schemas.microsoft.com/office/drawing/2014/main" xmlns="" id="{07405421-3570-149D-BAF4-52253B810A16}"/>
               </a:ext>
             </a:extLst>
           </p:cNvPr>
@@ -18892,7 +18892,7 @@
           <p:cNvPr id="7" name="Content Placeholder 6" descr="A screenshot of a computer&#10;&#10;Description automatically generated">
             <a:extLst>
               <a:ext uri="{FF2B5EF4-FFF2-40B4-BE49-F238E27FC236}">
-                <a16:creationId xmlns:a16="http://schemas.microsoft.com/office/drawing/2014/main" id="{C8643602-EDFF-8558-A986-F4FA32A61D52}"/>
+                <a16:creationId xmlns:a16="http://schemas.microsoft.com/office/drawing/2014/main" xmlns="" id="{C8643602-EDFF-8558-A986-F4FA32A61D52}"/>
               </a:ext>
             </a:extLst>
           </p:cNvPr>
@@ -18950,7 +18950,7 @@
           <p:cNvPr id="2" name="Title 1">
             <a:extLst>
               <a:ext uri="{FF2B5EF4-FFF2-40B4-BE49-F238E27FC236}">
-                <a16:creationId xmlns:a16="http://schemas.microsoft.com/office/drawing/2014/main" id="{07405421-3570-149D-BAF4-52253B810A16}"/>
+                <a16:creationId xmlns:a16="http://schemas.microsoft.com/office/drawing/2014/main" xmlns="" id="{07405421-3570-149D-BAF4-52253B810A16}"/>
               </a:ext>
             </a:extLst>
           </p:cNvPr>
@@ -18991,7 +18991,7 @@
           <p:cNvPr id="3" name="Content Placeholder 2">
             <a:extLst>
               <a:ext uri="{FF2B5EF4-FFF2-40B4-BE49-F238E27FC236}">
-                <a16:creationId xmlns:a16="http://schemas.microsoft.com/office/drawing/2014/main" id="{E5124808-7F17-835E-1C9C-EFD0448BD714}"/>
+                <a16:creationId xmlns:a16="http://schemas.microsoft.com/office/drawing/2014/main" xmlns="" id="{E5124808-7F17-835E-1C9C-EFD0448BD714}"/>
               </a:ext>
             </a:extLst>
           </p:cNvPr>
@@ -19055,7 +19055,7 @@
               </a:rPr>
               <a:t>Shape: (28, 28, 1)</a:t>
             </a:r>
-            <a:endParaRPr lang="en-US" sz="2000">
+            <a:endParaRPr lang="en-US" sz="2000" dirty="0">
               <a:solidFill>
                 <a:schemeClr val="tx1"/>
               </a:solidFill>
@@ -19122,7 +19122,7 @@
               </a:rPr>
               <a:t>Convolution Block:</a:t>
             </a:r>
-            <a:endParaRPr lang="en-US">
+            <a:endParaRPr lang="en-US" dirty="0">
               <a:solidFill>
                 <a:schemeClr val="tx1"/>
               </a:solidFill>
@@ -19149,7 +19149,7 @@
               </a:rPr>
               <a:t>Conv2D (3x3 kernel, 24 filters, strides=1, padding=same)</a:t>
             </a:r>
-            <a:endParaRPr lang="en-US" sz="2000">
+            <a:endParaRPr lang="en-US" sz="2000" dirty="0">
               <a:solidFill>
                 <a:schemeClr val="tx1"/>
               </a:solidFill>
@@ -19176,7 +19176,7 @@
               </a:rPr>
               <a:t>Batch Normalization</a:t>
             </a:r>
-            <a:endParaRPr lang="en-US" sz="2000">
+            <a:endParaRPr lang="en-US" sz="2000" dirty="0">
               <a:solidFill>
                 <a:schemeClr val="tx1"/>
               </a:solidFill>
@@ -19193,7 +19193,7 @@
               <a:buChar char="o"/>
             </a:pPr>
             <a:r>
-              <a:rPr lang="en-US" sz="2000" err="1">
+              <a:rPr lang="en-US" sz="2000" dirty="0" err="1">
                 <a:solidFill>
                   <a:schemeClr val="tx1"/>
                 </a:solidFill>
@@ -19214,7 +19214,7 @@
               </a:rPr>
               <a:t> activation</a:t>
             </a:r>
-            <a:endParaRPr lang="en-US" sz="2000">
+            <a:endParaRPr lang="en-US" sz="2000" dirty="0">
               <a:solidFill>
                 <a:schemeClr val="tx1"/>
               </a:solidFill>
@@ -19244,7 +19244,7 @@
               <a:buNone/>
             </a:pPr>
             <a:r>
-              <a:rPr lang="en-US" b="1" err="1">
+              <a:rPr lang="en-US" b="1" dirty="0" err="1">
                 <a:solidFill>
                   <a:schemeClr val="tx1"/>
                 </a:solidFill>
@@ -19265,7 +19265,7 @@
               </a:rPr>
               <a:t> Separable Convolution Blocks (x3):</a:t>
             </a:r>
-            <a:endParaRPr lang="en-US">
+            <a:endParaRPr lang="en-US" dirty="0">
               <a:solidFill>
                 <a:schemeClr val="tx1"/>
               </a:solidFill>
@@ -19282,7 +19282,7 @@
               <a:buChar char="o"/>
             </a:pPr>
             <a:r>
-              <a:rPr lang="en-US" sz="2000" err="1">
+              <a:rPr lang="en-US" sz="2000" dirty="0" err="1">
                 <a:solidFill>
                   <a:schemeClr val="tx1"/>
                 </a:solidFill>
@@ -19303,7 +19303,7 @@
               </a:rPr>
               <a:t> Conv2D (3x3 kernel, strides=1, padding=same)</a:t>
             </a:r>
-            <a:endParaRPr lang="en-US" sz="2000">
+            <a:endParaRPr lang="en-US" sz="2000" dirty="0">
               <a:solidFill>
                 <a:schemeClr val="tx1"/>
               </a:solidFill>
@@ -19330,7 +19330,7 @@
               </a:rPr>
               <a:t>Batch Normalization</a:t>
             </a:r>
-            <a:endParaRPr lang="en-US" sz="2000">
+            <a:endParaRPr lang="en-US" sz="2000" dirty="0">
               <a:solidFill>
                 <a:schemeClr val="tx1"/>
               </a:solidFill>
@@ -19347,7 +19347,7 @@
               <a:buChar char="o"/>
             </a:pPr>
             <a:r>
-              <a:rPr lang="en-US" sz="2000" err="1">
+              <a:rPr lang="en-US" sz="2000" dirty="0" err="1">
                 <a:solidFill>
                   <a:schemeClr val="tx1"/>
                 </a:solidFill>
@@ -19368,7 +19368,7 @@
               </a:rPr>
               <a:t> activation</a:t>
             </a:r>
-            <a:endParaRPr lang="en-US" sz="2000">
+            <a:endParaRPr lang="en-US" sz="2000" dirty="0">
               <a:solidFill>
                 <a:schemeClr val="tx1"/>
               </a:solidFill>
@@ -19395,7 +19395,7 @@
               </a:rPr>
               <a:t>Pointwise Conv2D (1x1 kernel, 24 filters, strides=1, padding=same)</a:t>
             </a:r>
-            <a:endParaRPr lang="en-US" sz="2000">
+            <a:endParaRPr lang="en-US" sz="2000" dirty="0">
               <a:solidFill>
                 <a:schemeClr val="tx1"/>
               </a:solidFill>
@@ -19422,7 +19422,7 @@
               </a:rPr>
               <a:t>Batch Normalization</a:t>
             </a:r>
-            <a:endParaRPr lang="en-US" sz="2000">
+            <a:endParaRPr lang="en-US" sz="2000" dirty="0">
               <a:solidFill>
                 <a:schemeClr val="tx1"/>
               </a:solidFill>
@@ -19439,7 +19439,7 @@
               <a:buChar char="o"/>
             </a:pPr>
             <a:r>
-              <a:rPr lang="en-US" sz="2000" err="1">
+              <a:rPr lang="en-US" sz="2000" dirty="0" err="1">
                 <a:solidFill>
                   <a:schemeClr val="tx1"/>
                 </a:solidFill>
@@ -19460,7 +19460,7 @@
               </a:rPr>
               <a:t> activation</a:t>
             </a:r>
-            <a:endParaRPr lang="en-US" sz="2000">
+            <a:endParaRPr lang="en-US" sz="2000" dirty="0">
               <a:solidFill>
                 <a:schemeClr val="tx1"/>
               </a:solidFill>
@@ -19472,10 +19472,14 @@
             <a:pPr indent="0">
               <a:buNone/>
             </a:pPr>
+            <a:r>
+              <a:rPr lang="en-US" dirty="0"/>
+              <a:t/>
+            </a:r>
             <a:br>
               <a:rPr lang="en-US" dirty="0"/>
             </a:br>
-            <a:endParaRPr lang="en-US">
+            <a:endParaRPr lang="en-US" dirty="0">
               <a:solidFill>
                 <a:schemeClr val="tx1"/>
               </a:solidFill>
@@ -19520,7 +19524,7 @@
           <p:cNvPr id="2" name="Title 1">
             <a:extLst>
               <a:ext uri="{FF2B5EF4-FFF2-40B4-BE49-F238E27FC236}">
-                <a16:creationId xmlns:a16="http://schemas.microsoft.com/office/drawing/2014/main" id="{07405421-3570-149D-BAF4-52253B810A16}"/>
+                <a16:creationId xmlns:a16="http://schemas.microsoft.com/office/drawing/2014/main" xmlns="" id="{07405421-3570-149D-BAF4-52253B810A16}"/>
               </a:ext>
             </a:extLst>
           </p:cNvPr>
@@ -19561,7 +19565,7 @@
           <p:cNvPr id="3" name="Content Placeholder 2">
             <a:extLst>
               <a:ext uri="{FF2B5EF4-FFF2-40B4-BE49-F238E27FC236}">
-                <a16:creationId xmlns:a16="http://schemas.microsoft.com/office/drawing/2014/main" id="{E5124808-7F17-835E-1C9C-EFD0448BD714}"/>
+                <a16:creationId xmlns:a16="http://schemas.microsoft.com/office/drawing/2014/main" xmlns="" id="{E5124808-7F17-835E-1C9C-EFD0448BD714}"/>
               </a:ext>
             </a:extLst>
           </p:cNvPr>
@@ -19598,7 +19602,7 @@
               </a:rPr>
               <a:t>Channel Shuffle Operation:</a:t>
             </a:r>
-            <a:endParaRPr lang="en-US">
+            <a:endParaRPr lang="en-US" dirty="0">
               <a:solidFill>
                 <a:schemeClr val="tx1"/>
               </a:solidFill>
@@ -19624,6 +19628,17 @@
                 <a:cs typeface="+mn-lt"/>
               </a:rPr>
               <a:t>Shuffle channels within groups to enhance feature diversity.</a:t>
+            </a:r>
+            <a:r>
+              <a:rPr lang="en-US" dirty="0">
+                <a:solidFill>
+                  <a:schemeClr val="tx1"/>
+                </a:solidFill>
+                <a:latin typeface="Calibri"/>
+                <a:ea typeface="+mn-lt"/>
+                <a:cs typeface="+mn-lt"/>
+              </a:rPr>
+              <a:t/>
             </a:r>
             <a:br>
               <a:rPr lang="en-US" dirty="0">
@@ -19635,7 +19650,7 @@
                 <a:cs typeface="+mn-lt"/>
               </a:rPr>
             </a:br>
-            <a:endParaRPr lang="en-US">
+            <a:endParaRPr lang="en-US" dirty="0">
               <a:solidFill>
                 <a:srgbClr val="420023"/>
               </a:solidFill>
@@ -19659,7 +19674,7 @@
               </a:rPr>
               <a:t>Global Average Pooling:</a:t>
             </a:r>
-            <a:endParaRPr lang="en-US">
+            <a:endParaRPr lang="en-US" dirty="0">
               <a:solidFill>
                 <a:schemeClr val="tx1"/>
               </a:solidFill>
@@ -19685,6 +19700,17 @@
                 <a:cs typeface="+mn-lt"/>
               </a:rPr>
               <a:t>Reduces spatial dimensions to (1, 1, 24).</a:t>
+            </a:r>
+            <a:r>
+              <a:rPr lang="en-US" dirty="0">
+                <a:solidFill>
+                  <a:schemeClr val="tx1"/>
+                </a:solidFill>
+                <a:latin typeface="Calibri"/>
+                <a:ea typeface="+mn-lt"/>
+                <a:cs typeface="+mn-lt"/>
+              </a:rPr>
+              <a:t/>
             </a:r>
             <a:br>
               <a:rPr lang="en-US" dirty="0">
@@ -19696,7 +19722,7 @@
                 <a:cs typeface="+mn-lt"/>
               </a:rPr>
             </a:br>
-            <a:endParaRPr lang="en-US" sz="2000">
+            <a:endParaRPr lang="en-US" sz="2000" dirty="0">
               <a:solidFill>
                 <a:srgbClr val="420023"/>
               </a:solidFill>
@@ -19719,7 +19745,7 @@
               </a:rPr>
               <a:t>Fully Connected Layer:</a:t>
             </a:r>
-            <a:endParaRPr lang="en-US">
+            <a:endParaRPr lang="en-US" dirty="0">
               <a:solidFill>
                 <a:schemeClr val="tx1"/>
               </a:solidFill>
@@ -19768,7 +19794,7 @@
               </a:rPr>
               <a:t> activation)</a:t>
             </a:r>
-            <a:endParaRPr lang="en-US">
+            <a:endParaRPr lang="en-US" dirty="0">
               <a:solidFill>
                 <a:srgbClr val="374151"/>
               </a:solidFill>
@@ -19794,6 +19820,17 @@
                 <a:cs typeface="+mn-lt"/>
               </a:rPr>
               <a:t>Dropout layer (50% dropout rate)</a:t>
+            </a:r>
+            <a:r>
+              <a:rPr lang="en-US" dirty="0">
+                <a:solidFill>
+                  <a:schemeClr val="tx1"/>
+                </a:solidFill>
+                <a:latin typeface="Calibri"/>
+                <a:ea typeface="+mn-lt"/>
+                <a:cs typeface="+mn-lt"/>
+              </a:rPr>
+              <a:t/>
             </a:r>
             <a:br>
               <a:rPr lang="en-US" dirty="0">
@@ -19805,7 +19842,7 @@
                 <a:cs typeface="+mn-lt"/>
               </a:rPr>
             </a:br>
-            <a:endParaRPr lang="en-US" sz="2000">
+            <a:endParaRPr lang="en-US" sz="2000" dirty="0">
               <a:solidFill>
                 <a:srgbClr val="420023"/>
               </a:solidFill>
@@ -19828,7 +19865,7 @@
               </a:rPr>
               <a:t>Output Layer:</a:t>
             </a:r>
-            <a:endParaRPr lang="en-US">
+            <a:endParaRPr lang="en-US" dirty="0">
               <a:solidFill>
                 <a:schemeClr val="tx1"/>
               </a:solidFill>
@@ -19877,7 +19914,7 @@
               </a:rPr>
               <a:t> activation) for classification.</a:t>
             </a:r>
-            <a:endParaRPr lang="en-US">
+            <a:endParaRPr lang="en-US" dirty="0">
               <a:solidFill>
                 <a:srgbClr val="374151"/>
               </a:solidFill>
@@ -19889,6 +19926,17 @@
             <a:pPr marL="457200" lvl="1" indent="0">
               <a:buNone/>
             </a:pPr>
+            <a:r>
+              <a:rPr lang="en-US" dirty="0">
+                <a:solidFill>
+                  <a:schemeClr val="tx1"/>
+                </a:solidFill>
+                <a:latin typeface="Calibri"/>
+                <a:ea typeface="+mn-lt"/>
+                <a:cs typeface="+mn-lt"/>
+              </a:rPr>
+              <a:t/>
+            </a:r>
             <a:br>
               <a:rPr lang="en-US" dirty="0">
                 <a:solidFill>
@@ -19899,7 +19947,7 @@
                 <a:cs typeface="+mn-lt"/>
               </a:rPr>
             </a:br>
-            <a:endParaRPr lang="en-US" sz="2000">
+            <a:endParaRPr lang="en-US" sz="2000" dirty="0">
               <a:solidFill>
                 <a:srgbClr val="420023"/>
               </a:solidFill>
@@ -19956,7 +20004,7 @@
           <p:cNvPr id="2" name="Title 1">
             <a:extLst>
               <a:ext uri="{FF2B5EF4-FFF2-40B4-BE49-F238E27FC236}">
-                <a16:creationId xmlns:a16="http://schemas.microsoft.com/office/drawing/2014/main" id="{07405421-3570-149D-BAF4-52253B810A16}"/>
+                <a16:creationId xmlns:a16="http://schemas.microsoft.com/office/drawing/2014/main" xmlns="" id="{07405421-3570-149D-BAF4-52253B810A16}"/>
               </a:ext>
             </a:extLst>
           </p:cNvPr>
@@ -20015,7 +20063,7 @@
           <p:cNvPr id="4" name="Content Placeholder 3" descr="A table with text and numbers&#10;&#10;Description automatically generated">
             <a:extLst>
               <a:ext uri="{FF2B5EF4-FFF2-40B4-BE49-F238E27FC236}">
-                <a16:creationId xmlns:a16="http://schemas.microsoft.com/office/drawing/2014/main" id="{E44E31B3-A521-E293-040C-7CA86A42EA83}"/>
+                <a16:creationId xmlns:a16="http://schemas.microsoft.com/office/drawing/2014/main" xmlns="" id="{E44E31B3-A521-E293-040C-7CA86A42EA83}"/>
               </a:ext>
             </a:extLst>
           </p:cNvPr>
@@ -20074,7 +20122,7 @@
           <p:cNvPr id="2" name="Title 1">
             <a:extLst>
               <a:ext uri="{FF2B5EF4-FFF2-40B4-BE49-F238E27FC236}">
-                <a16:creationId xmlns:a16="http://schemas.microsoft.com/office/drawing/2014/main" id="{6F2EED63-226F-7CC3-AA96-45104645EC4C}"/>
+                <a16:creationId xmlns:a16="http://schemas.microsoft.com/office/drawing/2014/main" xmlns="" id="{6F2EED63-226F-7CC3-AA96-45104645EC4C}"/>
               </a:ext>
             </a:extLst>
           </p:cNvPr>
@@ -20112,7 +20160,7 @@
           <p:cNvPr id="3" name="Content Placeholder 2">
             <a:extLst>
               <a:ext uri="{FF2B5EF4-FFF2-40B4-BE49-F238E27FC236}">
-                <a16:creationId xmlns:a16="http://schemas.microsoft.com/office/drawing/2014/main" id="{44B69AF1-3F68-92A8-323D-DC116486CA3B}"/>
+                <a16:creationId xmlns:a16="http://schemas.microsoft.com/office/drawing/2014/main" xmlns="" id="{44B69AF1-3F68-92A8-323D-DC116486CA3B}"/>
               </a:ext>
             </a:extLst>
           </p:cNvPr>
@@ -20152,7 +20200,7 @@
               </a:rPr>
               <a:t>1. Model Compilation:</a:t>
             </a:r>
-            <a:endParaRPr lang="en-US" b="1">
+            <a:endParaRPr lang="en-US" b="1" dirty="0">
               <a:solidFill>
                 <a:schemeClr val="tx1"/>
               </a:solidFill>
@@ -20177,7 +20225,7 @@
               </a:rPr>
               <a:t>    Optimizer: Adam optimizer is employed for efficient weight updates during training.</a:t>
             </a:r>
-            <a:endParaRPr lang="en-US">
+            <a:endParaRPr lang="en-US" dirty="0">
               <a:solidFill>
                 <a:schemeClr val="tx1"/>
               </a:solidFill>
@@ -20203,7 +20251,7 @@
               <a:t>    Loss Function: Sparse categorical </a:t>
             </a:r>
             <a:r>
-              <a:rPr lang="en-US" err="1">
+              <a:rPr lang="en-US" dirty="0" err="1">
                 <a:solidFill>
                   <a:schemeClr val="tx1"/>
                 </a:solidFill>
@@ -20224,7 +20272,7 @@
               </a:rPr>
               <a:t> is chosen as the loss function, suitable for multiclass classification tasks.</a:t>
             </a:r>
-            <a:endParaRPr lang="en-US">
+            <a:endParaRPr lang="en-US" dirty="0">
               <a:solidFill>
                 <a:schemeClr val="tx1"/>
               </a:solidFill>
@@ -20249,7 +20297,7 @@
               </a:rPr>
               <a:t>    Metric: Accuracy is selected as the evaluation metric to measure the model's performance during training.</a:t>
             </a:r>
-            <a:endParaRPr lang="en-US">
+            <a:endParaRPr lang="en-US" dirty="0">
               <a:solidFill>
                 <a:schemeClr val="tx1"/>
               </a:solidFill>
@@ -20301,7 +20349,7 @@
               </a:rPr>
               <a:t>    Model: The architecture, optimizer, loss function, and metric are encapsulated in the model.</a:t>
             </a:r>
-            <a:endParaRPr lang="en-US">
+            <a:endParaRPr lang="en-US" dirty="0">
               <a:solidFill>
                 <a:schemeClr val="tx1"/>
               </a:solidFill>
@@ -20327,7 +20375,7 @@
               <a:t>    Training Data: The input data (`</a:t>
             </a:r>
             <a:r>
-              <a:rPr lang="en-US" err="1">
+              <a:rPr lang="en-US" dirty="0" err="1">
                 <a:solidFill>
                   <a:schemeClr val="tx1"/>
                 </a:solidFill>
@@ -20349,7 +20397,7 @@
               <a:t>`) and corresponding labels (`</a:t>
             </a:r>
             <a:r>
-              <a:rPr lang="en-US" err="1">
+              <a:rPr lang="en-US" dirty="0" err="1">
                 <a:solidFill>
                   <a:schemeClr val="tx1"/>
                 </a:solidFill>
@@ -20370,7 +20418,7 @@
               </a:rPr>
               <a:t>`) are provided to the model for learning.</a:t>
             </a:r>
-            <a:endParaRPr lang="en-US">
+            <a:endParaRPr lang="en-US" dirty="0">
               <a:solidFill>
                 <a:schemeClr val="tx1"/>
               </a:solidFill>
@@ -20395,7 +20443,7 @@
               </a:rPr>
               <a:t>    Epochs: The number of epochs determines how many times the model iterates over the entire training dataset.</a:t>
             </a:r>
-            <a:endParaRPr lang="en-US">
+            <a:endParaRPr lang="en-US" dirty="0">
               <a:solidFill>
                 <a:schemeClr val="tx1"/>
               </a:solidFill>
@@ -20420,7 +20468,7 @@
               </a:rPr>
               <a:t>    Batch Size: Training data is divided into batches, and the model's weights are updated after processing each batch.</a:t>
             </a:r>
-            <a:endParaRPr lang="en-US">
+            <a:endParaRPr lang="en-US" dirty="0">
               <a:solidFill>
                 <a:schemeClr val="tx1"/>
               </a:solidFill>
@@ -20446,7 +20494,7 @@
               </a:rPr>
               <a:t>3. Performance Monitoring:</a:t>
             </a:r>
-            <a:endParaRPr lang="en-US" b="1">
+            <a:endParaRPr lang="en-US" b="1" dirty="0">
               <a:solidFill>
                 <a:schemeClr val="tx1"/>
               </a:solidFill>
@@ -20471,7 +20519,7 @@
               </a:rPr>
               <a:t>    The training process is monitored using the specified metric (accuracy), providing insights into the model's accuracy on the training dataset.</a:t>
             </a:r>
-            <a:endParaRPr lang="en-US">
+            <a:endParaRPr lang="en-US" dirty="0">
               <a:solidFill>
                 <a:schemeClr val="tx1"/>
               </a:solidFill>
@@ -20516,7 +20564,7 @@
           <p:cNvPr id="2" name="Title 1">
             <a:extLst>
               <a:ext uri="{FF2B5EF4-FFF2-40B4-BE49-F238E27FC236}">
-                <a16:creationId xmlns:a16="http://schemas.microsoft.com/office/drawing/2014/main" id="{8C9BB1CA-38DE-AEB8-19A3-70D46AF8A922}"/>
+                <a16:creationId xmlns:a16="http://schemas.microsoft.com/office/drawing/2014/main" xmlns="" id="{8C9BB1CA-38DE-AEB8-19A3-70D46AF8A922}"/>
               </a:ext>
             </a:extLst>
           </p:cNvPr>
@@ -20558,7 +20606,7 @@
           <p:cNvPr id="3" name="Content Placeholder 2">
             <a:extLst>
               <a:ext uri="{FF2B5EF4-FFF2-40B4-BE49-F238E27FC236}">
-                <a16:creationId xmlns:a16="http://schemas.microsoft.com/office/drawing/2014/main" id="{4CE80B69-126C-05B6-13B4-4C9126912684}"/>
+                <a16:creationId xmlns:a16="http://schemas.microsoft.com/office/drawing/2014/main" xmlns="" id="{4CE80B69-126C-05B6-13B4-4C9126912684}"/>
               </a:ext>
             </a:extLst>
           </p:cNvPr>
@@ -20617,7 +20665,7 @@
               </a:rPr>
               <a:t>The model predicts class labels for the test data, obtaining one-hot encoded predictions.</a:t>
             </a:r>
-            <a:endParaRPr lang="en-US" sz="2000">
+            <a:endParaRPr lang="en-US" sz="2000" dirty="0">
               <a:latin typeface="Times New Roman"/>
               <a:cs typeface="Times New Roman"/>
             </a:endParaRPr>
@@ -20648,7 +20696,7 @@
               </a:buClr>
             </a:pPr>
             <a:r>
-              <a:rPr lang="en-US" sz="2000">
+              <a:rPr lang="en-US" sz="2000" dirty="0" err="1">
                 <a:solidFill>
                   <a:srgbClr val="374151"/>
                 </a:solidFill>
@@ -20656,9 +20704,20 @@
                 <a:ea typeface="+mn-lt"/>
                 <a:cs typeface="+mn-lt"/>
               </a:rPr>
-              <a:t>Argmax operation is applied to convert the one-hot encoded predictions into integer labels.</a:t>
-            </a:r>
-            <a:endParaRPr lang="en-US" sz="2000">
+              <a:t>Argmax</a:t>
+            </a:r>
+            <a:r>
+              <a:rPr lang="en-US" sz="2000" dirty="0">
+                <a:solidFill>
+                  <a:srgbClr val="374151"/>
+                </a:solidFill>
+                <a:latin typeface="Times New Roman"/>
+                <a:ea typeface="+mn-lt"/>
+                <a:cs typeface="+mn-lt"/>
+              </a:rPr>
+              <a:t> operation is applied to convert the one-hot encoded predictions into integer labels.</a:t>
+            </a:r>
+            <a:endParaRPr lang="en-US" sz="2000" dirty="0">
               <a:latin typeface="Times New Roman"/>
               <a:cs typeface="Times New Roman"/>
             </a:endParaRPr>
@@ -20680,13 +20739,13 @@
               <a:buNone/>
             </a:pPr>
             <a:r>
-              <a:rPr lang="en-US" sz="2000" b="1">
+              <a:rPr lang="en-US" sz="2000" b="1" dirty="0">
                 <a:latin typeface="Times New Roman"/>
                 <a:cs typeface="Times New Roman"/>
               </a:rPr>
               <a:t>Evaluation:</a:t>
             </a:r>
-            <a:endParaRPr lang="en-US" sz="2000">
+            <a:endParaRPr lang="en-US" sz="2000" dirty="0">
               <a:latin typeface="Times New Roman"/>
               <a:cs typeface="Times New Roman"/>
             </a:endParaRPr>
@@ -20781,7 +20840,7 @@
           <p:cNvPr id="2" name="Title 1">
             <a:extLst>
               <a:ext uri="{FF2B5EF4-FFF2-40B4-BE49-F238E27FC236}">
-                <a16:creationId xmlns:a16="http://schemas.microsoft.com/office/drawing/2014/main" id="{B687D784-A3FD-51A4-6160-5C8B36ED7155}"/>
+                <a16:creationId xmlns:a16="http://schemas.microsoft.com/office/drawing/2014/main" xmlns="" id="{B687D784-A3FD-51A4-6160-5C8B36ED7155}"/>
               </a:ext>
             </a:extLst>
           </p:cNvPr>
@@ -20819,7 +20878,7 @@
           <p:cNvPr id="3" name="Content Placeholder 2">
             <a:extLst>
               <a:ext uri="{FF2B5EF4-FFF2-40B4-BE49-F238E27FC236}">
-                <a16:creationId xmlns:a16="http://schemas.microsoft.com/office/drawing/2014/main" id="{91B8D0E9-9FFC-A2E1-38D6-A0018CB63574}"/>
+                <a16:creationId xmlns:a16="http://schemas.microsoft.com/office/drawing/2014/main" xmlns="" id="{91B8D0E9-9FFC-A2E1-38D6-A0018CB63574}"/>
               </a:ext>
             </a:extLst>
           </p:cNvPr>
@@ -20932,7 +20991,7 @@
           <p:cNvPr id="4" name="Table 3">
             <a:extLst>
               <a:ext uri="{FF2B5EF4-FFF2-40B4-BE49-F238E27FC236}">
-                <a16:creationId xmlns:a16="http://schemas.microsoft.com/office/drawing/2014/main" id="{92E2DB88-E1A3-A4A9-4D9D-CEC45FD1882E}"/>
+                <a16:creationId xmlns:a16="http://schemas.microsoft.com/office/drawing/2014/main" xmlns="" id="{92E2DB88-E1A3-A4A9-4D9D-CEC45FD1882E}"/>
               </a:ext>
             </a:extLst>
           </p:cNvPr>
@@ -20961,14 +21020,14 @@
                 <a:gridCol w="4154365">
                   <a:extLst>
                     <a:ext uri="{9D8B030D-6E8A-4147-A177-3AD203B41FA5}">
-                      <a16:colId xmlns:a16="http://schemas.microsoft.com/office/drawing/2014/main" val="1331551049"/>
+                      <a16:colId xmlns:a16="http://schemas.microsoft.com/office/drawing/2014/main" xmlns="" val="1331551049"/>
                     </a:ext>
                   </a:extLst>
                 </a:gridCol>
                 <a:gridCol w="4014274">
                   <a:extLst>
                     <a:ext uri="{9D8B030D-6E8A-4147-A177-3AD203B41FA5}">
-                      <a16:colId xmlns:a16="http://schemas.microsoft.com/office/drawing/2014/main" val="1812895452"/>
+                      <a16:colId xmlns:a16="http://schemas.microsoft.com/office/drawing/2014/main" xmlns="" val="1812895452"/>
                     </a:ext>
                   </a:extLst>
                 </a:gridCol>
@@ -20991,7 +21050,7 @@
                         </a:rPr>
                         <a:t>Mobile Net</a:t>
                       </a:r>
-                      <a:endParaRPr lang="en-US"/>
+                      <a:endParaRPr lang="en-US" dirty="0"/>
                     </a:p>
                   </a:txBody>
                   <a:tcPr>
@@ -21077,7 +21136,7 @@
                 </a:tc>
                 <a:extLst>
                   <a:ext uri="{0D108BD9-81ED-4DB2-BD59-A6C34878D82A}">
-                    <a16:rowId xmlns:a16="http://schemas.microsoft.com/office/drawing/2014/main" val="3273785564"/>
+                    <a16:rowId xmlns:a16="http://schemas.microsoft.com/office/drawing/2014/main" xmlns="" val="3273785564"/>
                   </a:ext>
                 </a:extLst>
               </a:tr>
@@ -21697,7 +21756,7 @@
                 </a:tc>
                 <a:extLst>
                   <a:ext uri="{0D108BD9-81ED-4DB2-BD59-A6C34878D82A}">
-                    <a16:rowId xmlns:a16="http://schemas.microsoft.com/office/drawing/2014/main" val="2564943423"/>
+                    <a16:rowId xmlns:a16="http://schemas.microsoft.com/office/drawing/2014/main" xmlns="" val="2564943423"/>
                   </a:ext>
                 </a:extLst>
               </a:tr>
@@ -21740,7 +21799,7 @@
           <p:cNvPr id="2" name="Title 1">
             <a:extLst>
               <a:ext uri="{FF2B5EF4-FFF2-40B4-BE49-F238E27FC236}">
-                <a16:creationId xmlns:a16="http://schemas.microsoft.com/office/drawing/2014/main" id="{B687D784-A3FD-51A4-6160-5C8B36ED7155}"/>
+                <a16:creationId xmlns:a16="http://schemas.microsoft.com/office/drawing/2014/main" xmlns="" id="{B687D784-A3FD-51A4-6160-5C8B36ED7155}"/>
               </a:ext>
             </a:extLst>
           </p:cNvPr>
@@ -21778,7 +21837,7 @@
           <p:cNvPr id="3" name="Content Placeholder 2">
             <a:extLst>
               <a:ext uri="{FF2B5EF4-FFF2-40B4-BE49-F238E27FC236}">
-                <a16:creationId xmlns:a16="http://schemas.microsoft.com/office/drawing/2014/main" id="{91B8D0E9-9FFC-A2E1-38D6-A0018CB63574}"/>
+                <a16:creationId xmlns:a16="http://schemas.microsoft.com/office/drawing/2014/main" xmlns="" id="{91B8D0E9-9FFC-A2E1-38D6-A0018CB63574}"/>
               </a:ext>
             </a:extLst>
           </p:cNvPr>
@@ -21877,7 +21936,7 @@
           <p:cNvPr id="4" name="Table 3">
             <a:extLst>
               <a:ext uri="{FF2B5EF4-FFF2-40B4-BE49-F238E27FC236}">
-                <a16:creationId xmlns:a16="http://schemas.microsoft.com/office/drawing/2014/main" id="{92E2DB88-E1A3-A4A9-4D9D-CEC45FD1882E}"/>
+                <a16:creationId xmlns:a16="http://schemas.microsoft.com/office/drawing/2014/main" xmlns="" id="{92E2DB88-E1A3-A4A9-4D9D-CEC45FD1882E}"/>
               </a:ext>
             </a:extLst>
           </p:cNvPr>
@@ -21906,14 +21965,14 @@
                 <a:gridCol w="4154365">
                   <a:extLst>
                     <a:ext uri="{9D8B030D-6E8A-4147-A177-3AD203B41FA5}">
-                      <a16:colId xmlns:a16="http://schemas.microsoft.com/office/drawing/2014/main" val="1331551049"/>
+                      <a16:colId xmlns:a16="http://schemas.microsoft.com/office/drawing/2014/main" xmlns="" val="1331551049"/>
                     </a:ext>
                   </a:extLst>
                 </a:gridCol>
                 <a:gridCol w="4014274">
                   <a:extLst>
                     <a:ext uri="{9D8B030D-6E8A-4147-A177-3AD203B41FA5}">
-                      <a16:colId xmlns:a16="http://schemas.microsoft.com/office/drawing/2014/main" val="1812895452"/>
+                      <a16:colId xmlns:a16="http://schemas.microsoft.com/office/drawing/2014/main" xmlns="" val="1812895452"/>
                     </a:ext>
                   </a:extLst>
                 </a:gridCol>
@@ -22020,7 +22079,7 @@
                 </a:tc>
                 <a:extLst>
                   <a:ext uri="{0D108BD9-81ED-4DB2-BD59-A6C34878D82A}">
-                    <a16:rowId xmlns:a16="http://schemas.microsoft.com/office/drawing/2014/main" val="3273785564"/>
+                    <a16:rowId xmlns:a16="http://schemas.microsoft.com/office/drawing/2014/main" xmlns="" val="3273785564"/>
                   </a:ext>
                 </a:extLst>
               </a:tr>
@@ -22710,7 +22769,7 @@
                 </a:tc>
                 <a:extLst>
                   <a:ext uri="{0D108BD9-81ED-4DB2-BD59-A6C34878D82A}">
-                    <a16:rowId xmlns:a16="http://schemas.microsoft.com/office/drawing/2014/main" val="2564943423"/>
+                    <a16:rowId xmlns:a16="http://schemas.microsoft.com/office/drawing/2014/main" xmlns="" val="2564943423"/>
                   </a:ext>
                 </a:extLst>
               </a:tr>
@@ -22753,7 +22812,7 @@
           <p:cNvPr id="2" name="Title 1">
             <a:extLst>
               <a:ext uri="{FF2B5EF4-FFF2-40B4-BE49-F238E27FC236}">
-                <a16:creationId xmlns:a16="http://schemas.microsoft.com/office/drawing/2014/main" id="{B687D784-A3FD-51A4-6160-5C8B36ED7155}"/>
+                <a16:creationId xmlns:a16="http://schemas.microsoft.com/office/drawing/2014/main" xmlns="" id="{B687D784-A3FD-51A4-6160-5C8B36ED7155}"/>
               </a:ext>
             </a:extLst>
           </p:cNvPr>
@@ -22791,7 +22850,7 @@
           <p:cNvPr id="3" name="Content Placeholder 2">
             <a:extLst>
               <a:ext uri="{FF2B5EF4-FFF2-40B4-BE49-F238E27FC236}">
-                <a16:creationId xmlns:a16="http://schemas.microsoft.com/office/drawing/2014/main" id="{91B8D0E9-9FFC-A2E1-38D6-A0018CB63574}"/>
+                <a16:creationId xmlns:a16="http://schemas.microsoft.com/office/drawing/2014/main" xmlns="" id="{91B8D0E9-9FFC-A2E1-38D6-A0018CB63574}"/>
               </a:ext>
             </a:extLst>
           </p:cNvPr>
@@ -22904,7 +22963,7 @@
           <p:cNvPr id="4" name="Table 3">
             <a:extLst>
               <a:ext uri="{FF2B5EF4-FFF2-40B4-BE49-F238E27FC236}">
-                <a16:creationId xmlns:a16="http://schemas.microsoft.com/office/drawing/2014/main" id="{92E2DB88-E1A3-A4A9-4D9D-CEC45FD1882E}"/>
+                <a16:creationId xmlns:a16="http://schemas.microsoft.com/office/drawing/2014/main" xmlns="" id="{92E2DB88-E1A3-A4A9-4D9D-CEC45FD1882E}"/>
               </a:ext>
             </a:extLst>
           </p:cNvPr>
@@ -22933,14 +22992,14 @@
                 <a:gridCol w="4154365">
                   <a:extLst>
                     <a:ext uri="{9D8B030D-6E8A-4147-A177-3AD203B41FA5}">
-                      <a16:colId xmlns:a16="http://schemas.microsoft.com/office/drawing/2014/main" val="1331551049"/>
+                      <a16:colId xmlns:a16="http://schemas.microsoft.com/office/drawing/2014/main" xmlns="" val="1331551049"/>
                     </a:ext>
                   </a:extLst>
                 </a:gridCol>
                 <a:gridCol w="4014274">
                   <a:extLst>
                     <a:ext uri="{9D8B030D-6E8A-4147-A177-3AD203B41FA5}">
-                      <a16:colId xmlns:a16="http://schemas.microsoft.com/office/drawing/2014/main" val="1812895452"/>
+                      <a16:colId xmlns:a16="http://schemas.microsoft.com/office/drawing/2014/main" xmlns="" val="1812895452"/>
                     </a:ext>
                   </a:extLst>
                 </a:gridCol>
@@ -23047,7 +23106,7 @@
                 </a:tc>
                 <a:extLst>
                   <a:ext uri="{0D108BD9-81ED-4DB2-BD59-A6C34878D82A}">
-                    <a16:rowId xmlns:a16="http://schemas.microsoft.com/office/drawing/2014/main" val="3273785564"/>
+                    <a16:rowId xmlns:a16="http://schemas.microsoft.com/office/drawing/2014/main" xmlns="" val="3273785564"/>
                   </a:ext>
                 </a:extLst>
               </a:tr>
@@ -23667,7 +23726,7 @@
                 </a:tc>
                 <a:extLst>
                   <a:ext uri="{0D108BD9-81ED-4DB2-BD59-A6C34878D82A}">
-                    <a16:rowId xmlns:a16="http://schemas.microsoft.com/office/drawing/2014/main" val="2564943423"/>
+                    <a16:rowId xmlns:a16="http://schemas.microsoft.com/office/drawing/2014/main" xmlns="" val="2564943423"/>
                   </a:ext>
                 </a:extLst>
               </a:tr>
@@ -23710,7 +23769,7 @@
           <p:cNvPr id="2" name="Title 1">
             <a:extLst>
               <a:ext uri="{FF2B5EF4-FFF2-40B4-BE49-F238E27FC236}">
-                <a16:creationId xmlns:a16="http://schemas.microsoft.com/office/drawing/2014/main" id="{46765FB2-7A85-DEEA-A81B-F6B8AE90BDBA}"/>
+                <a16:creationId xmlns:a16="http://schemas.microsoft.com/office/drawing/2014/main" xmlns="" id="{46765FB2-7A85-DEEA-A81B-F6B8AE90BDBA}"/>
               </a:ext>
             </a:extLst>
           </p:cNvPr>
@@ -23748,7 +23807,7 @@
           <p:cNvPr id="3" name="Content Placeholder 2">
             <a:extLst>
               <a:ext uri="{FF2B5EF4-FFF2-40B4-BE49-F238E27FC236}">
-                <a16:creationId xmlns:a16="http://schemas.microsoft.com/office/drawing/2014/main" id="{771643DB-1589-1AAA-75D6-6A468A750DEA}"/>
+                <a16:creationId xmlns:a16="http://schemas.microsoft.com/office/drawing/2014/main" xmlns="" id="{771643DB-1589-1AAA-75D6-6A468A750DEA}"/>
               </a:ext>
             </a:extLst>
           </p:cNvPr>
@@ -23779,7 +23838,7 @@
               </a:rPr>
               <a:t>Mobile-Friendly CNN Exploration:</a:t>
             </a:r>
-            <a:endParaRPr lang="en-US">
+            <a:endParaRPr lang="en-US" dirty="0">
               <a:latin typeface="Times New Roman"/>
               <a:cs typeface="Calibri"/>
             </a:endParaRPr>
@@ -23820,7 +23879,7 @@
               </a:rPr>
               <a:t>Efficient Model Building:</a:t>
             </a:r>
-            <a:endParaRPr lang="en-US">
+            <a:endParaRPr lang="en-US" dirty="0">
               <a:latin typeface="Times New Roman"/>
               <a:cs typeface="Times New Roman"/>
             </a:endParaRPr>
@@ -23842,7 +23901,7 @@
               </a:rPr>
               <a:t>Implemented models inspired by MobileNet and ShuffleNet architectures.</a:t>
             </a:r>
-            <a:endParaRPr lang="en-US" sz="2000">
+            <a:endParaRPr lang="en-US" sz="2000" dirty="0">
               <a:latin typeface="Times New Roman"/>
               <a:cs typeface="Calibri"/>
             </a:endParaRPr>
@@ -23864,7 +23923,7 @@
               </a:rPr>
               <a:t>Leveraged depthwise separable convolutions and channel shuffling for efficiency.</a:t>
             </a:r>
-            <a:endParaRPr lang="en-US" sz="2000">
+            <a:endParaRPr lang="en-US" sz="2000" dirty="0">
               <a:latin typeface="Times New Roman"/>
               <a:cs typeface="Calibri"/>
             </a:endParaRPr>
@@ -23883,7 +23942,7 @@
               </a:rPr>
               <a:t>Promising Results:</a:t>
             </a:r>
-            <a:endParaRPr lang="en-US">
+            <a:endParaRPr lang="en-US" dirty="0">
               <a:latin typeface="Times New Roman"/>
               <a:cs typeface="Times New Roman"/>
             </a:endParaRPr>
@@ -23905,7 +23964,7 @@
               </a:rPr>
               <a:t>The models showcased promising results in image classification tasks.</a:t>
             </a:r>
-            <a:endParaRPr lang="en-US" sz="2000">
+            <a:endParaRPr lang="en-US" sz="2000" dirty="0">
               <a:latin typeface="Times New Roman"/>
               <a:cs typeface="Calibri"/>
             </a:endParaRPr>
@@ -23927,7 +23986,7 @@
               </a:rPr>
               <a:t>Successfully applied optimization techniques for performance enhancement.</a:t>
             </a:r>
-            <a:endParaRPr lang="en-US" sz="2000">
+            <a:endParaRPr lang="en-US" sz="2000" dirty="0">
               <a:latin typeface="Times New Roman"/>
               <a:cs typeface="Calibri"/>
             </a:endParaRPr>
@@ -23946,7 +24005,7 @@
               </a:rPr>
               <a:t>Guiding Future Projects:</a:t>
             </a:r>
-            <a:endParaRPr lang="en-US">
+            <a:endParaRPr lang="en-US" dirty="0">
               <a:latin typeface="Times New Roman"/>
               <a:cs typeface="Calibri"/>
             </a:endParaRPr>
@@ -23968,7 +24027,7 @@
               </a:rPr>
               <a:t>The lessons and experiences gained from this project will serve as a guide.</a:t>
             </a:r>
-            <a:endParaRPr lang="en-US" sz="2000">
+            <a:endParaRPr lang="en-US" sz="2000" dirty="0">
               <a:latin typeface="Times New Roman"/>
               <a:cs typeface="Calibri"/>
             </a:endParaRPr>
@@ -24021,7 +24080,7 @@
           <p:cNvPr id="2" name="Title 1">
             <a:extLst>
               <a:ext uri="{FF2B5EF4-FFF2-40B4-BE49-F238E27FC236}">
-                <a16:creationId xmlns:a16="http://schemas.microsoft.com/office/drawing/2014/main" id="{4EAF4E8F-DBC6-74AB-A11E-02D04774E095}"/>
+                <a16:creationId xmlns:a16="http://schemas.microsoft.com/office/drawing/2014/main" xmlns="" id="{4EAF4E8F-DBC6-74AB-A11E-02D04774E095}"/>
               </a:ext>
             </a:extLst>
           </p:cNvPr>
@@ -24054,7 +24113,7 @@
           <p:cNvPr id="3" name="Content Placeholder 2">
             <a:extLst>
               <a:ext uri="{FF2B5EF4-FFF2-40B4-BE49-F238E27FC236}">
-                <a16:creationId xmlns:a16="http://schemas.microsoft.com/office/drawing/2014/main" id="{2FDA5B27-2B7A-E729-0063-E8F98D8FE22D}"/>
+                <a16:creationId xmlns:a16="http://schemas.microsoft.com/office/drawing/2014/main" xmlns="" id="{2FDA5B27-2B7A-E729-0063-E8F98D8FE22D}"/>
               </a:ext>
             </a:extLst>
           </p:cNvPr>
@@ -24262,7 +24321,7 @@
           <p:cNvPr id="2" name="Title 1">
             <a:extLst>
               <a:ext uri="{FF2B5EF4-FFF2-40B4-BE49-F238E27FC236}">
-                <a16:creationId xmlns:a16="http://schemas.microsoft.com/office/drawing/2014/main" id="{0D9353C2-9C65-680F-127D-E10801B63DA7}"/>
+                <a16:creationId xmlns:a16="http://schemas.microsoft.com/office/drawing/2014/main" xmlns="" id="{0D9353C2-9C65-680F-127D-E10801B63DA7}"/>
               </a:ext>
             </a:extLst>
           </p:cNvPr>
@@ -24297,7 +24356,7 @@
           <p:cNvPr id="3" name="Content Placeholder 2">
             <a:extLst>
               <a:ext uri="{FF2B5EF4-FFF2-40B4-BE49-F238E27FC236}">
-                <a16:creationId xmlns:a16="http://schemas.microsoft.com/office/drawing/2014/main" id="{2F84C533-E0BE-2207-4FDF-A8D6A5AFBF41}"/>
+                <a16:creationId xmlns:a16="http://schemas.microsoft.com/office/drawing/2014/main" xmlns="" id="{2F84C533-E0BE-2207-4FDF-A8D6A5AFBF41}"/>
               </a:ext>
             </a:extLst>
           </p:cNvPr>
@@ -24403,7 +24462,7 @@
           <p:cNvPr id="3" name="Content Placeholder 2">
             <a:extLst>
               <a:ext uri="{FF2B5EF4-FFF2-40B4-BE49-F238E27FC236}">
-                <a16:creationId xmlns:a16="http://schemas.microsoft.com/office/drawing/2014/main" id="{2F84C533-E0BE-2207-4FDF-A8D6A5AFBF41}"/>
+                <a16:creationId xmlns:a16="http://schemas.microsoft.com/office/drawing/2014/main" xmlns="" id="{2F84C533-E0BE-2207-4FDF-A8D6A5AFBF41}"/>
               </a:ext>
             </a:extLst>
           </p:cNvPr>
@@ -24474,7 +24533,7 @@
           <p:cNvPr id="3" name="Content Placeholder 2">
             <a:extLst>
               <a:ext uri="{FF2B5EF4-FFF2-40B4-BE49-F238E27FC236}">
-                <a16:creationId xmlns:a16="http://schemas.microsoft.com/office/drawing/2014/main" id="{2F84C533-E0BE-2207-4FDF-A8D6A5AFBF41}"/>
+                <a16:creationId xmlns:a16="http://schemas.microsoft.com/office/drawing/2014/main" xmlns="" id="{2F84C533-E0BE-2207-4FDF-A8D6A5AFBF41}"/>
               </a:ext>
             </a:extLst>
           </p:cNvPr>
@@ -24545,7 +24604,7 @@
           <p:cNvPr id="2" name="Title 1">
             <a:extLst>
               <a:ext uri="{FF2B5EF4-FFF2-40B4-BE49-F238E27FC236}">
-                <a16:creationId xmlns:a16="http://schemas.microsoft.com/office/drawing/2014/main" id="{0C2FBF42-AE5C-DFD2-FEFA-2EF4342725B3}"/>
+                <a16:creationId xmlns:a16="http://schemas.microsoft.com/office/drawing/2014/main" xmlns="" id="{0C2FBF42-AE5C-DFD2-FEFA-2EF4342725B3}"/>
               </a:ext>
             </a:extLst>
           </p:cNvPr>
@@ -24575,7 +24634,7 @@
           <p:cNvPr id="3" name="Content Placeholder 2">
             <a:extLst>
               <a:ext uri="{FF2B5EF4-FFF2-40B4-BE49-F238E27FC236}">
-                <a16:creationId xmlns:a16="http://schemas.microsoft.com/office/drawing/2014/main" id="{8D0A7884-F890-F26C-2CC8-A018B9BAAB4E}"/>
+                <a16:creationId xmlns:a16="http://schemas.microsoft.com/office/drawing/2014/main" xmlns="" id="{8D0A7884-F890-F26C-2CC8-A018B9BAAB4E}"/>
               </a:ext>
             </a:extLst>
           </p:cNvPr>
@@ -24615,7 +24674,40 @@
                 <a:ea typeface="+mn-lt"/>
                 <a:cs typeface="+mn-lt"/>
               </a:rPr>
-              <a:t> Exploring deep learning project focusing on Mobile and Shuffle Network architectures.</a:t>
+              <a:t> Exploring </a:t>
+            </a:r>
+            <a:r>
+              <a:rPr lang="en-US" dirty="0" smtClean="0">
+                <a:solidFill>
+                  <a:srgbClr val="374151"/>
+                </a:solidFill>
+                <a:latin typeface="Times New Roman"/>
+                <a:ea typeface="+mn-lt"/>
+                <a:cs typeface="+mn-lt"/>
+              </a:rPr>
+              <a:t>this</a:t>
+            </a:r>
+            <a:r>
+              <a:rPr lang="en-US" dirty="0" smtClean="0">
+                <a:solidFill>
+                  <a:srgbClr val="374151"/>
+                </a:solidFill>
+                <a:latin typeface="Times New Roman"/>
+                <a:ea typeface="+mn-lt"/>
+                <a:cs typeface="+mn-lt"/>
+              </a:rPr>
+              <a:t> </a:t>
+            </a:r>
+            <a:r>
+              <a:rPr lang="en-US" dirty="0">
+                <a:solidFill>
+                  <a:srgbClr val="374151"/>
+                </a:solidFill>
+                <a:latin typeface="Times New Roman"/>
+                <a:ea typeface="+mn-lt"/>
+                <a:cs typeface="+mn-lt"/>
+              </a:rPr>
+              <a:t>project focusing on Mobile and Shuffle Network architectures.</a:t>
             </a:r>
             <a:endParaRPr lang="en-US" dirty="0">
               <a:latin typeface="Times New Roman"/>
@@ -24648,7 +24740,7 @@
               </a:rPr>
               <a:t> The presentation is organized to provide a stepbystep walkthrough of key project components.</a:t>
             </a:r>
-            <a:endParaRPr lang="en-US">
+            <a:endParaRPr lang="en-US" dirty="0">
               <a:latin typeface="Times New Roman"/>
               <a:cs typeface="Times New Roman"/>
             </a:endParaRPr>
@@ -24678,7 +24770,7 @@
               </a:rPr>
               <a:t> Understand the foundation of my work by examining the dataset that drove my experiments.</a:t>
             </a:r>
-            <a:endParaRPr lang="en-US">
+            <a:endParaRPr lang="en-US" dirty="0">
               <a:latin typeface="Times New Roman"/>
               <a:cs typeface="Times New Roman"/>
             </a:endParaRPr>
@@ -24708,7 +24800,7 @@
               </a:rPr>
               <a:t> Dive into the technical details of the Mobile Network and Shuffle Network structures.</a:t>
             </a:r>
-            <a:endParaRPr lang="en-US">
+            <a:endParaRPr lang="en-US" dirty="0">
               <a:latin typeface="Times New Roman"/>
               <a:cs typeface="Times New Roman"/>
             </a:endParaRPr>
@@ -24738,7 +24830,7 @@
               </a:rPr>
               <a:t> Uncover the methodologies and steps I employed during the training of my deep neural networks.</a:t>
             </a:r>
-            <a:endParaRPr lang="en-US">
+            <a:endParaRPr lang="en-US" dirty="0">
               <a:latin typeface="Times New Roman"/>
               <a:cs typeface="Times New Roman"/>
             </a:endParaRPr>
@@ -24768,7 +24860,7 @@
               </a:rPr>
               <a:t> Gain insights into how my models were rigorously evaluated, emphasizing the testing phase.</a:t>
             </a:r>
-            <a:endParaRPr lang="en-US">
+            <a:endParaRPr lang="en-US" dirty="0">
               <a:latin typeface="Times New Roman"/>
               <a:cs typeface="Times New Roman"/>
             </a:endParaRPr>
@@ -24798,7 +24890,7 @@
               </a:rPr>
               <a:t> Delve into the outcomes of my experiments and the subsequent analytical interpretation of these results.</a:t>
             </a:r>
-            <a:endParaRPr lang="en-US">
+            <a:endParaRPr lang="en-US" dirty="0">
               <a:latin typeface="Times New Roman"/>
               <a:cs typeface="Times New Roman"/>
             </a:endParaRPr>
@@ -24828,7 +24920,7 @@
               </a:rPr>
               <a:t> Summarize my key findings and express concluding thoughts on the overall project.</a:t>
             </a:r>
-            <a:endParaRPr lang="en-US">
+            <a:endParaRPr lang="en-US" dirty="0">
               <a:latin typeface="Times New Roman"/>
               <a:cs typeface="Times New Roman"/>
             </a:endParaRPr>
@@ -24858,7 +24950,7 @@
               </a:rPr>
               <a:t> Provide a list of sources and references that guided my exploration.</a:t>
             </a:r>
-            <a:endParaRPr lang="en-US">
+            <a:endParaRPr lang="en-US" dirty="0">
               <a:latin typeface="Times New Roman"/>
               <a:cs typeface="Times New Roman"/>
             </a:endParaRPr>
@@ -24900,7 +24992,7 @@
           <p:cNvPr id="2" name="Title 1">
             <a:extLst>
               <a:ext uri="{FF2B5EF4-FFF2-40B4-BE49-F238E27FC236}">
-                <a16:creationId xmlns:a16="http://schemas.microsoft.com/office/drawing/2014/main" id="{AFA966EE-95B5-A073-1421-39052396980D}"/>
+                <a16:creationId xmlns:a16="http://schemas.microsoft.com/office/drawing/2014/main" xmlns="" id="{AFA966EE-95B5-A073-1421-39052396980D}"/>
               </a:ext>
             </a:extLst>
           </p:cNvPr>
@@ -24937,7 +25029,7 @@
           <p:cNvPr id="3" name="Content Placeholder 2">
             <a:extLst>
               <a:ext uri="{FF2B5EF4-FFF2-40B4-BE49-F238E27FC236}">
-                <a16:creationId xmlns:a16="http://schemas.microsoft.com/office/drawing/2014/main" id="{0F4943A4-8251-AD87-28A7-5278E03977FE}"/>
+                <a16:creationId xmlns:a16="http://schemas.microsoft.com/office/drawing/2014/main" xmlns="" id="{0F4943A4-8251-AD87-28A7-5278E03977FE}"/>
               </a:ext>
             </a:extLst>
           </p:cNvPr>
@@ -24966,6 +25058,16 @@
               </a:buClr>
             </a:pPr>
             <a:r>
+              <a:rPr lang="en-US" dirty="0" smtClean="0">
+                <a:solidFill>
+                  <a:srgbClr val="374151"/>
+                </a:solidFill>
+                <a:ea typeface="+mn-lt"/>
+                <a:cs typeface="+mn-lt"/>
+              </a:rPr>
+              <a:t>Implemented </a:t>
+            </a:r>
+            <a:r>
               <a:rPr lang="en-US" dirty="0">
                 <a:solidFill>
                   <a:srgbClr val="374151"/>
@@ -24973,16 +25075,18 @@
                 <a:ea typeface="+mn-lt"/>
                 <a:cs typeface="+mn-lt"/>
               </a:rPr>
-              <a:t>Implement and evaluate convolutional neural network architectures, MobileNet and Shuffle Net, for image classification.</a:t>
-            </a:r>
-            <a:endParaRPr lang="en-US" dirty="0"/>
-          </a:p>
-          <a:p>
-            <a:pPr>
-              <a:buClr>
-                <a:srgbClr val="B1005E"/>
-              </a:buClr>
-            </a:pPr>
+              <a:t>and </a:t>
+            </a:r>
+            <a:r>
+              <a:rPr lang="en-US" dirty="0" smtClean="0">
+                <a:solidFill>
+                  <a:srgbClr val="374151"/>
+                </a:solidFill>
+                <a:ea typeface="+mn-lt"/>
+                <a:cs typeface="+mn-lt"/>
+              </a:rPr>
+              <a:t>evaluated </a:t>
+            </a:r>
             <a:r>
               <a:rPr lang="en-US" dirty="0">
                 <a:solidFill>
@@ -24991,7 +25095,35 @@
                 <a:ea typeface="+mn-lt"/>
                 <a:cs typeface="+mn-lt"/>
               </a:rPr>
-              <a:t>Specifically, target the MNIST dataset for digit recognition.</a:t>
+              <a:t>convolutional neural network architectures, MobileNet and Shuffle Net, for image classification.</a:t>
+            </a:r>
+            <a:endParaRPr lang="en-US" dirty="0"/>
+          </a:p>
+          <a:p>
+            <a:pPr>
+              <a:buClr>
+                <a:srgbClr val="B1005E"/>
+              </a:buClr>
+            </a:pPr>
+            <a:r>
+              <a:rPr lang="en-US" dirty="0" smtClean="0">
+                <a:solidFill>
+                  <a:srgbClr val="374151"/>
+                </a:solidFill>
+                <a:ea typeface="+mn-lt"/>
+                <a:cs typeface="+mn-lt"/>
+              </a:rPr>
+              <a:t>Specifically, </a:t>
+            </a:r>
+            <a:r>
+              <a:rPr lang="en-US" dirty="0">
+                <a:solidFill>
+                  <a:srgbClr val="374151"/>
+                </a:solidFill>
+                <a:ea typeface="+mn-lt"/>
+                <a:cs typeface="+mn-lt"/>
+              </a:rPr>
+              <a:t>target the MNIST dataset for digit recognition.</a:t>
             </a:r>
             <a:endParaRPr lang="en-US" dirty="0"/>
           </a:p>
@@ -25140,7 +25272,7 @@
           <p:cNvPr id="2" name="Title 1">
             <a:extLst>
               <a:ext uri="{FF2B5EF4-FFF2-40B4-BE49-F238E27FC236}">
-                <a16:creationId xmlns:a16="http://schemas.microsoft.com/office/drawing/2014/main" id="{AFA966EE-95B5-A073-1421-39052396980D}"/>
+                <a16:creationId xmlns:a16="http://schemas.microsoft.com/office/drawing/2014/main" xmlns="" id="{AFA966EE-95B5-A073-1421-39052396980D}"/>
               </a:ext>
             </a:extLst>
           </p:cNvPr>
@@ -25177,7 +25309,7 @@
           <p:cNvPr id="3" name="Content Placeholder 2">
             <a:extLst>
               <a:ext uri="{FF2B5EF4-FFF2-40B4-BE49-F238E27FC236}">
-                <a16:creationId xmlns:a16="http://schemas.microsoft.com/office/drawing/2014/main" id="{0F4943A4-8251-AD87-28A7-5278E03977FE}"/>
+                <a16:creationId xmlns:a16="http://schemas.microsoft.com/office/drawing/2014/main" xmlns="" id="{0F4943A4-8251-AD87-28A7-5278E03977FE}"/>
               </a:ext>
             </a:extLst>
           </p:cNvPr>
@@ -25213,27 +25345,7 @@
                 <a:ea typeface="+mn-lt"/>
                 <a:cs typeface="+mn-lt"/>
               </a:rPr>
-              <a:t>The training process, including </a:t>
-            </a:r>
-            <a:r>
-              <a:rPr lang="en-US">
-                <a:solidFill>
-                  <a:srgbClr val="374151"/>
-                </a:solidFill>
-                <a:ea typeface="+mn-lt"/>
-                <a:cs typeface="+mn-lt"/>
-              </a:rPr>
-              <a:t>Adam</a:t>
-            </a:r>
-            <a:r>
-              <a:rPr lang="en-US" dirty="0">
-                <a:solidFill>
-                  <a:srgbClr val="374151"/>
-                </a:solidFill>
-                <a:ea typeface="+mn-lt"/>
-                <a:cs typeface="+mn-lt"/>
-              </a:rPr>
-              <a:t> optimization algorithms and loss functions.</a:t>
+              <a:t>The training process, including Adam optimization algorithms and loss functions.</a:t>
             </a:r>
             <a:endParaRPr lang="en-US" dirty="0">
               <a:solidFill>
@@ -25281,7 +25393,17 @@
                 <a:ea typeface="+mn-lt"/>
                 <a:cs typeface="+mn-lt"/>
               </a:rPr>
-              <a:t>Test the trained models on a separate dataset (MNIST test set).</a:t>
+              <a:t>Test the trained models on a separate </a:t>
+            </a:r>
+            <a:r>
+              <a:rPr lang="en-US" dirty="0" smtClean="0">
+                <a:solidFill>
+                  <a:srgbClr val="374151"/>
+                </a:solidFill>
+                <a:ea typeface="+mn-lt"/>
+                <a:cs typeface="+mn-lt"/>
+              </a:rPr>
+              <a:t>dataset.</a:t>
             </a:r>
             <a:endParaRPr lang="en-US" dirty="0">
               <a:solidFill>
@@ -25428,7 +25550,7 @@
           <p:cNvPr id="2" name="Title 1">
             <a:extLst>
               <a:ext uri="{FF2B5EF4-FFF2-40B4-BE49-F238E27FC236}">
-                <a16:creationId xmlns:a16="http://schemas.microsoft.com/office/drawing/2014/main" id="{01FC29F7-5C0B-9ED9-AE6C-24B10A451B31}"/>
+                <a16:creationId xmlns:a16="http://schemas.microsoft.com/office/drawing/2014/main" xmlns="" id="{01FC29F7-5C0B-9ED9-AE6C-24B10A451B31}"/>
               </a:ext>
             </a:extLst>
           </p:cNvPr>
@@ -25463,7 +25585,7 @@
           <p:cNvPr id="3" name="Content Placeholder 2">
             <a:extLst>
               <a:ext uri="{FF2B5EF4-FFF2-40B4-BE49-F238E27FC236}">
-                <a16:creationId xmlns:a16="http://schemas.microsoft.com/office/drawing/2014/main" id="{8992BF1F-9CDE-2F6D-784D-7BC8CFB2A16D}"/>
+                <a16:creationId xmlns:a16="http://schemas.microsoft.com/office/drawing/2014/main" xmlns="" id="{8992BF1F-9CDE-2F6D-784D-7BC8CFB2A16D}"/>
               </a:ext>
             </a:extLst>
           </p:cNvPr>
@@ -25564,7 +25686,7 @@
               </a:rPr>
               <a:t>Pixel Information:</a:t>
             </a:r>
-            <a:endParaRPr lang="en-US">
+            <a:endParaRPr lang="en-US" dirty="0">
               <a:latin typeface="Times New Roman"/>
               <a:cs typeface="Times New Roman"/>
             </a:endParaRPr>
@@ -25602,7 +25724,29 @@
                 <a:ea typeface="+mn-lt"/>
                 <a:cs typeface="+mn-lt"/>
               </a:rPr>
-              <a:t>Pixelvalues range from 0 to 255, where higher values signify darker pixels.</a:t>
+              <a:t>Pixelvalues range from 0 to 255, where higher values signify </a:t>
+            </a:r>
+            <a:r>
+              <a:rPr lang="en-US" sz="2000" dirty="0" smtClean="0">
+                <a:solidFill>
+                  <a:srgbClr val="374151"/>
+                </a:solidFill>
+                <a:latin typeface="Times New Roman"/>
+                <a:ea typeface="+mn-lt"/>
+                <a:cs typeface="+mn-lt"/>
+              </a:rPr>
+              <a:t>intensity pixels</a:t>
+            </a:r>
+            <a:r>
+              <a:rPr lang="en-US" sz="2000" dirty="0">
+                <a:solidFill>
+                  <a:srgbClr val="374151"/>
+                </a:solidFill>
+                <a:latin typeface="Times New Roman"/>
+                <a:ea typeface="+mn-lt"/>
+                <a:cs typeface="+mn-lt"/>
+              </a:rPr>
+              <a:t>.</a:t>
             </a:r>
           </a:p>
           <a:p>
@@ -25622,7 +25766,7 @@
               </a:rPr>
               <a:t>File Descriptions:</a:t>
             </a:r>
-            <a:endParaRPr lang="en-US">
+            <a:endParaRPr lang="en-US" dirty="0">
               <a:latin typeface="Times New Roman"/>
               <a:cs typeface="Times New Roman"/>
             </a:endParaRPr>
@@ -25662,7 +25806,7 @@
               </a:rPr>
               <a:t>The first column, "label," represents the digit drawn by the user (target variable).</a:t>
             </a:r>
-            <a:endParaRPr lang="en-US" sz="2000">
+            <a:endParaRPr lang="en-US" sz="2000" dirty="0">
               <a:latin typeface="Times New Roman"/>
               <a:cs typeface="Calibri"/>
             </a:endParaRPr>
@@ -25702,7 +25846,7 @@
               </a:rPr>
               <a:t>Pixel Naming Convention:</a:t>
             </a:r>
-            <a:endParaRPr lang="en-US">
+            <a:endParaRPr lang="en-US" dirty="0">
               <a:latin typeface="Times New Roman"/>
               <a:cs typeface="Times New Roman"/>
             </a:endParaRPr>
@@ -25743,7 +25887,7 @@
               <a:t>The decomposition x = i * 28  j maps the pixel to a 28x28 matrix, with </a:t>
             </a:r>
             <a:r>
-              <a:rPr lang="en-US" sz="2000" err="1">
+              <a:rPr lang="en-US" sz="2000" dirty="0" err="1">
                 <a:solidFill>
                   <a:srgbClr val="374151"/>
                 </a:solidFill>
@@ -25764,7 +25908,7 @@
               </a:rPr>
               <a:t> and j in the range [0, 27].</a:t>
             </a:r>
-            <a:endParaRPr lang="en-US" sz="2000">
+            <a:endParaRPr lang="en-US" sz="2000" dirty="0">
               <a:latin typeface="Times New Roman"/>
               <a:cs typeface="Calibri"/>
             </a:endParaRPr>
@@ -25806,7 +25950,7 @@
           <p:cNvPr id="2" name="Title 1">
             <a:extLst>
               <a:ext uri="{FF2B5EF4-FFF2-40B4-BE49-F238E27FC236}">
-                <a16:creationId xmlns:a16="http://schemas.microsoft.com/office/drawing/2014/main" id="{01FC29F7-5C0B-9ED9-AE6C-24B10A451B31}"/>
+                <a16:creationId xmlns:a16="http://schemas.microsoft.com/office/drawing/2014/main" xmlns="" id="{01FC29F7-5C0B-9ED9-AE6C-24B10A451B31}"/>
               </a:ext>
             </a:extLst>
           </p:cNvPr>
@@ -25841,7 +25985,7 @@
           <p:cNvPr id="3" name="Content Placeholder 2">
             <a:extLst>
               <a:ext uri="{FF2B5EF4-FFF2-40B4-BE49-F238E27FC236}">
-                <a16:creationId xmlns:a16="http://schemas.microsoft.com/office/drawing/2014/main" id="{8992BF1F-9CDE-2F6D-784D-7BC8CFB2A16D}"/>
+                <a16:creationId xmlns:a16="http://schemas.microsoft.com/office/drawing/2014/main" xmlns="" id="{8992BF1F-9CDE-2F6D-784D-7BC8CFB2A16D}"/>
               </a:ext>
             </a:extLst>
           </p:cNvPr>
@@ -25928,7 +26072,7 @@
               <a:t>Pixelx, decomposed as x = i * 28  j, is located at row </a:t>
             </a:r>
             <a:r>
-              <a:rPr lang="en-US" sz="2000" err="1">
+              <a:rPr lang="en-US" sz="2000" dirty="0" err="1">
                 <a:solidFill>
                   <a:srgbClr val="374151"/>
                 </a:solidFill>
@@ -25949,14 +26093,6 @@
               </a:rPr>
               <a:t> and column j in the 28x28 matrix (zerobased indexing).</a:t>
             </a:r>
-            <a:endParaRPr lang="en-US" sz="2000">
-              <a:solidFill>
-                <a:srgbClr val="374151"/>
-              </a:solidFill>
-              <a:latin typeface="Times New Roman"/>
-              <a:ea typeface="+mn-lt"/>
-              <a:cs typeface="Times New Roman"/>
-            </a:endParaRPr>
           </a:p>
           <a:p>
             <a:pPr>
@@ -25998,7 +26134,18 @@
                 <a:ea typeface="+mn-lt"/>
                 <a:cs typeface="Times New Roman"/>
               </a:rPr>
-              <a:t>The test dataset (test.csv) is identical to the training set but lacks the "label" column.</a:t>
+              <a:t>The test dataset (test.csv) is identical to the training set </a:t>
+            </a:r>
+            <a:r>
+              <a:rPr lang="en-US" sz="2000" dirty="0" smtClean="0">
+                <a:solidFill>
+                  <a:srgbClr val="374151"/>
+                </a:solidFill>
+                <a:latin typeface="Times New Roman"/>
+                <a:ea typeface="+mn-lt"/>
+                <a:cs typeface="Times New Roman"/>
+              </a:rPr>
+              <a:t>.</a:t>
             </a:r>
             <a:endParaRPr lang="en-US" sz="2000" dirty="0">
               <a:solidFill>
@@ -26024,13 +26171,6 @@
               </a:rPr>
               <a:t>Sample Size:</a:t>
             </a:r>
-            <a:endParaRPr lang="en-US" b="1">
-              <a:solidFill>
-                <a:srgbClr val="3C4043"/>
-              </a:solidFill>
-              <a:latin typeface="Times New Roman"/>
-              <a:cs typeface="Calibri"/>
-            </a:endParaRPr>
           </a:p>
           <a:p>
             <a:pPr lvl="1">
@@ -26287,7 +26427,7 @@
           <p:cNvPr id="2" name="Title 1">
             <a:extLst>
               <a:ext uri="{FF2B5EF4-FFF2-40B4-BE49-F238E27FC236}">
-                <a16:creationId xmlns:a16="http://schemas.microsoft.com/office/drawing/2014/main" id="{07405421-3570-149D-BAF4-52253B810A16}"/>
+                <a16:creationId xmlns:a16="http://schemas.microsoft.com/office/drawing/2014/main" xmlns="" id="{07405421-3570-149D-BAF4-52253B810A16}"/>
               </a:ext>
             </a:extLst>
           </p:cNvPr>
@@ -26325,7 +26465,7 @@
           <p:cNvPr id="3" name="Content Placeholder 2">
             <a:extLst>
               <a:ext uri="{FF2B5EF4-FFF2-40B4-BE49-F238E27FC236}">
-                <a16:creationId xmlns:a16="http://schemas.microsoft.com/office/drawing/2014/main" id="{E5124808-7F17-835E-1C9C-EFD0448BD714}"/>
+                <a16:creationId xmlns:a16="http://schemas.microsoft.com/office/drawing/2014/main" xmlns="" id="{E5124808-7F17-835E-1C9C-EFD0448BD714}"/>
               </a:ext>
             </a:extLst>
           </p:cNvPr>
@@ -26364,7 +26504,7 @@
               </a:rPr>
               <a:t>Input Layer:</a:t>
             </a:r>
-            <a:endParaRPr lang="en-US">
+            <a:endParaRPr lang="en-US" dirty="0">
               <a:solidFill>
                 <a:schemeClr val="tx1"/>
               </a:solidFill>
@@ -26390,14 +26530,6 @@
               </a:rPr>
               <a:t>Shape: (28, 28, 1)</a:t>
             </a:r>
-            <a:endParaRPr lang="en-US" sz="2000">
-              <a:solidFill>
-                <a:schemeClr val="tx1"/>
-              </a:solidFill>
-              <a:latin typeface="Times New Roman"/>
-              <a:ea typeface="+mn-lt"/>
-              <a:cs typeface="+mn-lt"/>
-            </a:endParaRPr>
           </a:p>
           <a:p>
             <a:pPr lvl="1">
@@ -26416,14 +26548,6 @@
               </a:rPr>
               <a:t>Description: Accepts 28x28 grayscale images representing handdrawn digits.</a:t>
             </a:r>
-            <a:endParaRPr lang="en-US" sz="2000">
-              <a:solidFill>
-                <a:schemeClr val="tx1"/>
-              </a:solidFill>
-              <a:latin typeface="Times New Roman"/>
-              <a:ea typeface="+mn-lt"/>
-              <a:cs typeface="+mn-lt"/>
-            </a:endParaRPr>
           </a:p>
           <a:p>
             <a:pPr>
@@ -26442,7 +26566,7 @@
               </a:rPr>
               <a:t>Convolution Blocks:</a:t>
             </a:r>
-            <a:endParaRPr lang="en-US">
+            <a:endParaRPr lang="en-US" dirty="0">
               <a:solidFill>
                 <a:schemeClr val="tx1"/>
               </a:solidFill>
@@ -26468,14 +26592,6 @@
               </a:rPr>
               <a:t>Conv2D (3x3 kernel, 32 filters, strides=2)</a:t>
             </a:r>
-            <a:endParaRPr lang="en-US" sz="2000">
-              <a:solidFill>
-                <a:schemeClr val="tx1"/>
-              </a:solidFill>
-              <a:latin typeface="Times New Roman"/>
-              <a:ea typeface="+mn-lt"/>
-              <a:cs typeface="+mn-lt"/>
-            </a:endParaRPr>
           </a:p>
           <a:p>
             <a:pPr lvl="1">
@@ -26494,14 +26610,6 @@
               </a:rPr>
               <a:t>Batch Normalization</a:t>
             </a:r>
-            <a:endParaRPr lang="en-US" sz="2000">
-              <a:solidFill>
-                <a:schemeClr val="tx1"/>
-              </a:solidFill>
-              <a:latin typeface="Times New Roman"/>
-              <a:ea typeface="+mn-lt"/>
-              <a:cs typeface="+mn-lt"/>
-            </a:endParaRPr>
           </a:p>
           <a:p>
             <a:pPr lvl="1">
@@ -26520,14 +26628,6 @@
               </a:rPr>
               <a:t>ReLU activation</a:t>
             </a:r>
-            <a:endParaRPr lang="en-US" sz="2000">
-              <a:solidFill>
-                <a:schemeClr val="tx1"/>
-              </a:solidFill>
-              <a:latin typeface="Times New Roman"/>
-              <a:ea typeface="+mn-lt"/>
-              <a:cs typeface="+mn-lt"/>
-            </a:endParaRPr>
           </a:p>
           <a:p>
             <a:pPr lvl="1">
@@ -26561,9 +26661,19 @@
                 <a:latin typeface="Times New Roman"/>
                 <a:cs typeface="Calibri"/>
               </a:rPr>
-              <a:t>Depthwise Separable Convolution Blocks:</a:t>
-            </a:r>
-            <a:endParaRPr lang="en-US">
+              <a:t>Depthwise Separable Convolution </a:t>
+            </a:r>
+            <a:r>
+              <a:rPr lang="en-US" b="1" dirty="0" smtClean="0">
+                <a:solidFill>
+                  <a:schemeClr val="tx1"/>
+                </a:solidFill>
+                <a:latin typeface="Times New Roman"/>
+                <a:cs typeface="Calibri"/>
+              </a:rPr>
+              <a:t>Blocks(x6):</a:t>
+            </a:r>
+            <a:endParaRPr lang="en-US" dirty="0">
               <a:solidFill>
                 <a:schemeClr val="tx1"/>
               </a:solidFill>
@@ -26710,7 +26820,7 @@
           <p:cNvPr id="2" name="Title 1">
             <a:extLst>
               <a:ext uri="{FF2B5EF4-FFF2-40B4-BE49-F238E27FC236}">
-                <a16:creationId xmlns:a16="http://schemas.microsoft.com/office/drawing/2014/main" id="{07405421-3570-149D-BAF4-52253B810A16}"/>
+                <a16:creationId xmlns:a16="http://schemas.microsoft.com/office/drawing/2014/main" xmlns="" id="{07405421-3570-149D-BAF4-52253B810A16}"/>
               </a:ext>
             </a:extLst>
           </p:cNvPr>
@@ -26751,7 +26861,7 @@
           <p:cNvPr id="3" name="Content Placeholder 2">
             <a:extLst>
               <a:ext uri="{FF2B5EF4-FFF2-40B4-BE49-F238E27FC236}">
-                <a16:creationId xmlns:a16="http://schemas.microsoft.com/office/drawing/2014/main" id="{E5124808-7F17-835E-1C9C-EFD0448BD714}"/>
+                <a16:creationId xmlns:a16="http://schemas.microsoft.com/office/drawing/2014/main" xmlns="" id="{E5124808-7F17-835E-1C9C-EFD0448BD714}"/>
               </a:ext>
             </a:extLst>
           </p:cNvPr>
@@ -26791,7 +26901,7 @@
               <a:t>Description: Depthwise separable convolutions are used for their  efficiency. The </a:t>
             </a:r>
             <a:r>
-              <a:rPr lang="en-US" sz="2000" err="1">
+              <a:rPr lang="en-US" sz="2000" dirty="0" err="1">
                 <a:solidFill>
                   <a:schemeClr val="tx1"/>
                 </a:solidFill>
@@ -26813,7 +26923,7 @@
               <a:t>  convolution is followed by batch normalization and </a:t>
             </a:r>
             <a:r>
-              <a:rPr lang="en-US" sz="2000" err="1">
+              <a:rPr lang="en-US" sz="2000" dirty="0" err="1">
                 <a:solidFill>
                   <a:schemeClr val="tx1"/>
                 </a:solidFill>
@@ -26835,7 +26945,7 @@
               <a:t> activation. Then, a pointwise convolution with 64 filters is applied with subsequent batch normalization and </a:t>
             </a:r>
             <a:r>
-              <a:rPr lang="en-US" sz="2000" err="1">
+              <a:rPr lang="en-US" sz="2000" dirty="0" err="1">
                 <a:solidFill>
                   <a:schemeClr val="tx1"/>
                 </a:solidFill>
@@ -26854,9 +26964,20 @@
                 <a:ea typeface="+mn-lt"/>
                 <a:cs typeface="Calibri"/>
               </a:rPr>
-              <a:t> activation.</a:t>
-            </a:r>
-            <a:endParaRPr lang="en-US" sz="2000">
+              <a:t> </a:t>
+            </a:r>
+            <a:r>
+              <a:rPr lang="en-US" sz="2000" dirty="0">
+                <a:solidFill>
+                  <a:schemeClr val="tx1"/>
+                </a:solidFill>
+                <a:latin typeface="Times New Roman"/>
+                <a:ea typeface="+mn-lt"/>
+                <a:cs typeface="Calibri"/>
+              </a:rPr>
+              <a:t>activation. Similarly, it is performed on 5 other layers with various strides, kernel sizes, and numbers of filters.</a:t>
+            </a:r>
+            <a:endParaRPr lang="en-US" sz="2000" dirty="0">
               <a:solidFill>
                 <a:schemeClr val="tx1"/>
               </a:solidFill>
@@ -26881,7 +27002,7 @@
               </a:rPr>
               <a:t>Global Average Pooling:</a:t>
             </a:r>
-            <a:endParaRPr lang="en-US">
+            <a:endParaRPr lang="en-US" dirty="0">
               <a:solidFill>
                 <a:schemeClr val="tx1"/>
               </a:solidFill>
@@ -26907,7 +27028,7 @@
               </a:rPr>
               <a:t>Description: Reduces spatial dimensions to (1, 1, 512) by taking the average of each channel across the spatial dimensions. This operation is commonly used to reduce the spatial dimensions before the fully connected layers.</a:t>
             </a:r>
-            <a:endParaRPr lang="en-US" sz="2000">
+            <a:endParaRPr lang="en-US" sz="2000" dirty="0">
               <a:solidFill>
                 <a:schemeClr val="tx1"/>
               </a:solidFill>
@@ -26932,7 +27053,7 @@
               </a:rPr>
               <a:t>Fully Connected Layers:</a:t>
             </a:r>
-            <a:endParaRPr lang="en-US">
+            <a:endParaRPr lang="en-US" dirty="0">
               <a:solidFill>
                 <a:schemeClr val="tx1"/>
               </a:solidFill>
@@ -26958,7 +27079,7 @@
               <a:t>Dense layer (1024 units, </a:t>
             </a:r>
             <a:r>
-              <a:rPr lang="en-US" sz="2000" err="1">
+              <a:rPr lang="en-US" sz="2000" dirty="0" err="1">
                 <a:solidFill>
                   <a:schemeClr val="tx1"/>
                 </a:solidFill>
@@ -26979,7 +27100,7 @@
               </a:rPr>
               <a:t> activation)</a:t>
             </a:r>
-            <a:endParaRPr lang="en-US" sz="2000">
+            <a:endParaRPr lang="en-US" sz="2000" dirty="0">
               <a:solidFill>
                 <a:schemeClr val="tx1"/>
               </a:solidFill>
@@ -27004,7 +27125,7 @@
               </a:rPr>
               <a:t>Dropout layer (50% dropout rate)</a:t>
             </a:r>
-            <a:endParaRPr lang="en-US" sz="2000">
+            <a:endParaRPr lang="en-US" sz="2000" dirty="0">
               <a:solidFill>
                 <a:schemeClr val="tx1"/>
               </a:solidFill>
@@ -27030,7 +27151,7 @@
               <a:t>Dense layer (10 units, </a:t>
             </a:r>
             <a:r>
-              <a:rPr lang="en-US" sz="2000" err="1">
+              <a:rPr lang="en-US" sz="2000" dirty="0" err="1">
                 <a:solidFill>
                   <a:schemeClr val="tx1"/>
                 </a:solidFill>
@@ -27051,7 +27172,7 @@
               </a:rPr>
               <a:t> activation)</a:t>
             </a:r>
-            <a:endParaRPr lang="en-US" sz="2000">
+            <a:endParaRPr lang="en-US" sz="2000" dirty="0">
               <a:solidFill>
                 <a:schemeClr val="tx1"/>
               </a:solidFill>
@@ -27077,7 +27198,7 @@
               <a:t>Description: The global averagepooled output is fed into a fully connected layer with 1024 units and </a:t>
             </a:r>
             <a:r>
-              <a:rPr lang="en-US" sz="2000" err="1">
+              <a:rPr lang="en-US" sz="2000" dirty="0" err="1">
                 <a:solidFill>
                   <a:schemeClr val="tx1"/>
                 </a:solidFill>
@@ -27099,7 +27220,7 @@
               <a:t> activation. A dropout layer is introduced to prevent overfitting, and finally, a dense layer with 10 units and </a:t>
             </a:r>
             <a:r>
-              <a:rPr lang="en-US" sz="2000" err="1">
+              <a:rPr lang="en-US" sz="2000" dirty="0" err="1">
                 <a:solidFill>
                   <a:schemeClr val="tx1"/>
                 </a:solidFill>
@@ -27120,7 +27241,7 @@
               </a:rPr>
               <a:t> activation produces the output probabilities for each digit class (09).</a:t>
             </a:r>
-            <a:endParaRPr lang="en-US" sz="2000">
+            <a:endParaRPr lang="en-US" sz="2000" dirty="0">
               <a:solidFill>
                 <a:schemeClr val="tx1"/>
               </a:solidFill>

</xml_diff>